<commit_message>
Added Control Tower slide
</commit_message>
<xml_diff>
--- a/IT & Systems- Induction.pptx
+++ b/IT & Systems- Induction.pptx
@@ -5,10 +5,10 @@
     <p:sldMasterId id="2147483649" r:id="rId1"/>
   </p:sldMasterIdLst>
   <p:notesMasterIdLst>
-    <p:notesMasterId r:id="rId17"/>
+    <p:notesMasterId r:id="rId18"/>
   </p:notesMasterIdLst>
   <p:handoutMasterIdLst>
-    <p:handoutMasterId r:id="rId18"/>
+    <p:handoutMasterId r:id="rId19"/>
   </p:handoutMasterIdLst>
   <p:sldIdLst>
     <p:sldId id="1470" r:id="rId2"/>
@@ -20,12 +20,13 @@
     <p:sldId id="1884" r:id="rId8"/>
     <p:sldId id="1875" r:id="rId9"/>
     <p:sldId id="1878" r:id="rId10"/>
-    <p:sldId id="1886" r:id="rId11"/>
-    <p:sldId id="1887" r:id="rId12"/>
-    <p:sldId id="1888" r:id="rId13"/>
-    <p:sldId id="1879" r:id="rId14"/>
-    <p:sldId id="1889" r:id="rId15"/>
-    <p:sldId id="1485" r:id="rId16"/>
+    <p:sldId id="1890" r:id="rId11"/>
+    <p:sldId id="1886" r:id="rId12"/>
+    <p:sldId id="1887" r:id="rId13"/>
+    <p:sldId id="1888" r:id="rId14"/>
+    <p:sldId id="1879" r:id="rId15"/>
+    <p:sldId id="1889" r:id="rId16"/>
+    <p:sldId id="1485" r:id="rId17"/>
   </p:sldIdLst>
   <p:sldSz cx="9144000" cy="6858000" type="screen4x3"/>
   <p:notesSz cx="7053263" cy="9356725"/>
@@ -905,6 +906,753 @@
 </file>
 
 <file path=ppt/diagrams/colors2.xml><?xml version="1.0" encoding="utf-8"?>
+<dgm:colorsDef xmlns:dgm="http://schemas.openxmlformats.org/drawingml/2006/diagram" xmlns:a="http://schemas.openxmlformats.org/drawingml/2006/main" uniqueId="urn:microsoft.com/office/officeart/2005/8/colors/accent1_2">
+  <dgm:title val=""/>
+  <dgm:desc val=""/>
+  <dgm:catLst>
+    <dgm:cat type="accent1" pri="11200"/>
+  </dgm:catLst>
+  <dgm:styleLbl name="node0">
+    <dgm:fillClrLst meth="repeat">
+      <a:schemeClr val="accent1"/>
+    </dgm:fillClrLst>
+    <dgm:linClrLst meth="repeat">
+      <a:schemeClr val="lt1"/>
+    </dgm:linClrLst>
+    <dgm:effectClrLst/>
+    <dgm:txLinClrLst/>
+    <dgm:txFillClrLst/>
+    <dgm:txEffectClrLst/>
+  </dgm:styleLbl>
+  <dgm:styleLbl name="alignNode1">
+    <dgm:fillClrLst meth="repeat">
+      <a:schemeClr val="accent1"/>
+    </dgm:fillClrLst>
+    <dgm:linClrLst meth="repeat">
+      <a:schemeClr val="accent1"/>
+    </dgm:linClrLst>
+    <dgm:effectClrLst/>
+    <dgm:txLinClrLst/>
+    <dgm:txFillClrLst/>
+    <dgm:txEffectClrLst/>
+  </dgm:styleLbl>
+  <dgm:styleLbl name="node1">
+    <dgm:fillClrLst meth="repeat">
+      <a:schemeClr val="accent1"/>
+    </dgm:fillClrLst>
+    <dgm:linClrLst meth="repeat">
+      <a:schemeClr val="lt1"/>
+    </dgm:linClrLst>
+    <dgm:effectClrLst/>
+    <dgm:txLinClrLst/>
+    <dgm:txFillClrLst/>
+    <dgm:txEffectClrLst/>
+  </dgm:styleLbl>
+  <dgm:styleLbl name="lnNode1">
+    <dgm:fillClrLst meth="repeat">
+      <a:schemeClr val="accent1"/>
+    </dgm:fillClrLst>
+    <dgm:linClrLst meth="repeat">
+      <a:schemeClr val="lt1"/>
+    </dgm:linClrLst>
+    <dgm:effectClrLst/>
+    <dgm:txLinClrLst/>
+    <dgm:txFillClrLst/>
+    <dgm:txEffectClrLst/>
+  </dgm:styleLbl>
+  <dgm:styleLbl name="vennNode1">
+    <dgm:fillClrLst meth="repeat">
+      <a:schemeClr val="accent1">
+        <a:alpha val="50000"/>
+      </a:schemeClr>
+    </dgm:fillClrLst>
+    <dgm:linClrLst meth="repeat">
+      <a:schemeClr val="lt1"/>
+    </dgm:linClrLst>
+    <dgm:effectClrLst/>
+    <dgm:txLinClrLst/>
+    <dgm:txFillClrLst/>
+    <dgm:txEffectClrLst/>
+  </dgm:styleLbl>
+  <dgm:styleLbl name="node2">
+    <dgm:fillClrLst meth="repeat">
+      <a:schemeClr val="accent1"/>
+    </dgm:fillClrLst>
+    <dgm:linClrLst meth="repeat">
+      <a:schemeClr val="lt1"/>
+    </dgm:linClrLst>
+    <dgm:effectClrLst/>
+    <dgm:txLinClrLst/>
+    <dgm:txFillClrLst/>
+    <dgm:txEffectClrLst/>
+  </dgm:styleLbl>
+  <dgm:styleLbl name="node3">
+    <dgm:fillClrLst meth="repeat">
+      <a:schemeClr val="accent1"/>
+    </dgm:fillClrLst>
+    <dgm:linClrLst meth="repeat">
+      <a:schemeClr val="lt1"/>
+    </dgm:linClrLst>
+    <dgm:effectClrLst/>
+    <dgm:txLinClrLst/>
+    <dgm:txFillClrLst/>
+    <dgm:txEffectClrLst/>
+  </dgm:styleLbl>
+  <dgm:styleLbl name="node4">
+    <dgm:fillClrLst meth="repeat">
+      <a:schemeClr val="accent1"/>
+    </dgm:fillClrLst>
+    <dgm:linClrLst meth="repeat">
+      <a:schemeClr val="lt1"/>
+    </dgm:linClrLst>
+    <dgm:effectClrLst/>
+    <dgm:txLinClrLst/>
+    <dgm:txFillClrLst/>
+    <dgm:txEffectClrLst/>
+  </dgm:styleLbl>
+  <dgm:styleLbl name="fgImgPlace1">
+    <dgm:fillClrLst meth="repeat">
+      <a:schemeClr val="accent1">
+        <a:tint val="50000"/>
+      </a:schemeClr>
+    </dgm:fillClrLst>
+    <dgm:linClrLst meth="repeat">
+      <a:schemeClr val="lt1"/>
+    </dgm:linClrLst>
+    <dgm:effectClrLst/>
+    <dgm:txLinClrLst/>
+    <dgm:txFillClrLst meth="repeat">
+      <a:schemeClr val="lt1"/>
+    </dgm:txFillClrLst>
+    <dgm:txEffectClrLst/>
+  </dgm:styleLbl>
+  <dgm:styleLbl name="alignImgPlace1">
+    <dgm:fillClrLst meth="repeat">
+      <a:schemeClr val="accent1">
+        <a:tint val="50000"/>
+      </a:schemeClr>
+    </dgm:fillClrLst>
+    <dgm:linClrLst meth="repeat">
+      <a:schemeClr val="lt1"/>
+    </dgm:linClrLst>
+    <dgm:effectClrLst/>
+    <dgm:txLinClrLst/>
+    <dgm:txFillClrLst meth="repeat">
+      <a:schemeClr val="lt1"/>
+    </dgm:txFillClrLst>
+    <dgm:txEffectClrLst/>
+  </dgm:styleLbl>
+  <dgm:styleLbl name="bgImgPlace1">
+    <dgm:fillClrLst meth="repeat">
+      <a:schemeClr val="accent1">
+        <a:tint val="50000"/>
+      </a:schemeClr>
+    </dgm:fillClrLst>
+    <dgm:linClrLst meth="repeat">
+      <a:schemeClr val="lt1"/>
+    </dgm:linClrLst>
+    <dgm:effectClrLst/>
+    <dgm:txLinClrLst/>
+    <dgm:txFillClrLst meth="repeat">
+      <a:schemeClr val="lt1"/>
+    </dgm:txFillClrLst>
+    <dgm:txEffectClrLst/>
+  </dgm:styleLbl>
+  <dgm:styleLbl name="sibTrans2D1">
+    <dgm:fillClrLst meth="repeat">
+      <a:schemeClr val="accent1">
+        <a:tint val="60000"/>
+      </a:schemeClr>
+    </dgm:fillClrLst>
+    <dgm:linClrLst meth="repeat">
+      <a:schemeClr val="accent1">
+        <a:tint val="60000"/>
+      </a:schemeClr>
+    </dgm:linClrLst>
+    <dgm:effectClrLst/>
+    <dgm:txLinClrLst/>
+    <dgm:txFillClrLst/>
+    <dgm:txEffectClrLst/>
+  </dgm:styleLbl>
+  <dgm:styleLbl name="fgSibTrans2D1">
+    <dgm:fillClrLst meth="repeat">
+      <a:schemeClr val="accent1">
+        <a:tint val="60000"/>
+      </a:schemeClr>
+    </dgm:fillClrLst>
+    <dgm:linClrLst meth="repeat">
+      <a:schemeClr val="accent1">
+        <a:tint val="60000"/>
+      </a:schemeClr>
+    </dgm:linClrLst>
+    <dgm:effectClrLst/>
+    <dgm:txLinClrLst/>
+    <dgm:txFillClrLst/>
+    <dgm:txEffectClrLst/>
+  </dgm:styleLbl>
+  <dgm:styleLbl name="bgSibTrans2D1">
+    <dgm:fillClrLst meth="repeat">
+      <a:schemeClr val="accent1">
+        <a:tint val="60000"/>
+      </a:schemeClr>
+    </dgm:fillClrLst>
+    <dgm:linClrLst meth="repeat">
+      <a:schemeClr val="accent1">
+        <a:tint val="60000"/>
+      </a:schemeClr>
+    </dgm:linClrLst>
+    <dgm:effectClrLst/>
+    <dgm:txLinClrLst/>
+    <dgm:txFillClrLst/>
+    <dgm:txEffectClrLst/>
+  </dgm:styleLbl>
+  <dgm:styleLbl name="sibTrans1D1">
+    <dgm:fillClrLst meth="repeat">
+      <a:schemeClr val="accent1"/>
+    </dgm:fillClrLst>
+    <dgm:linClrLst meth="repeat">
+      <a:schemeClr val="accent1"/>
+    </dgm:linClrLst>
+    <dgm:effectClrLst/>
+    <dgm:txLinClrLst/>
+    <dgm:txFillClrLst meth="repeat">
+      <a:schemeClr val="tx1"/>
+    </dgm:txFillClrLst>
+    <dgm:txEffectClrLst/>
+  </dgm:styleLbl>
+  <dgm:styleLbl name="callout">
+    <dgm:fillClrLst meth="repeat">
+      <a:schemeClr val="accent1"/>
+    </dgm:fillClrLst>
+    <dgm:linClrLst meth="repeat">
+      <a:schemeClr val="accent1">
+        <a:tint val="50000"/>
+      </a:schemeClr>
+    </dgm:linClrLst>
+    <dgm:effectClrLst/>
+    <dgm:txLinClrLst/>
+    <dgm:txFillClrLst meth="repeat">
+      <a:schemeClr val="tx1"/>
+    </dgm:txFillClrLst>
+    <dgm:txEffectClrLst/>
+  </dgm:styleLbl>
+  <dgm:styleLbl name="asst0">
+    <dgm:fillClrLst meth="repeat">
+      <a:schemeClr val="accent1"/>
+    </dgm:fillClrLst>
+    <dgm:linClrLst meth="repeat">
+      <a:schemeClr val="lt1"/>
+    </dgm:linClrLst>
+    <dgm:effectClrLst/>
+    <dgm:txLinClrLst/>
+    <dgm:txFillClrLst/>
+    <dgm:txEffectClrLst/>
+  </dgm:styleLbl>
+  <dgm:styleLbl name="asst1">
+    <dgm:fillClrLst meth="repeat">
+      <a:schemeClr val="accent1"/>
+    </dgm:fillClrLst>
+    <dgm:linClrLst meth="repeat">
+      <a:schemeClr val="lt1"/>
+    </dgm:linClrLst>
+    <dgm:effectClrLst/>
+    <dgm:txLinClrLst/>
+    <dgm:txFillClrLst/>
+    <dgm:txEffectClrLst/>
+  </dgm:styleLbl>
+  <dgm:styleLbl name="asst2">
+    <dgm:fillClrLst meth="repeat">
+      <a:schemeClr val="accent1"/>
+    </dgm:fillClrLst>
+    <dgm:linClrLst meth="repeat">
+      <a:schemeClr val="lt1"/>
+    </dgm:linClrLst>
+    <dgm:effectClrLst/>
+    <dgm:txLinClrLst/>
+    <dgm:txFillClrLst/>
+    <dgm:txEffectClrLst/>
+  </dgm:styleLbl>
+  <dgm:styleLbl name="asst3">
+    <dgm:fillClrLst meth="repeat">
+      <a:schemeClr val="accent1"/>
+    </dgm:fillClrLst>
+    <dgm:linClrLst meth="repeat">
+      <a:schemeClr val="lt1"/>
+    </dgm:linClrLst>
+    <dgm:effectClrLst/>
+    <dgm:txLinClrLst/>
+    <dgm:txFillClrLst/>
+    <dgm:txEffectClrLst/>
+  </dgm:styleLbl>
+  <dgm:styleLbl name="asst4">
+    <dgm:fillClrLst meth="repeat">
+      <a:schemeClr val="accent1"/>
+    </dgm:fillClrLst>
+    <dgm:linClrLst meth="repeat">
+      <a:schemeClr val="lt1"/>
+    </dgm:linClrLst>
+    <dgm:effectClrLst/>
+    <dgm:txLinClrLst/>
+    <dgm:txFillClrLst/>
+    <dgm:txEffectClrLst/>
+  </dgm:styleLbl>
+  <dgm:styleLbl name="parChTrans2D1">
+    <dgm:fillClrLst meth="repeat">
+      <a:schemeClr val="accent1">
+        <a:tint val="60000"/>
+      </a:schemeClr>
+    </dgm:fillClrLst>
+    <dgm:linClrLst meth="repeat">
+      <a:schemeClr val="accent1">
+        <a:tint val="60000"/>
+      </a:schemeClr>
+    </dgm:linClrLst>
+    <dgm:effectClrLst/>
+    <dgm:txLinClrLst/>
+    <dgm:txFillClrLst meth="repeat">
+      <a:schemeClr val="lt1"/>
+    </dgm:txFillClrLst>
+    <dgm:txEffectClrLst/>
+  </dgm:styleLbl>
+  <dgm:styleLbl name="parChTrans2D2">
+    <dgm:fillClrLst meth="repeat">
+      <a:schemeClr val="accent1"/>
+    </dgm:fillClrLst>
+    <dgm:linClrLst meth="repeat">
+      <a:schemeClr val="accent1"/>
+    </dgm:linClrLst>
+    <dgm:effectClrLst/>
+    <dgm:txLinClrLst/>
+    <dgm:txFillClrLst meth="repeat">
+      <a:schemeClr val="lt1"/>
+    </dgm:txFillClrLst>
+    <dgm:txEffectClrLst/>
+  </dgm:styleLbl>
+  <dgm:styleLbl name="parChTrans2D3">
+    <dgm:fillClrLst meth="repeat">
+      <a:schemeClr val="accent1"/>
+    </dgm:fillClrLst>
+    <dgm:linClrLst meth="repeat">
+      <a:schemeClr val="accent1"/>
+    </dgm:linClrLst>
+    <dgm:effectClrLst/>
+    <dgm:txLinClrLst/>
+    <dgm:txFillClrLst meth="repeat">
+      <a:schemeClr val="lt1"/>
+    </dgm:txFillClrLst>
+    <dgm:txEffectClrLst/>
+  </dgm:styleLbl>
+  <dgm:styleLbl name="parChTrans2D4">
+    <dgm:fillClrLst meth="repeat">
+      <a:schemeClr val="accent1"/>
+    </dgm:fillClrLst>
+    <dgm:linClrLst meth="repeat">
+      <a:schemeClr val="accent1"/>
+    </dgm:linClrLst>
+    <dgm:effectClrLst/>
+    <dgm:txLinClrLst/>
+    <dgm:txFillClrLst meth="repeat">
+      <a:schemeClr val="lt1"/>
+    </dgm:txFillClrLst>
+    <dgm:txEffectClrLst/>
+  </dgm:styleLbl>
+  <dgm:styleLbl name="parChTrans1D1">
+    <dgm:fillClrLst meth="repeat">
+      <a:schemeClr val="accent1"/>
+    </dgm:fillClrLst>
+    <dgm:linClrLst meth="repeat">
+      <a:schemeClr val="accent1">
+        <a:shade val="60000"/>
+      </a:schemeClr>
+    </dgm:linClrLst>
+    <dgm:effectClrLst/>
+    <dgm:txLinClrLst/>
+    <dgm:txFillClrLst meth="repeat">
+      <a:schemeClr val="tx1"/>
+    </dgm:txFillClrLst>
+    <dgm:txEffectClrLst/>
+  </dgm:styleLbl>
+  <dgm:styleLbl name="parChTrans1D2">
+    <dgm:fillClrLst meth="repeat">
+      <a:schemeClr val="accent1"/>
+    </dgm:fillClrLst>
+    <dgm:linClrLst meth="repeat">
+      <a:schemeClr val="accent1">
+        <a:shade val="60000"/>
+      </a:schemeClr>
+    </dgm:linClrLst>
+    <dgm:effectClrLst/>
+    <dgm:txLinClrLst/>
+    <dgm:txFillClrLst meth="repeat">
+      <a:schemeClr val="tx1"/>
+    </dgm:txFillClrLst>
+    <dgm:txEffectClrLst/>
+  </dgm:styleLbl>
+  <dgm:styleLbl name="parChTrans1D3">
+    <dgm:fillClrLst meth="repeat">
+      <a:schemeClr val="accent1"/>
+    </dgm:fillClrLst>
+    <dgm:linClrLst meth="repeat">
+      <a:schemeClr val="accent1">
+        <a:shade val="80000"/>
+      </a:schemeClr>
+    </dgm:linClrLst>
+    <dgm:effectClrLst/>
+    <dgm:txLinClrLst/>
+    <dgm:txFillClrLst meth="repeat">
+      <a:schemeClr val="tx1"/>
+    </dgm:txFillClrLst>
+    <dgm:txEffectClrLst/>
+  </dgm:styleLbl>
+  <dgm:styleLbl name="parChTrans1D4">
+    <dgm:fillClrLst meth="repeat">
+      <a:schemeClr val="accent1"/>
+    </dgm:fillClrLst>
+    <dgm:linClrLst meth="repeat">
+      <a:schemeClr val="accent1">
+        <a:shade val="80000"/>
+      </a:schemeClr>
+    </dgm:linClrLst>
+    <dgm:effectClrLst/>
+    <dgm:txLinClrLst/>
+    <dgm:txFillClrLst meth="repeat">
+      <a:schemeClr val="tx1"/>
+    </dgm:txFillClrLst>
+    <dgm:txEffectClrLst/>
+  </dgm:styleLbl>
+  <dgm:styleLbl name="fgAcc1">
+    <dgm:fillClrLst meth="repeat">
+      <a:schemeClr val="lt1">
+        <a:alpha val="90000"/>
+      </a:schemeClr>
+    </dgm:fillClrLst>
+    <dgm:linClrLst meth="repeat">
+      <a:schemeClr val="accent1"/>
+    </dgm:linClrLst>
+    <dgm:effectClrLst/>
+    <dgm:txLinClrLst/>
+    <dgm:txFillClrLst meth="repeat">
+      <a:schemeClr val="dk1"/>
+    </dgm:txFillClrLst>
+    <dgm:txEffectClrLst/>
+  </dgm:styleLbl>
+  <dgm:styleLbl name="conFgAcc1">
+    <dgm:fillClrLst meth="repeat">
+      <a:schemeClr val="lt1">
+        <a:alpha val="90000"/>
+      </a:schemeClr>
+    </dgm:fillClrLst>
+    <dgm:linClrLst meth="repeat">
+      <a:schemeClr val="accent1"/>
+    </dgm:linClrLst>
+    <dgm:effectClrLst/>
+    <dgm:txLinClrLst/>
+    <dgm:txFillClrLst meth="repeat">
+      <a:schemeClr val="dk1"/>
+    </dgm:txFillClrLst>
+    <dgm:txEffectClrLst/>
+  </dgm:styleLbl>
+  <dgm:styleLbl name="alignAcc1">
+    <dgm:fillClrLst meth="repeat">
+      <a:schemeClr val="lt1">
+        <a:alpha val="90000"/>
+      </a:schemeClr>
+    </dgm:fillClrLst>
+    <dgm:linClrLst meth="repeat">
+      <a:schemeClr val="accent1"/>
+    </dgm:linClrLst>
+    <dgm:effectClrLst/>
+    <dgm:txLinClrLst/>
+    <dgm:txFillClrLst meth="repeat">
+      <a:schemeClr val="dk1"/>
+    </dgm:txFillClrLst>
+    <dgm:txEffectClrLst/>
+  </dgm:styleLbl>
+  <dgm:styleLbl name="trAlignAcc1">
+    <dgm:fillClrLst meth="repeat">
+      <a:schemeClr val="lt1">
+        <a:alpha val="40000"/>
+      </a:schemeClr>
+    </dgm:fillClrLst>
+    <dgm:linClrLst meth="repeat">
+      <a:schemeClr val="accent1"/>
+    </dgm:linClrLst>
+    <dgm:effectClrLst/>
+    <dgm:txLinClrLst/>
+    <dgm:txFillClrLst meth="repeat">
+      <a:schemeClr val="dk1"/>
+    </dgm:txFillClrLst>
+    <dgm:txEffectClrLst/>
+  </dgm:styleLbl>
+  <dgm:styleLbl name="bgAcc1">
+    <dgm:fillClrLst meth="repeat">
+      <a:schemeClr val="lt1">
+        <a:alpha val="90000"/>
+      </a:schemeClr>
+    </dgm:fillClrLst>
+    <dgm:linClrLst meth="repeat">
+      <a:schemeClr val="accent1"/>
+    </dgm:linClrLst>
+    <dgm:effectClrLst/>
+    <dgm:txLinClrLst/>
+    <dgm:txFillClrLst meth="repeat">
+      <a:schemeClr val="dk1"/>
+    </dgm:txFillClrLst>
+    <dgm:txEffectClrLst/>
+  </dgm:styleLbl>
+  <dgm:styleLbl name="solidFgAcc1">
+    <dgm:fillClrLst meth="repeat">
+      <a:schemeClr val="lt1"/>
+    </dgm:fillClrLst>
+    <dgm:linClrLst meth="repeat">
+      <a:schemeClr val="accent1"/>
+    </dgm:linClrLst>
+    <dgm:effectClrLst/>
+    <dgm:txLinClrLst/>
+    <dgm:txFillClrLst meth="repeat">
+      <a:schemeClr val="dk1"/>
+    </dgm:txFillClrLst>
+    <dgm:txEffectClrLst/>
+  </dgm:styleLbl>
+  <dgm:styleLbl name="solidAlignAcc1">
+    <dgm:fillClrLst meth="repeat">
+      <a:schemeClr val="lt1"/>
+    </dgm:fillClrLst>
+    <dgm:linClrLst meth="repeat">
+      <a:schemeClr val="accent1"/>
+    </dgm:linClrLst>
+    <dgm:effectClrLst/>
+    <dgm:txLinClrLst/>
+    <dgm:txFillClrLst meth="repeat">
+      <a:schemeClr val="dk1"/>
+    </dgm:txFillClrLst>
+    <dgm:txEffectClrLst/>
+  </dgm:styleLbl>
+  <dgm:styleLbl name="solidBgAcc1">
+    <dgm:fillClrLst meth="repeat">
+      <a:schemeClr val="lt1"/>
+    </dgm:fillClrLst>
+    <dgm:linClrLst meth="repeat">
+      <a:schemeClr val="accent1"/>
+    </dgm:linClrLst>
+    <dgm:effectClrLst/>
+    <dgm:txLinClrLst/>
+    <dgm:txFillClrLst meth="repeat">
+      <a:schemeClr val="dk1"/>
+    </dgm:txFillClrLst>
+    <dgm:txEffectClrLst/>
+  </dgm:styleLbl>
+  <dgm:styleLbl name="fgAccFollowNode1">
+    <dgm:fillClrLst meth="repeat">
+      <a:schemeClr val="accent1">
+        <a:alpha val="90000"/>
+        <a:tint val="40000"/>
+      </a:schemeClr>
+    </dgm:fillClrLst>
+    <dgm:linClrLst meth="repeat">
+      <a:schemeClr val="accent1">
+        <a:alpha val="90000"/>
+        <a:tint val="40000"/>
+      </a:schemeClr>
+    </dgm:linClrLst>
+    <dgm:effectClrLst/>
+    <dgm:txLinClrLst/>
+    <dgm:txFillClrLst meth="repeat">
+      <a:schemeClr val="dk1"/>
+    </dgm:txFillClrLst>
+    <dgm:txEffectClrLst/>
+  </dgm:styleLbl>
+  <dgm:styleLbl name="alignAccFollowNode1">
+    <dgm:fillClrLst meth="repeat">
+      <a:schemeClr val="accent1">
+        <a:alpha val="90000"/>
+        <a:tint val="40000"/>
+      </a:schemeClr>
+    </dgm:fillClrLst>
+    <dgm:linClrLst meth="repeat">
+      <a:schemeClr val="accent1">
+        <a:alpha val="90000"/>
+        <a:tint val="40000"/>
+      </a:schemeClr>
+    </dgm:linClrLst>
+    <dgm:effectClrLst/>
+    <dgm:txLinClrLst/>
+    <dgm:txFillClrLst meth="repeat">
+      <a:schemeClr val="dk1"/>
+    </dgm:txFillClrLst>
+    <dgm:txEffectClrLst/>
+  </dgm:styleLbl>
+  <dgm:styleLbl name="bgAccFollowNode1">
+    <dgm:fillClrLst meth="repeat">
+      <a:schemeClr val="accent1">
+        <a:alpha val="90000"/>
+        <a:tint val="40000"/>
+      </a:schemeClr>
+    </dgm:fillClrLst>
+    <dgm:linClrLst meth="repeat">
+      <a:schemeClr val="accent1">
+        <a:alpha val="90000"/>
+        <a:tint val="40000"/>
+      </a:schemeClr>
+    </dgm:linClrLst>
+    <dgm:effectClrLst/>
+    <dgm:txLinClrLst/>
+    <dgm:txFillClrLst meth="repeat">
+      <a:schemeClr val="dk1"/>
+    </dgm:txFillClrLst>
+    <dgm:txEffectClrLst/>
+  </dgm:styleLbl>
+  <dgm:styleLbl name="fgAcc0">
+    <dgm:fillClrLst meth="repeat">
+      <a:schemeClr val="lt1">
+        <a:alpha val="90000"/>
+      </a:schemeClr>
+    </dgm:fillClrLst>
+    <dgm:linClrLst meth="repeat">
+      <a:schemeClr val="accent1"/>
+    </dgm:linClrLst>
+    <dgm:effectClrLst/>
+    <dgm:txLinClrLst/>
+    <dgm:txFillClrLst meth="repeat">
+      <a:schemeClr val="dk1"/>
+    </dgm:txFillClrLst>
+    <dgm:txEffectClrLst/>
+  </dgm:styleLbl>
+  <dgm:styleLbl name="fgAcc2">
+    <dgm:fillClrLst meth="repeat">
+      <a:schemeClr val="lt1">
+        <a:alpha val="90000"/>
+      </a:schemeClr>
+    </dgm:fillClrLst>
+    <dgm:linClrLst meth="repeat">
+      <a:schemeClr val="accent1"/>
+    </dgm:linClrLst>
+    <dgm:effectClrLst/>
+    <dgm:txLinClrLst/>
+    <dgm:txFillClrLst meth="repeat">
+      <a:schemeClr val="dk1"/>
+    </dgm:txFillClrLst>
+    <dgm:txEffectClrLst/>
+  </dgm:styleLbl>
+  <dgm:styleLbl name="fgAcc3">
+    <dgm:fillClrLst meth="repeat">
+      <a:schemeClr val="lt1">
+        <a:alpha val="90000"/>
+      </a:schemeClr>
+    </dgm:fillClrLst>
+    <dgm:linClrLst meth="repeat">
+      <a:schemeClr val="accent1"/>
+    </dgm:linClrLst>
+    <dgm:effectClrLst/>
+    <dgm:txLinClrLst/>
+    <dgm:txFillClrLst meth="repeat">
+      <a:schemeClr val="dk1"/>
+    </dgm:txFillClrLst>
+    <dgm:txEffectClrLst/>
+  </dgm:styleLbl>
+  <dgm:styleLbl name="fgAcc4">
+    <dgm:fillClrLst meth="repeat">
+      <a:schemeClr val="lt1">
+        <a:alpha val="90000"/>
+      </a:schemeClr>
+    </dgm:fillClrLst>
+    <dgm:linClrLst meth="repeat">
+      <a:schemeClr val="accent1"/>
+    </dgm:linClrLst>
+    <dgm:effectClrLst/>
+    <dgm:txLinClrLst/>
+    <dgm:txFillClrLst meth="repeat">
+      <a:schemeClr val="dk1"/>
+    </dgm:txFillClrLst>
+    <dgm:txEffectClrLst/>
+  </dgm:styleLbl>
+  <dgm:styleLbl name="bgShp">
+    <dgm:fillClrLst meth="repeat">
+      <a:schemeClr val="accent1">
+        <a:tint val="40000"/>
+      </a:schemeClr>
+    </dgm:fillClrLst>
+    <dgm:linClrLst meth="repeat">
+      <a:schemeClr val="accent1"/>
+    </dgm:linClrLst>
+    <dgm:effectClrLst/>
+    <dgm:txLinClrLst/>
+    <dgm:txFillClrLst meth="repeat">
+      <a:schemeClr val="dk1"/>
+    </dgm:txFillClrLst>
+    <dgm:txEffectClrLst/>
+  </dgm:styleLbl>
+  <dgm:styleLbl name="dkBgShp">
+    <dgm:fillClrLst meth="repeat">
+      <a:schemeClr val="accent1">
+        <a:shade val="80000"/>
+      </a:schemeClr>
+    </dgm:fillClrLst>
+    <dgm:linClrLst meth="repeat">
+      <a:schemeClr val="accent1"/>
+    </dgm:linClrLst>
+    <dgm:effectClrLst/>
+    <dgm:txLinClrLst/>
+    <dgm:txFillClrLst meth="repeat">
+      <a:schemeClr val="lt1"/>
+    </dgm:txFillClrLst>
+    <dgm:txEffectClrLst/>
+  </dgm:styleLbl>
+  <dgm:styleLbl name="trBgShp">
+    <dgm:fillClrLst meth="repeat">
+      <a:schemeClr val="accent1">
+        <a:tint val="50000"/>
+        <a:alpha val="40000"/>
+      </a:schemeClr>
+    </dgm:fillClrLst>
+    <dgm:linClrLst meth="repeat">
+      <a:schemeClr val="accent1"/>
+    </dgm:linClrLst>
+    <dgm:effectClrLst/>
+    <dgm:txLinClrLst/>
+    <dgm:txFillClrLst meth="repeat">
+      <a:schemeClr val="lt1"/>
+    </dgm:txFillClrLst>
+    <dgm:txEffectClrLst/>
+  </dgm:styleLbl>
+  <dgm:styleLbl name="fgShp">
+    <dgm:fillClrLst meth="repeat">
+      <a:schemeClr val="accent1">
+        <a:tint val="60000"/>
+      </a:schemeClr>
+    </dgm:fillClrLst>
+    <dgm:linClrLst meth="repeat">
+      <a:schemeClr val="lt1"/>
+    </dgm:linClrLst>
+    <dgm:effectClrLst/>
+    <dgm:txLinClrLst/>
+    <dgm:txFillClrLst meth="repeat">
+      <a:schemeClr val="dk1"/>
+    </dgm:txFillClrLst>
+    <dgm:txEffectClrLst/>
+  </dgm:styleLbl>
+  <dgm:styleLbl name="revTx">
+    <dgm:fillClrLst meth="repeat">
+      <a:schemeClr val="lt1">
+        <a:alpha val="0"/>
+      </a:schemeClr>
+    </dgm:fillClrLst>
+    <dgm:linClrLst meth="repeat">
+      <a:schemeClr val="dk1">
+        <a:alpha val="0"/>
+      </a:schemeClr>
+    </dgm:linClrLst>
+    <dgm:effectClrLst/>
+    <dgm:txLinClrLst/>
+    <dgm:txFillClrLst meth="repeat">
+      <a:schemeClr val="tx1"/>
+    </dgm:txFillClrLst>
+    <dgm:txEffectClrLst/>
+  </dgm:styleLbl>
+</dgm:colorsDef>
+</file>
+
+<file path=ppt/diagrams/colors3.xml><?xml version="1.0" encoding="utf-8"?>
 <dgm:colorsDef xmlns:dgm="http://schemas.openxmlformats.org/drawingml/2006/diagram" xmlns:a="http://schemas.openxmlformats.org/drawingml/2006/main" uniqueId="urn:microsoft.com/office/officeart/2005/8/colors/colorful2">
   <dgm:title val=""/>
   <dgm:desc val=""/>
@@ -1687,6 +2435,416 @@
 </file>
 
 <file path=ppt/diagrams/data1.xml><?xml version="1.0" encoding="utf-8"?>
+<dgm:dataModel xmlns:dgm="http://schemas.openxmlformats.org/drawingml/2006/diagram" xmlns:a="http://schemas.openxmlformats.org/drawingml/2006/main">
+  <dgm:ptLst>
+    <dgm:pt modelId="{F31716EB-9596-4887-B464-7DB006EDB068}" type="doc">
+      <dgm:prSet loTypeId="urn:microsoft.com/office/officeart/2005/8/layout/hierarchy1" loCatId="hierarchy" qsTypeId="urn:microsoft.com/office/officeart/2005/8/quickstyle/simple1" qsCatId="simple" csTypeId="urn:microsoft.com/office/officeart/2005/8/colors/accent1_2" csCatId="accent1" phldr="1"/>
+      <dgm:spPr/>
+      <dgm:t>
+        <a:bodyPr/>
+        <a:lstStyle/>
+        <a:p>
+          <a:endParaRPr lang="en-GB"/>
+        </a:p>
+      </dgm:t>
+    </dgm:pt>
+    <dgm:pt modelId="{94F5A134-B20A-4658-8680-22F4A314DD0B}">
+      <dgm:prSet phldrT="[Text]" custT="1"/>
+      <dgm:spPr/>
+      <dgm:t>
+        <a:bodyPr/>
+        <a:lstStyle/>
+        <a:p>
+          <a:r>
+            <a:rPr lang="en-GB" sz="1800" b="1" dirty="0" smtClean="0"/>
+            <a:t>Hariharan</a:t>
+          </a:r>
+        </a:p>
+        <a:p>
+          <a:r>
+            <a:rPr lang="en-GB" sz="1800" dirty="0" smtClean="0"/>
+            <a:t>(Head-IT &amp; Systems)</a:t>
+          </a:r>
+          <a:endParaRPr lang="en-GB" sz="1800" dirty="0"/>
+        </a:p>
+      </dgm:t>
+    </dgm:pt>
+    <dgm:pt modelId="{F67117DE-305D-4F3F-8B84-F1D15CC7605C}" type="parTrans" cxnId="{0727ED76-65E8-4C0B-B4A1-30187991B889}">
+      <dgm:prSet/>
+      <dgm:spPr/>
+      <dgm:t>
+        <a:bodyPr/>
+        <a:lstStyle/>
+        <a:p>
+          <a:endParaRPr lang="en-GB"/>
+        </a:p>
+      </dgm:t>
+    </dgm:pt>
+    <dgm:pt modelId="{D7D0E7DF-FC7B-404D-B832-09E2B376DE6F}" type="sibTrans" cxnId="{0727ED76-65E8-4C0B-B4A1-30187991B889}">
+      <dgm:prSet/>
+      <dgm:spPr/>
+      <dgm:t>
+        <a:bodyPr/>
+        <a:lstStyle/>
+        <a:p>
+          <a:endParaRPr lang="en-GB"/>
+        </a:p>
+      </dgm:t>
+    </dgm:pt>
+    <dgm:pt modelId="{AB67389D-89A0-4FC2-BF2C-43AEAE3C8C7E}">
+      <dgm:prSet phldrT="[Text]" custT="1"/>
+      <dgm:spPr/>
+      <dgm:t>
+        <a:bodyPr/>
+        <a:lstStyle/>
+        <a:p>
+          <a:r>
+            <a:rPr lang="en-GB" sz="1800" b="1" dirty="0" smtClean="0"/>
+            <a:t>Dhirendra Singh</a:t>
+          </a:r>
+        </a:p>
+        <a:p>
+          <a:r>
+            <a:rPr lang="en-GB" sz="1800" dirty="0" smtClean="0"/>
+            <a:t>(IT Facilities &amp; Support)</a:t>
+          </a:r>
+          <a:endParaRPr lang="en-GB" sz="1800" dirty="0"/>
+        </a:p>
+      </dgm:t>
+    </dgm:pt>
+    <dgm:pt modelId="{BD34DFC3-306C-49C4-8850-DBB905ECB0DA}" type="parTrans" cxnId="{BFD97CB9-EE28-449F-94CB-D389477F71DB}">
+      <dgm:prSet/>
+      <dgm:spPr/>
+      <dgm:t>
+        <a:bodyPr/>
+        <a:lstStyle/>
+        <a:p>
+          <a:endParaRPr lang="en-GB"/>
+        </a:p>
+      </dgm:t>
+    </dgm:pt>
+    <dgm:pt modelId="{F91DF16D-7DDD-40B0-BE13-9FF770B7FB52}" type="sibTrans" cxnId="{BFD97CB9-EE28-449F-94CB-D389477F71DB}">
+      <dgm:prSet/>
+      <dgm:spPr/>
+      <dgm:t>
+        <a:bodyPr/>
+        <a:lstStyle/>
+        <a:p>
+          <a:endParaRPr lang="en-GB"/>
+        </a:p>
+      </dgm:t>
+    </dgm:pt>
+    <dgm:pt modelId="{A9013CE1-9A40-476E-85D2-FA769B01A6AF}">
+      <dgm:prSet phldrT="[Text]" custT="1"/>
+      <dgm:spPr/>
+      <dgm:t>
+        <a:bodyPr/>
+        <a:lstStyle/>
+        <a:p>
+          <a:r>
+            <a:rPr lang="en-GB" sz="1800" b="1" dirty="0" smtClean="0"/>
+            <a:t>Lalit Gupta</a:t>
+          </a:r>
+        </a:p>
+        <a:p>
+          <a:r>
+            <a:rPr lang="en-GB" sz="1800" dirty="0" smtClean="0"/>
+            <a:t>(HR, Engineering Applications)</a:t>
+          </a:r>
+          <a:endParaRPr lang="en-GB" sz="1800" dirty="0"/>
+        </a:p>
+      </dgm:t>
+    </dgm:pt>
+    <dgm:pt modelId="{36DF3533-93C4-40FE-B373-4E77AFD498F2}" type="parTrans" cxnId="{5CDFEABC-A73A-4C13-9D2D-C5371C5922F3}">
+      <dgm:prSet/>
+      <dgm:spPr/>
+      <dgm:t>
+        <a:bodyPr/>
+        <a:lstStyle/>
+        <a:p>
+          <a:endParaRPr lang="en-GB"/>
+        </a:p>
+      </dgm:t>
+    </dgm:pt>
+    <dgm:pt modelId="{3E7D1108-CB5E-4ED8-9570-4FA5D1AE69F2}" type="sibTrans" cxnId="{5CDFEABC-A73A-4C13-9D2D-C5371C5922F3}">
+      <dgm:prSet/>
+      <dgm:spPr/>
+      <dgm:t>
+        <a:bodyPr/>
+        <a:lstStyle/>
+        <a:p>
+          <a:endParaRPr lang="en-GB"/>
+        </a:p>
+      </dgm:t>
+    </dgm:pt>
+    <dgm:pt modelId="{673D36DB-6E7C-41A1-B23A-9C9BD0787B8D}">
+      <dgm:prSet phldrT="[Text]" custT="1"/>
+      <dgm:spPr/>
+      <dgm:t>
+        <a:bodyPr/>
+        <a:lstStyle/>
+        <a:p>
+          <a:r>
+            <a:rPr lang="en-GB" sz="1800" b="1" dirty="0" smtClean="0"/>
+            <a:t>Veena</a:t>
+          </a:r>
+        </a:p>
+        <a:p>
+          <a:r>
+            <a:rPr lang="en-GB" sz="1800" dirty="0" smtClean="0"/>
+            <a:t>(ERP Applications)</a:t>
+          </a:r>
+          <a:endParaRPr lang="en-GB" sz="1800" dirty="0"/>
+        </a:p>
+      </dgm:t>
+    </dgm:pt>
+    <dgm:pt modelId="{787815C3-6FFA-4DE3-9216-ACF62EA19EDB}" type="parTrans" cxnId="{267EEC34-4A3A-4280-AB88-AB9522D73CDA}">
+      <dgm:prSet/>
+      <dgm:spPr/>
+      <dgm:t>
+        <a:bodyPr/>
+        <a:lstStyle/>
+        <a:p>
+          <a:endParaRPr lang="en-GB"/>
+        </a:p>
+      </dgm:t>
+    </dgm:pt>
+    <dgm:pt modelId="{00A41312-615C-475E-8D96-9806A8F04B97}" type="sibTrans" cxnId="{267EEC34-4A3A-4280-AB88-AB9522D73CDA}">
+      <dgm:prSet/>
+      <dgm:spPr/>
+      <dgm:t>
+        <a:bodyPr/>
+        <a:lstStyle/>
+        <a:p>
+          <a:endParaRPr lang="en-GB"/>
+        </a:p>
+      </dgm:t>
+    </dgm:pt>
+    <dgm:pt modelId="{855F5962-D0E3-4D1E-BA25-19A7188A6F57}" type="pres">
+      <dgm:prSet presAssocID="{F31716EB-9596-4887-B464-7DB006EDB068}" presName="hierChild1" presStyleCnt="0">
+        <dgm:presLayoutVars>
+          <dgm:chPref val="1"/>
+          <dgm:dir/>
+          <dgm:animOne val="branch"/>
+          <dgm:animLvl val="lvl"/>
+          <dgm:resizeHandles/>
+        </dgm:presLayoutVars>
+      </dgm:prSet>
+      <dgm:spPr/>
+      <dgm:t>
+        <a:bodyPr/>
+        <a:lstStyle/>
+        <a:p>
+          <a:endParaRPr lang="en-GB"/>
+        </a:p>
+      </dgm:t>
+    </dgm:pt>
+    <dgm:pt modelId="{F95FBEFE-E229-41F4-9F58-25D87539366F}" type="pres">
+      <dgm:prSet presAssocID="{94F5A134-B20A-4658-8680-22F4A314DD0B}" presName="hierRoot1" presStyleCnt="0"/>
+      <dgm:spPr/>
+    </dgm:pt>
+    <dgm:pt modelId="{FF786397-04FC-43DD-B7EE-B3943A46C920}" type="pres">
+      <dgm:prSet presAssocID="{94F5A134-B20A-4658-8680-22F4A314DD0B}" presName="composite" presStyleCnt="0"/>
+      <dgm:spPr/>
+    </dgm:pt>
+    <dgm:pt modelId="{740C5C29-9641-470A-8CF1-98DCF1E70D25}" type="pres">
+      <dgm:prSet presAssocID="{94F5A134-B20A-4658-8680-22F4A314DD0B}" presName="background" presStyleLbl="node0" presStyleIdx="0" presStyleCnt="1"/>
+      <dgm:spPr/>
+    </dgm:pt>
+    <dgm:pt modelId="{26243D0F-49E9-4624-B9D1-DA584AED8B03}" type="pres">
+      <dgm:prSet presAssocID="{94F5A134-B20A-4658-8680-22F4A314DD0B}" presName="text" presStyleLbl="fgAcc0" presStyleIdx="0" presStyleCnt="1" custScaleX="142245">
+        <dgm:presLayoutVars>
+          <dgm:chPref val="3"/>
+        </dgm:presLayoutVars>
+      </dgm:prSet>
+      <dgm:spPr/>
+      <dgm:t>
+        <a:bodyPr/>
+        <a:lstStyle/>
+        <a:p>
+          <a:endParaRPr lang="en-GB"/>
+        </a:p>
+      </dgm:t>
+    </dgm:pt>
+    <dgm:pt modelId="{DC288CCA-5151-4A8A-827C-AE5AB0922800}" type="pres">
+      <dgm:prSet presAssocID="{94F5A134-B20A-4658-8680-22F4A314DD0B}" presName="hierChild2" presStyleCnt="0"/>
+      <dgm:spPr/>
+    </dgm:pt>
+    <dgm:pt modelId="{60EDBC92-32A1-49F9-94E9-7483DDE7E40B}" type="pres">
+      <dgm:prSet presAssocID="{BD34DFC3-306C-49C4-8850-DBB905ECB0DA}" presName="Name10" presStyleLbl="parChTrans1D2" presStyleIdx="0" presStyleCnt="3"/>
+      <dgm:spPr/>
+      <dgm:t>
+        <a:bodyPr/>
+        <a:lstStyle/>
+        <a:p>
+          <a:endParaRPr lang="en-GB"/>
+        </a:p>
+      </dgm:t>
+    </dgm:pt>
+    <dgm:pt modelId="{784B2152-333D-45E1-8B1E-20B4CB2E25FC}" type="pres">
+      <dgm:prSet presAssocID="{AB67389D-89A0-4FC2-BF2C-43AEAE3C8C7E}" presName="hierRoot2" presStyleCnt="0"/>
+      <dgm:spPr/>
+    </dgm:pt>
+    <dgm:pt modelId="{D5A2DD7C-2287-4D45-81D5-691AF7868779}" type="pres">
+      <dgm:prSet presAssocID="{AB67389D-89A0-4FC2-BF2C-43AEAE3C8C7E}" presName="composite2" presStyleCnt="0"/>
+      <dgm:spPr/>
+    </dgm:pt>
+    <dgm:pt modelId="{55A5E781-0B7B-412D-A76A-DE507C15BC6C}" type="pres">
+      <dgm:prSet presAssocID="{AB67389D-89A0-4FC2-BF2C-43AEAE3C8C7E}" presName="background2" presStyleLbl="node2" presStyleIdx="0" presStyleCnt="3"/>
+      <dgm:spPr/>
+    </dgm:pt>
+    <dgm:pt modelId="{EC5F7CD7-92BD-4380-AF1B-AB0D2D7DB8B2}" type="pres">
+      <dgm:prSet presAssocID="{AB67389D-89A0-4FC2-BF2C-43AEAE3C8C7E}" presName="text2" presStyleLbl="fgAcc2" presStyleIdx="0" presStyleCnt="3" custScaleX="117462">
+        <dgm:presLayoutVars>
+          <dgm:chPref val="3"/>
+        </dgm:presLayoutVars>
+      </dgm:prSet>
+      <dgm:spPr/>
+      <dgm:t>
+        <a:bodyPr/>
+        <a:lstStyle/>
+        <a:p>
+          <a:endParaRPr lang="en-GB"/>
+        </a:p>
+      </dgm:t>
+    </dgm:pt>
+    <dgm:pt modelId="{855E306D-A0D6-4784-BDD9-681D864FA3C1}" type="pres">
+      <dgm:prSet presAssocID="{AB67389D-89A0-4FC2-BF2C-43AEAE3C8C7E}" presName="hierChild3" presStyleCnt="0"/>
+      <dgm:spPr/>
+    </dgm:pt>
+    <dgm:pt modelId="{2309E421-38BA-4FB4-88C8-EC230A63CD48}" type="pres">
+      <dgm:prSet presAssocID="{36DF3533-93C4-40FE-B373-4E77AFD498F2}" presName="Name10" presStyleLbl="parChTrans1D2" presStyleIdx="1" presStyleCnt="3"/>
+      <dgm:spPr/>
+      <dgm:t>
+        <a:bodyPr/>
+        <a:lstStyle/>
+        <a:p>
+          <a:endParaRPr lang="en-GB"/>
+        </a:p>
+      </dgm:t>
+    </dgm:pt>
+    <dgm:pt modelId="{1553F5EE-055A-483A-8097-84978D6D5335}" type="pres">
+      <dgm:prSet presAssocID="{A9013CE1-9A40-476E-85D2-FA769B01A6AF}" presName="hierRoot2" presStyleCnt="0"/>
+      <dgm:spPr/>
+    </dgm:pt>
+    <dgm:pt modelId="{EB3F8F48-1DF5-4DC6-AAE2-68E7DB803A88}" type="pres">
+      <dgm:prSet presAssocID="{A9013CE1-9A40-476E-85D2-FA769B01A6AF}" presName="composite2" presStyleCnt="0"/>
+      <dgm:spPr/>
+    </dgm:pt>
+    <dgm:pt modelId="{2517B15E-F8A3-4B0D-84C6-9ADF1836C397}" type="pres">
+      <dgm:prSet presAssocID="{A9013CE1-9A40-476E-85D2-FA769B01A6AF}" presName="background2" presStyleLbl="node2" presStyleIdx="1" presStyleCnt="3"/>
+      <dgm:spPr/>
+    </dgm:pt>
+    <dgm:pt modelId="{54CDEA14-F245-48F4-9832-125065A01019}" type="pres">
+      <dgm:prSet presAssocID="{A9013CE1-9A40-476E-85D2-FA769B01A6AF}" presName="text2" presStyleLbl="fgAcc2" presStyleIdx="1" presStyleCnt="3" custScaleX="116900">
+        <dgm:presLayoutVars>
+          <dgm:chPref val="3"/>
+        </dgm:presLayoutVars>
+      </dgm:prSet>
+      <dgm:spPr/>
+      <dgm:t>
+        <a:bodyPr/>
+        <a:lstStyle/>
+        <a:p>
+          <a:endParaRPr lang="en-GB"/>
+        </a:p>
+      </dgm:t>
+    </dgm:pt>
+    <dgm:pt modelId="{6D7175A8-8A47-432E-9EDE-D72145730742}" type="pres">
+      <dgm:prSet presAssocID="{A9013CE1-9A40-476E-85D2-FA769B01A6AF}" presName="hierChild3" presStyleCnt="0"/>
+      <dgm:spPr/>
+    </dgm:pt>
+    <dgm:pt modelId="{A540D9FD-1B12-42A2-AA38-93A542AF12D5}" type="pres">
+      <dgm:prSet presAssocID="{787815C3-6FFA-4DE3-9216-ACF62EA19EDB}" presName="Name10" presStyleLbl="parChTrans1D2" presStyleIdx="2" presStyleCnt="3"/>
+      <dgm:spPr/>
+      <dgm:t>
+        <a:bodyPr/>
+        <a:lstStyle/>
+        <a:p>
+          <a:endParaRPr lang="en-GB"/>
+        </a:p>
+      </dgm:t>
+    </dgm:pt>
+    <dgm:pt modelId="{7A71156C-3AAB-40AA-8652-836AC97AD70D}" type="pres">
+      <dgm:prSet presAssocID="{673D36DB-6E7C-41A1-B23A-9C9BD0787B8D}" presName="hierRoot2" presStyleCnt="0"/>
+      <dgm:spPr/>
+    </dgm:pt>
+    <dgm:pt modelId="{17315DFF-3069-4F2C-947E-33189B3238B3}" type="pres">
+      <dgm:prSet presAssocID="{673D36DB-6E7C-41A1-B23A-9C9BD0787B8D}" presName="composite2" presStyleCnt="0"/>
+      <dgm:spPr/>
+    </dgm:pt>
+    <dgm:pt modelId="{277DCC10-3C4C-4DBB-8FF7-241E4E11B661}" type="pres">
+      <dgm:prSet presAssocID="{673D36DB-6E7C-41A1-B23A-9C9BD0787B8D}" presName="background2" presStyleLbl="node2" presStyleIdx="2" presStyleCnt="3"/>
+      <dgm:spPr/>
+    </dgm:pt>
+    <dgm:pt modelId="{5374055F-39FB-40D0-A07F-66B5102D7CE2}" type="pres">
+      <dgm:prSet presAssocID="{673D36DB-6E7C-41A1-B23A-9C9BD0787B8D}" presName="text2" presStyleLbl="fgAcc2" presStyleIdx="2" presStyleCnt="3" custScaleX="120227">
+        <dgm:presLayoutVars>
+          <dgm:chPref val="3"/>
+        </dgm:presLayoutVars>
+      </dgm:prSet>
+      <dgm:spPr/>
+      <dgm:t>
+        <a:bodyPr/>
+        <a:lstStyle/>
+        <a:p>
+          <a:endParaRPr lang="en-GB"/>
+        </a:p>
+      </dgm:t>
+    </dgm:pt>
+    <dgm:pt modelId="{40C3AE53-E536-4348-A854-D334C1140080}" type="pres">
+      <dgm:prSet presAssocID="{673D36DB-6E7C-41A1-B23A-9C9BD0787B8D}" presName="hierChild3" presStyleCnt="0"/>
+      <dgm:spPr/>
+    </dgm:pt>
+  </dgm:ptLst>
+  <dgm:cxnLst>
+    <dgm:cxn modelId="{AE02FC06-C79C-4F23-BD90-0EAD6DFB5367}" type="presOf" srcId="{AB67389D-89A0-4FC2-BF2C-43AEAE3C8C7E}" destId="{EC5F7CD7-92BD-4380-AF1B-AB0D2D7DB8B2}" srcOrd="0" destOrd="0" presId="urn:microsoft.com/office/officeart/2005/8/layout/hierarchy1"/>
+    <dgm:cxn modelId="{D6FBDEFC-867E-4043-9F8B-BE2F4C9B22CE}" type="presOf" srcId="{673D36DB-6E7C-41A1-B23A-9C9BD0787B8D}" destId="{5374055F-39FB-40D0-A07F-66B5102D7CE2}" srcOrd="0" destOrd="0" presId="urn:microsoft.com/office/officeart/2005/8/layout/hierarchy1"/>
+    <dgm:cxn modelId="{5CDFEABC-A73A-4C13-9D2D-C5371C5922F3}" srcId="{94F5A134-B20A-4658-8680-22F4A314DD0B}" destId="{A9013CE1-9A40-476E-85D2-FA769B01A6AF}" srcOrd="1" destOrd="0" parTransId="{36DF3533-93C4-40FE-B373-4E77AFD498F2}" sibTransId="{3E7D1108-CB5E-4ED8-9570-4FA5D1AE69F2}"/>
+    <dgm:cxn modelId="{81CEDFBF-1466-4514-9C89-9D3BDF3CA039}" type="presOf" srcId="{F31716EB-9596-4887-B464-7DB006EDB068}" destId="{855F5962-D0E3-4D1E-BA25-19A7188A6F57}" srcOrd="0" destOrd="0" presId="urn:microsoft.com/office/officeart/2005/8/layout/hierarchy1"/>
+    <dgm:cxn modelId="{0727ED76-65E8-4C0B-B4A1-30187991B889}" srcId="{F31716EB-9596-4887-B464-7DB006EDB068}" destId="{94F5A134-B20A-4658-8680-22F4A314DD0B}" srcOrd="0" destOrd="0" parTransId="{F67117DE-305D-4F3F-8B84-F1D15CC7605C}" sibTransId="{D7D0E7DF-FC7B-404D-B832-09E2B376DE6F}"/>
+    <dgm:cxn modelId="{50F64EAB-7259-407B-8996-04B3B643E88C}" type="presOf" srcId="{A9013CE1-9A40-476E-85D2-FA769B01A6AF}" destId="{54CDEA14-F245-48F4-9832-125065A01019}" srcOrd="0" destOrd="0" presId="urn:microsoft.com/office/officeart/2005/8/layout/hierarchy1"/>
+    <dgm:cxn modelId="{93C7B14D-F508-4B3C-A1D0-C0C083DFD829}" type="presOf" srcId="{94F5A134-B20A-4658-8680-22F4A314DD0B}" destId="{26243D0F-49E9-4624-B9D1-DA584AED8B03}" srcOrd="0" destOrd="0" presId="urn:microsoft.com/office/officeart/2005/8/layout/hierarchy1"/>
+    <dgm:cxn modelId="{533017FD-C039-4FEF-8C28-793E54A6742D}" type="presOf" srcId="{787815C3-6FFA-4DE3-9216-ACF62EA19EDB}" destId="{A540D9FD-1B12-42A2-AA38-93A542AF12D5}" srcOrd="0" destOrd="0" presId="urn:microsoft.com/office/officeart/2005/8/layout/hierarchy1"/>
+    <dgm:cxn modelId="{7C4A59AA-A96E-48CF-8C9E-28D5FF143CF7}" type="presOf" srcId="{BD34DFC3-306C-49C4-8850-DBB905ECB0DA}" destId="{60EDBC92-32A1-49F9-94E9-7483DDE7E40B}" srcOrd="0" destOrd="0" presId="urn:microsoft.com/office/officeart/2005/8/layout/hierarchy1"/>
+    <dgm:cxn modelId="{8C9C462F-FE55-4F26-8673-F06A520FBE0C}" type="presOf" srcId="{36DF3533-93C4-40FE-B373-4E77AFD498F2}" destId="{2309E421-38BA-4FB4-88C8-EC230A63CD48}" srcOrd="0" destOrd="0" presId="urn:microsoft.com/office/officeart/2005/8/layout/hierarchy1"/>
+    <dgm:cxn modelId="{267EEC34-4A3A-4280-AB88-AB9522D73CDA}" srcId="{94F5A134-B20A-4658-8680-22F4A314DD0B}" destId="{673D36DB-6E7C-41A1-B23A-9C9BD0787B8D}" srcOrd="2" destOrd="0" parTransId="{787815C3-6FFA-4DE3-9216-ACF62EA19EDB}" sibTransId="{00A41312-615C-475E-8D96-9806A8F04B97}"/>
+    <dgm:cxn modelId="{BFD97CB9-EE28-449F-94CB-D389477F71DB}" srcId="{94F5A134-B20A-4658-8680-22F4A314DD0B}" destId="{AB67389D-89A0-4FC2-BF2C-43AEAE3C8C7E}" srcOrd="0" destOrd="0" parTransId="{BD34DFC3-306C-49C4-8850-DBB905ECB0DA}" sibTransId="{F91DF16D-7DDD-40B0-BE13-9FF770B7FB52}"/>
+    <dgm:cxn modelId="{682881E6-98BD-4E29-9F3B-84ADDCEFD9E9}" type="presParOf" srcId="{855F5962-D0E3-4D1E-BA25-19A7188A6F57}" destId="{F95FBEFE-E229-41F4-9F58-25D87539366F}" srcOrd="0" destOrd="0" presId="urn:microsoft.com/office/officeart/2005/8/layout/hierarchy1"/>
+    <dgm:cxn modelId="{CA12A609-7200-411B-830F-B6EF80C336F7}" type="presParOf" srcId="{F95FBEFE-E229-41F4-9F58-25D87539366F}" destId="{FF786397-04FC-43DD-B7EE-B3943A46C920}" srcOrd="0" destOrd="0" presId="urn:microsoft.com/office/officeart/2005/8/layout/hierarchy1"/>
+    <dgm:cxn modelId="{4D105133-5AEE-4297-9A59-38B3E963B47B}" type="presParOf" srcId="{FF786397-04FC-43DD-B7EE-B3943A46C920}" destId="{740C5C29-9641-470A-8CF1-98DCF1E70D25}" srcOrd="0" destOrd="0" presId="urn:microsoft.com/office/officeart/2005/8/layout/hierarchy1"/>
+    <dgm:cxn modelId="{68B93F3A-64F4-48E1-8B7B-A18F2BECABE3}" type="presParOf" srcId="{FF786397-04FC-43DD-B7EE-B3943A46C920}" destId="{26243D0F-49E9-4624-B9D1-DA584AED8B03}" srcOrd="1" destOrd="0" presId="urn:microsoft.com/office/officeart/2005/8/layout/hierarchy1"/>
+    <dgm:cxn modelId="{40AA4635-06A4-4E28-B296-26AA28E4C3C0}" type="presParOf" srcId="{F95FBEFE-E229-41F4-9F58-25D87539366F}" destId="{DC288CCA-5151-4A8A-827C-AE5AB0922800}" srcOrd="1" destOrd="0" presId="urn:microsoft.com/office/officeart/2005/8/layout/hierarchy1"/>
+    <dgm:cxn modelId="{F6875512-E73F-4D81-8D51-3221DEF970B2}" type="presParOf" srcId="{DC288CCA-5151-4A8A-827C-AE5AB0922800}" destId="{60EDBC92-32A1-49F9-94E9-7483DDE7E40B}" srcOrd="0" destOrd="0" presId="urn:microsoft.com/office/officeart/2005/8/layout/hierarchy1"/>
+    <dgm:cxn modelId="{D9E591AF-D539-4006-9625-76B4F163E778}" type="presParOf" srcId="{DC288CCA-5151-4A8A-827C-AE5AB0922800}" destId="{784B2152-333D-45E1-8B1E-20B4CB2E25FC}" srcOrd="1" destOrd="0" presId="urn:microsoft.com/office/officeart/2005/8/layout/hierarchy1"/>
+    <dgm:cxn modelId="{D1D7EF89-4AAC-4D3E-B5AD-46AD2EAA3083}" type="presParOf" srcId="{784B2152-333D-45E1-8B1E-20B4CB2E25FC}" destId="{D5A2DD7C-2287-4D45-81D5-691AF7868779}" srcOrd="0" destOrd="0" presId="urn:microsoft.com/office/officeart/2005/8/layout/hierarchy1"/>
+    <dgm:cxn modelId="{165B4C9E-85AF-4BA2-B7BA-01E383048EB1}" type="presParOf" srcId="{D5A2DD7C-2287-4D45-81D5-691AF7868779}" destId="{55A5E781-0B7B-412D-A76A-DE507C15BC6C}" srcOrd="0" destOrd="0" presId="urn:microsoft.com/office/officeart/2005/8/layout/hierarchy1"/>
+    <dgm:cxn modelId="{F7561543-91E5-499D-BF69-704867184707}" type="presParOf" srcId="{D5A2DD7C-2287-4D45-81D5-691AF7868779}" destId="{EC5F7CD7-92BD-4380-AF1B-AB0D2D7DB8B2}" srcOrd="1" destOrd="0" presId="urn:microsoft.com/office/officeart/2005/8/layout/hierarchy1"/>
+    <dgm:cxn modelId="{CEE57DF0-F0D1-43C3-BB22-1DC18C2E176D}" type="presParOf" srcId="{784B2152-333D-45E1-8B1E-20B4CB2E25FC}" destId="{855E306D-A0D6-4784-BDD9-681D864FA3C1}" srcOrd="1" destOrd="0" presId="urn:microsoft.com/office/officeart/2005/8/layout/hierarchy1"/>
+    <dgm:cxn modelId="{C779C6E5-4A96-465F-BC7C-3AD9956F7759}" type="presParOf" srcId="{DC288CCA-5151-4A8A-827C-AE5AB0922800}" destId="{2309E421-38BA-4FB4-88C8-EC230A63CD48}" srcOrd="2" destOrd="0" presId="urn:microsoft.com/office/officeart/2005/8/layout/hierarchy1"/>
+    <dgm:cxn modelId="{98ACAD3D-56EE-4EAB-B831-D22970A21C96}" type="presParOf" srcId="{DC288CCA-5151-4A8A-827C-AE5AB0922800}" destId="{1553F5EE-055A-483A-8097-84978D6D5335}" srcOrd="3" destOrd="0" presId="urn:microsoft.com/office/officeart/2005/8/layout/hierarchy1"/>
+    <dgm:cxn modelId="{34ADCA6C-44B3-4DB9-B0B9-87E9702CEF6F}" type="presParOf" srcId="{1553F5EE-055A-483A-8097-84978D6D5335}" destId="{EB3F8F48-1DF5-4DC6-AAE2-68E7DB803A88}" srcOrd="0" destOrd="0" presId="urn:microsoft.com/office/officeart/2005/8/layout/hierarchy1"/>
+    <dgm:cxn modelId="{31872028-7A89-4E75-92FE-AC6F3000AC78}" type="presParOf" srcId="{EB3F8F48-1DF5-4DC6-AAE2-68E7DB803A88}" destId="{2517B15E-F8A3-4B0D-84C6-9ADF1836C397}" srcOrd="0" destOrd="0" presId="urn:microsoft.com/office/officeart/2005/8/layout/hierarchy1"/>
+    <dgm:cxn modelId="{B9131197-CAC4-47E6-9710-5E9B95C5D3E3}" type="presParOf" srcId="{EB3F8F48-1DF5-4DC6-AAE2-68E7DB803A88}" destId="{54CDEA14-F245-48F4-9832-125065A01019}" srcOrd="1" destOrd="0" presId="urn:microsoft.com/office/officeart/2005/8/layout/hierarchy1"/>
+    <dgm:cxn modelId="{28D97715-F5EF-43FC-B67F-A42D5E33A38B}" type="presParOf" srcId="{1553F5EE-055A-483A-8097-84978D6D5335}" destId="{6D7175A8-8A47-432E-9EDE-D72145730742}" srcOrd="1" destOrd="0" presId="urn:microsoft.com/office/officeart/2005/8/layout/hierarchy1"/>
+    <dgm:cxn modelId="{DF088704-A693-4181-BAD0-64D33AF18239}" type="presParOf" srcId="{DC288CCA-5151-4A8A-827C-AE5AB0922800}" destId="{A540D9FD-1B12-42A2-AA38-93A542AF12D5}" srcOrd="4" destOrd="0" presId="urn:microsoft.com/office/officeart/2005/8/layout/hierarchy1"/>
+    <dgm:cxn modelId="{AD775479-8431-403E-A6F9-CE30F813B732}" type="presParOf" srcId="{DC288CCA-5151-4A8A-827C-AE5AB0922800}" destId="{7A71156C-3AAB-40AA-8652-836AC97AD70D}" srcOrd="5" destOrd="0" presId="urn:microsoft.com/office/officeart/2005/8/layout/hierarchy1"/>
+    <dgm:cxn modelId="{CEEFE7E5-F61B-41CD-8776-B702480809B4}" type="presParOf" srcId="{7A71156C-3AAB-40AA-8652-836AC97AD70D}" destId="{17315DFF-3069-4F2C-947E-33189B3238B3}" srcOrd="0" destOrd="0" presId="urn:microsoft.com/office/officeart/2005/8/layout/hierarchy1"/>
+    <dgm:cxn modelId="{A9D0C82B-CCDD-4D9E-A169-4294F72A54A5}" type="presParOf" srcId="{17315DFF-3069-4F2C-947E-33189B3238B3}" destId="{277DCC10-3C4C-4DBB-8FF7-241E4E11B661}" srcOrd="0" destOrd="0" presId="urn:microsoft.com/office/officeart/2005/8/layout/hierarchy1"/>
+    <dgm:cxn modelId="{FD782C10-057C-4808-AA24-8DE8E831D9FA}" type="presParOf" srcId="{17315DFF-3069-4F2C-947E-33189B3238B3}" destId="{5374055F-39FB-40D0-A07F-66B5102D7CE2}" srcOrd="1" destOrd="0" presId="urn:microsoft.com/office/officeart/2005/8/layout/hierarchy1"/>
+    <dgm:cxn modelId="{E19CAA51-454C-4F2F-91F6-1E79108FD85E}" type="presParOf" srcId="{7A71156C-3AAB-40AA-8652-836AC97AD70D}" destId="{40C3AE53-E536-4348-A854-D334C1140080}" srcOrd="1" destOrd="0" presId="urn:microsoft.com/office/officeart/2005/8/layout/hierarchy1"/>
+  </dgm:cxnLst>
+  <dgm:bg/>
+  <dgm:whole/>
+  <dgm:extLst>
+    <a:ext uri="http://schemas.microsoft.com/office/drawing/2008/diagram">
+      <dsp:dataModelExt xmlns:dsp="http://schemas.microsoft.com/office/drawing/2008/diagram" relId="rId7" minVer="http://schemas.openxmlformats.org/drawingml/2006/diagram"/>
+    </a:ext>
+  </dgm:extLst>
+</dgm:dataModel>
+</file>
+
+<file path=ppt/diagrams/data2.xml><?xml version="1.0" encoding="utf-8"?>
 <dgm:dataModel xmlns:dgm="http://schemas.openxmlformats.org/drawingml/2006/diagram" xmlns:a="http://schemas.openxmlformats.org/drawingml/2006/main">
   <dgm:ptLst>
     <dgm:pt modelId="{A7C8040A-4875-4FD0-910C-882566E3BA1E}" type="doc">
@@ -1973,6 +3131,13 @@
         </dgm:presLayoutVars>
       </dgm:prSet>
       <dgm:spPr/>
+      <dgm:t>
+        <a:bodyPr/>
+        <a:lstStyle/>
+        <a:p>
+          <a:endParaRPr lang="en-GB"/>
+        </a:p>
+      </dgm:t>
     </dgm:pt>
     <dgm:pt modelId="{4324D937-436E-4B5D-A3FD-A55361CF3EC7}" type="pres">
       <dgm:prSet presAssocID="{E7E9E394-9504-4980-88EB-66A662B0F111}" presName="composite" presStyleCnt="0"/>
@@ -1987,6 +3152,13 @@
         </dgm:presLayoutVars>
       </dgm:prSet>
       <dgm:spPr/>
+      <dgm:t>
+        <a:bodyPr/>
+        <a:lstStyle/>
+        <a:p>
+          <a:endParaRPr lang="en-GB"/>
+        </a:p>
+      </dgm:t>
     </dgm:pt>
     <dgm:pt modelId="{AD6F1B2D-9BAB-4A86-A520-F9BBFB5675B4}" type="pres">
       <dgm:prSet presAssocID="{E7E9E394-9504-4980-88EB-66A662B0F111}" presName="Childtext1" presStyleLbl="revTx" presStyleIdx="0" presStyleCnt="4">
@@ -1997,6 +3169,13 @@
         </dgm:presLayoutVars>
       </dgm:prSet>
       <dgm:spPr/>
+      <dgm:t>
+        <a:bodyPr/>
+        <a:lstStyle/>
+        <a:p>
+          <a:endParaRPr lang="en-GB"/>
+        </a:p>
+      </dgm:t>
     </dgm:pt>
     <dgm:pt modelId="{B47B2832-736A-4F97-BBC4-569E1B026F4D}" type="pres">
       <dgm:prSet presAssocID="{E7E9E394-9504-4980-88EB-66A662B0F111}" presName="BalanceSpacing" presStyleCnt="0"/>
@@ -2034,6 +3213,13 @@
         </dgm:presLayoutVars>
       </dgm:prSet>
       <dgm:spPr/>
+      <dgm:t>
+        <a:bodyPr/>
+        <a:lstStyle/>
+        <a:p>
+          <a:endParaRPr lang="en-GB"/>
+        </a:p>
+      </dgm:t>
     </dgm:pt>
     <dgm:pt modelId="{49CF29B0-A7B7-4FC7-9215-2CCEF1475892}" type="pres">
       <dgm:prSet presAssocID="{7139D36E-4289-4651-A334-9BA0102B73C4}" presName="Childtext1" presStyleLbl="revTx" presStyleIdx="1" presStyleCnt="4">
@@ -2044,6 +3230,13 @@
         </dgm:presLayoutVars>
       </dgm:prSet>
       <dgm:spPr/>
+      <dgm:t>
+        <a:bodyPr/>
+        <a:lstStyle/>
+        <a:p>
+          <a:endParaRPr lang="en-GB"/>
+        </a:p>
+      </dgm:t>
     </dgm:pt>
     <dgm:pt modelId="{22ADC1C6-900A-49DD-8516-BADDBCA86A2D}" type="pres">
       <dgm:prSet presAssocID="{7139D36E-4289-4651-A334-9BA0102B73C4}" presName="BalanceSpacing" presStyleCnt="0"/>
@@ -2056,6 +3249,13 @@
     <dgm:pt modelId="{6D6BA26F-3EAA-4DA0-B33E-3864A83D814F}" type="pres">
       <dgm:prSet presAssocID="{1D2F5AB5-4D7E-4A82-AD29-23EFFCF012CE}" presName="Accent1Text" presStyleLbl="node1" presStyleIdx="3" presStyleCnt="8"/>
       <dgm:spPr/>
+      <dgm:t>
+        <a:bodyPr/>
+        <a:lstStyle/>
+        <a:p>
+          <a:endParaRPr lang="en-GB"/>
+        </a:p>
+      </dgm:t>
     </dgm:pt>
     <dgm:pt modelId="{CA1689B5-C492-47C0-B725-DEDBCD9D930A}" type="pres">
       <dgm:prSet presAssocID="{1D2F5AB5-4D7E-4A82-AD29-23EFFCF012CE}" presName="spaceBetweenRectangles" presStyleCnt="0"/>
@@ -2110,6 +3310,13 @@
     <dgm:pt modelId="{A9C77E33-64A3-430C-BAB2-47B0991A9039}" type="pres">
       <dgm:prSet presAssocID="{EE58C3BB-49BC-462B-9290-390271F718DE}" presName="Accent1Text" presStyleLbl="node1" presStyleIdx="5" presStyleCnt="8"/>
       <dgm:spPr/>
+      <dgm:t>
+        <a:bodyPr/>
+        <a:lstStyle/>
+        <a:p>
+          <a:endParaRPr lang="en-GB"/>
+        </a:p>
+      </dgm:t>
     </dgm:pt>
     <dgm:pt modelId="{E020E670-94C0-4F08-9345-3E6F8CD53556}" type="pres">
       <dgm:prSet presAssocID="{EE58C3BB-49BC-462B-9290-390271F718DE}" presName="spaceBetweenRectangles" presStyleCnt="0"/>
@@ -2128,6 +3335,13 @@
         </dgm:presLayoutVars>
       </dgm:prSet>
       <dgm:spPr/>
+      <dgm:t>
+        <a:bodyPr/>
+        <a:lstStyle/>
+        <a:p>
+          <a:endParaRPr lang="en-GB"/>
+        </a:p>
+      </dgm:t>
     </dgm:pt>
     <dgm:pt modelId="{A3730BDB-9333-4267-8847-CB6E18C5DA3B}" type="pres">
       <dgm:prSet presAssocID="{AE03FA61-78C6-4588-94A3-401745026354}" presName="Childtext1" presStyleLbl="revTx" presStyleIdx="3" presStyleCnt="4">
@@ -2160,25 +3374,25 @@
     </dgm:pt>
   </dgm:ptLst>
   <dgm:cxnLst>
-    <dgm:cxn modelId="{500975F5-9844-4263-A2B6-70A412A60284}" srcId="{A7C8040A-4875-4FD0-910C-882566E3BA1E}" destId="{AE03FA61-78C6-4588-94A3-401745026354}" srcOrd="3" destOrd="0" parTransId="{9414A8FB-20AF-4209-AF33-9B4AADD13CD0}" sibTransId="{0DFF81D2-49D1-4715-A416-621C20BBC027}"/>
-    <dgm:cxn modelId="{E8827A9A-7ED0-4F5C-8EDC-9DA9131CD38F}" type="presOf" srcId="{0DFF81D2-49D1-4715-A416-621C20BBC027}" destId="{83B95B54-5FC6-4271-A0DB-EF5C40F372DA}" srcOrd="0" destOrd="0" presId="urn:microsoft.com/office/officeart/2008/layout/AlternatingHexagons"/>
+    <dgm:cxn modelId="{FE36B098-FCB1-46DD-9009-047CB51A37FB}" type="presOf" srcId="{E7E9E394-9504-4980-88EB-66A662B0F111}" destId="{3EC5C9B2-C270-46A3-8E5B-330F747B0D88}" srcOrd="0" destOrd="0" presId="urn:microsoft.com/office/officeart/2008/layout/AlternatingHexagons"/>
     <dgm:cxn modelId="{6B05A5C1-375A-4021-B715-EECE877C525E}" type="presOf" srcId="{4615948C-F8C4-4700-86DF-761FFB42B137}" destId="{11E31C06-BA01-4165-AB20-0D231852A62B}" srcOrd="0" destOrd="0" presId="urn:microsoft.com/office/officeart/2008/layout/AlternatingHexagons"/>
-    <dgm:cxn modelId="{9025DA99-1180-434F-8FCC-379DC70E5572}" srcId="{A7C8040A-4875-4FD0-910C-882566E3BA1E}" destId="{E7E9E394-9504-4980-88EB-66A662B0F111}" srcOrd="0" destOrd="0" parTransId="{BAF9A357-7B39-4905-BC2A-718E27411EDA}" sibTransId="{EE87F12C-0A69-4BA3-847C-4D2060A9B55F}"/>
     <dgm:cxn modelId="{9A74C0F2-F388-44B9-B05E-106F99231DC3}" type="presOf" srcId="{EE58C3BB-49BC-462B-9290-390271F718DE}" destId="{A9C77E33-64A3-430C-BAB2-47B0991A9039}" srcOrd="0" destOrd="0" presId="urn:microsoft.com/office/officeart/2008/layout/AlternatingHexagons"/>
     <dgm:cxn modelId="{A018262F-69B4-4266-AE4F-1CCE61D66B86}" type="presOf" srcId="{EE87F12C-0A69-4BA3-847C-4D2060A9B55F}" destId="{A6221CE3-C4AC-468E-830C-92AB8A88C792}" srcOrd="0" destOrd="0" presId="urn:microsoft.com/office/officeart/2008/layout/AlternatingHexagons"/>
+    <dgm:cxn modelId="{7A8EF146-DD08-47EC-9986-BBC2B47385E5}" type="presOf" srcId="{1D2F5AB5-4D7E-4A82-AD29-23EFFCF012CE}" destId="{6D6BA26F-3EAA-4DA0-B33E-3864A83D814F}" srcOrd="0" destOrd="0" presId="urn:microsoft.com/office/officeart/2008/layout/AlternatingHexagons"/>
+    <dgm:cxn modelId="{500975F5-9844-4263-A2B6-70A412A60284}" srcId="{A7C8040A-4875-4FD0-910C-882566E3BA1E}" destId="{AE03FA61-78C6-4588-94A3-401745026354}" srcOrd="3" destOrd="0" parTransId="{9414A8FB-20AF-4209-AF33-9B4AADD13CD0}" sibTransId="{0DFF81D2-49D1-4715-A416-621C20BBC027}"/>
+    <dgm:cxn modelId="{36CE5DF2-2A94-4D1C-A0D3-4BFBB8E77417}" type="presOf" srcId="{A7C8040A-4875-4FD0-910C-882566E3BA1E}" destId="{011387D6-BB34-4CBD-8EDC-2C078AFD2845}" srcOrd="0" destOrd="0" presId="urn:microsoft.com/office/officeart/2008/layout/AlternatingHexagons"/>
+    <dgm:cxn modelId="{E8827A9A-7ED0-4F5C-8EDC-9DA9131CD38F}" type="presOf" srcId="{0DFF81D2-49D1-4715-A416-621C20BBC027}" destId="{83B95B54-5FC6-4271-A0DB-EF5C40F372DA}" srcOrd="0" destOrd="0" presId="urn:microsoft.com/office/officeart/2008/layout/AlternatingHexagons"/>
+    <dgm:cxn modelId="{713C7776-7322-4913-AB52-5FB855592CFE}" type="presOf" srcId="{DB2069BA-2F67-4530-ABE8-7EB05301D798}" destId="{1337574E-5A1E-44CE-B4EB-27275A62F5EB}" srcOrd="0" destOrd="0" presId="urn:microsoft.com/office/officeart/2008/layout/AlternatingHexagons"/>
+    <dgm:cxn modelId="{487EB2C4-7029-47B7-8F96-D8B35C1F27B6}" srcId="{7139D36E-4289-4651-A334-9BA0102B73C4}" destId="{EEB8A017-F8AE-450C-B57F-F7FEF835F0D7}" srcOrd="0" destOrd="0" parTransId="{C1FD5D0B-6C8B-4313-A689-490B2551FC8D}" sibTransId="{3B6A2AD5-D48C-4607-B357-70ABAE3AFAB7}"/>
+    <dgm:cxn modelId="{C1DF765C-2BFE-4308-A704-CB0ACC82AB0E}" type="presOf" srcId="{7139D36E-4289-4651-A334-9BA0102B73C4}" destId="{89CF2B4D-8EE3-4303-BE59-6B1831E67C44}" srcOrd="0" destOrd="0" presId="urn:microsoft.com/office/officeart/2008/layout/AlternatingHexagons"/>
+    <dgm:cxn modelId="{C7E85D0A-039F-49C3-935B-3BD4C7C7AA95}" srcId="{E7E9E394-9504-4980-88EB-66A662B0F111}" destId="{35AEDC73-2413-4B6E-8131-F3CBF22BAE2B}" srcOrd="0" destOrd="0" parTransId="{D2EC7F39-299E-4750-A46D-DD494844257C}" sibTransId="{AB4E8366-BBA6-41AB-9C54-910AC2E0B896}"/>
     <dgm:cxn modelId="{C09AF45A-8506-4B30-ABAC-1D208336D7F7}" srcId="{A7C8040A-4875-4FD0-910C-882566E3BA1E}" destId="{DB2069BA-2F67-4530-ABE8-7EB05301D798}" srcOrd="2" destOrd="0" parTransId="{FF148CC3-0813-4318-93C1-E9523359C7EE}" sibTransId="{EE58C3BB-49BC-462B-9290-390271F718DE}"/>
     <dgm:cxn modelId="{B07756B4-605C-4B18-BC38-0ED307958A28}" srcId="{A7C8040A-4875-4FD0-910C-882566E3BA1E}" destId="{7139D36E-4289-4651-A334-9BA0102B73C4}" srcOrd="1" destOrd="0" parTransId="{EDFFC453-6128-49A3-82CC-2F54AF2CB424}" sibTransId="{1D2F5AB5-4D7E-4A82-AD29-23EFFCF012CE}"/>
-    <dgm:cxn modelId="{FE36B098-FCB1-46DD-9009-047CB51A37FB}" type="presOf" srcId="{E7E9E394-9504-4980-88EB-66A662B0F111}" destId="{3EC5C9B2-C270-46A3-8E5B-330F747B0D88}" srcOrd="0" destOrd="0" presId="urn:microsoft.com/office/officeart/2008/layout/AlternatingHexagons"/>
-    <dgm:cxn modelId="{36CE5DF2-2A94-4D1C-A0D3-4BFBB8E77417}" type="presOf" srcId="{A7C8040A-4875-4FD0-910C-882566E3BA1E}" destId="{011387D6-BB34-4CBD-8EDC-2C078AFD2845}" srcOrd="0" destOrd="0" presId="urn:microsoft.com/office/officeart/2008/layout/AlternatingHexagons"/>
-    <dgm:cxn modelId="{713C7776-7322-4913-AB52-5FB855592CFE}" type="presOf" srcId="{DB2069BA-2F67-4530-ABE8-7EB05301D798}" destId="{1337574E-5A1E-44CE-B4EB-27275A62F5EB}" srcOrd="0" destOrd="0" presId="urn:microsoft.com/office/officeart/2008/layout/AlternatingHexagons"/>
-    <dgm:cxn modelId="{7A8EF146-DD08-47EC-9986-BBC2B47385E5}" type="presOf" srcId="{1D2F5AB5-4D7E-4A82-AD29-23EFFCF012CE}" destId="{6D6BA26F-3EAA-4DA0-B33E-3864A83D814F}" srcOrd="0" destOrd="0" presId="urn:microsoft.com/office/officeart/2008/layout/AlternatingHexagons"/>
+    <dgm:cxn modelId="{B8F4FBDF-576A-4030-96C4-674098392540}" type="presOf" srcId="{35AEDC73-2413-4B6E-8131-F3CBF22BAE2B}" destId="{AD6F1B2D-9BAB-4A86-A520-F9BBFB5675B4}" srcOrd="0" destOrd="0" presId="urn:microsoft.com/office/officeart/2008/layout/AlternatingHexagons"/>
+    <dgm:cxn modelId="{E5990947-AB6D-43A3-9ABF-7D9994929583}" type="presOf" srcId="{AE03FA61-78C6-4588-94A3-401745026354}" destId="{07FDE53A-B6B1-455C-8090-344304EEB02F}" srcOrd="0" destOrd="0" presId="urn:microsoft.com/office/officeart/2008/layout/AlternatingHexagons"/>
+    <dgm:cxn modelId="{9025DA99-1180-434F-8FCC-379DC70E5572}" srcId="{A7C8040A-4875-4FD0-910C-882566E3BA1E}" destId="{E7E9E394-9504-4980-88EB-66A662B0F111}" srcOrd="0" destOrd="0" parTransId="{BAF9A357-7B39-4905-BC2A-718E27411EDA}" sibTransId="{EE87F12C-0A69-4BA3-847C-4D2060A9B55F}"/>
     <dgm:cxn modelId="{FADAD0A2-D3FB-4606-993F-287802893B13}" type="presOf" srcId="{EEB8A017-F8AE-450C-B57F-F7FEF835F0D7}" destId="{49CF29B0-A7B7-4FC7-9215-2CCEF1475892}" srcOrd="0" destOrd="0" presId="urn:microsoft.com/office/officeart/2008/layout/AlternatingHexagons"/>
-    <dgm:cxn modelId="{487EB2C4-7029-47B7-8F96-D8B35C1F27B6}" srcId="{7139D36E-4289-4651-A334-9BA0102B73C4}" destId="{EEB8A017-F8AE-450C-B57F-F7FEF835F0D7}" srcOrd="0" destOrd="0" parTransId="{C1FD5D0B-6C8B-4313-A689-490B2551FC8D}" sibTransId="{3B6A2AD5-D48C-4607-B357-70ABAE3AFAB7}"/>
-    <dgm:cxn modelId="{B8F4FBDF-576A-4030-96C4-674098392540}" type="presOf" srcId="{35AEDC73-2413-4B6E-8131-F3CBF22BAE2B}" destId="{AD6F1B2D-9BAB-4A86-A520-F9BBFB5675B4}" srcOrd="0" destOrd="0" presId="urn:microsoft.com/office/officeart/2008/layout/AlternatingHexagons"/>
-    <dgm:cxn modelId="{C7E85D0A-039F-49C3-935B-3BD4C7C7AA95}" srcId="{E7E9E394-9504-4980-88EB-66A662B0F111}" destId="{35AEDC73-2413-4B6E-8131-F3CBF22BAE2B}" srcOrd="0" destOrd="0" parTransId="{D2EC7F39-299E-4750-A46D-DD494844257C}" sibTransId="{AB4E8366-BBA6-41AB-9C54-910AC2E0B896}"/>
-    <dgm:cxn modelId="{C1DF765C-2BFE-4308-A704-CB0ACC82AB0E}" type="presOf" srcId="{7139D36E-4289-4651-A334-9BA0102B73C4}" destId="{89CF2B4D-8EE3-4303-BE59-6B1831E67C44}" srcOrd="0" destOrd="0" presId="urn:microsoft.com/office/officeart/2008/layout/AlternatingHexagons"/>
     <dgm:cxn modelId="{733FA6C8-7414-4A34-9DB6-5D4E79E4E4C8}" srcId="{DB2069BA-2F67-4530-ABE8-7EB05301D798}" destId="{4615948C-F8C4-4700-86DF-761FFB42B137}" srcOrd="0" destOrd="0" parTransId="{BB87FBB1-71ED-46CE-BAA6-F0272F82EE1A}" sibTransId="{7AFCA748-AD91-4478-A8C5-3BB0A148D69A}"/>
-    <dgm:cxn modelId="{E5990947-AB6D-43A3-9ABF-7D9994929583}" type="presOf" srcId="{AE03FA61-78C6-4588-94A3-401745026354}" destId="{07FDE53A-B6B1-455C-8090-344304EEB02F}" srcOrd="0" destOrd="0" presId="urn:microsoft.com/office/officeart/2008/layout/AlternatingHexagons"/>
     <dgm:cxn modelId="{70489E5E-8FC1-4D38-981B-CA9D887AD55A}" type="presParOf" srcId="{011387D6-BB34-4CBD-8EDC-2C078AFD2845}" destId="{4324D937-436E-4B5D-A3FD-A55361CF3EC7}" srcOrd="0" destOrd="0" presId="urn:microsoft.com/office/officeart/2008/layout/AlternatingHexagons"/>
     <dgm:cxn modelId="{887EB019-9913-43CB-BA8C-1040A65ECB3C}" type="presParOf" srcId="{4324D937-436E-4B5D-A3FD-A55361CF3EC7}" destId="{3EC5C9B2-C270-46A3-8E5B-330F747B0D88}" srcOrd="0" destOrd="0" presId="urn:microsoft.com/office/officeart/2008/layout/AlternatingHexagons"/>
     <dgm:cxn modelId="{3D64E573-A5A5-4556-8A8F-102C869E7156}" type="presParOf" srcId="{4324D937-436E-4B5D-A3FD-A55361CF3EC7}" destId="{AD6F1B2D-9BAB-4A86-A520-F9BBFB5675B4}" srcOrd="1" destOrd="0" presId="urn:microsoft.com/office/officeart/2008/layout/AlternatingHexagons"/>
@@ -2217,7 +3431,7 @@
 </dgm:dataModel>
 </file>
 
-<file path=ppt/diagrams/data2.xml><?xml version="1.0" encoding="utf-8"?>
+<file path=ppt/diagrams/data3.xml><?xml version="1.0" encoding="utf-8"?>
 <dgm:dataModel xmlns:dgm="http://schemas.openxmlformats.org/drawingml/2006/diagram" xmlns:a="http://schemas.openxmlformats.org/drawingml/2006/main">
   <dgm:ptLst>
     <dgm:pt modelId="{FA12B93E-2D2F-43B1-A927-D9284602E723}" type="doc">
@@ -2871,6 +4085,785 @@
 </file>
 
 <file path=ppt/diagrams/drawing1.xml><?xml version="1.0" encoding="utf-8"?>
+<dsp:drawing xmlns:dgm="http://schemas.openxmlformats.org/drawingml/2006/diagram" xmlns:dsp="http://schemas.microsoft.com/office/drawing/2008/diagram" xmlns:a="http://schemas.openxmlformats.org/drawingml/2006/main">
+  <dsp:spTree>
+    <dsp:nvGrpSpPr>
+      <dsp:cNvPr id="0" name=""/>
+      <dsp:cNvGrpSpPr/>
+    </dsp:nvGrpSpPr>
+    <dsp:grpSpPr/>
+    <dsp:sp modelId="{A540D9FD-1B12-42A2-AA38-93A542AF12D5}">
+      <dsp:nvSpPr>
+        <dsp:cNvPr id="0" name=""/>
+        <dsp:cNvSpPr/>
+      </dsp:nvSpPr>
+      <dsp:spPr>
+        <a:xfrm>
+          <a:off x="4138759" y="1665081"/>
+          <a:ext cx="2887387" cy="602388"/>
+        </a:xfrm>
+        <a:custGeom>
+          <a:avLst/>
+          <a:gdLst/>
+          <a:ahLst/>
+          <a:cxnLst/>
+          <a:rect l="0" t="0" r="0" b="0"/>
+          <a:pathLst>
+            <a:path>
+              <a:moveTo>
+                <a:pt x="0" y="0"/>
+              </a:moveTo>
+              <a:lnTo>
+                <a:pt x="0" y="410510"/>
+              </a:lnTo>
+              <a:lnTo>
+                <a:pt x="2887387" y="410510"/>
+              </a:lnTo>
+              <a:lnTo>
+                <a:pt x="2887387" y="602388"/>
+              </a:lnTo>
+            </a:path>
+          </a:pathLst>
+        </a:custGeom>
+        <a:noFill/>
+        <a:ln w="25400" cap="flat" cmpd="sng" algn="ctr">
+          <a:solidFill>
+            <a:schemeClr val="accent1">
+              <a:shade val="60000"/>
+              <a:hueOff val="0"/>
+              <a:satOff val="0"/>
+              <a:lumOff val="0"/>
+              <a:alphaOff val="0"/>
+            </a:schemeClr>
+          </a:solidFill>
+          <a:prstDash val="solid"/>
+        </a:ln>
+        <a:effectLst/>
+      </dsp:spPr>
+      <dsp:style>
+        <a:lnRef idx="2">
+          <a:scrgbClr r="0" g="0" b="0"/>
+        </a:lnRef>
+        <a:fillRef idx="0">
+          <a:scrgbClr r="0" g="0" b="0"/>
+        </a:fillRef>
+        <a:effectRef idx="0">
+          <a:scrgbClr r="0" g="0" b="0"/>
+        </a:effectRef>
+        <a:fontRef idx="minor"/>
+      </dsp:style>
+    </dsp:sp>
+    <dsp:sp modelId="{2309E421-38BA-4FB4-88C8-EC230A63CD48}">
+      <dsp:nvSpPr>
+        <dsp:cNvPr id="0" name=""/>
+        <dsp:cNvSpPr/>
+      </dsp:nvSpPr>
+      <dsp:spPr>
+        <a:xfrm>
+          <a:off x="4064404" y="1665081"/>
+          <a:ext cx="91440" cy="602388"/>
+        </a:xfrm>
+        <a:custGeom>
+          <a:avLst/>
+          <a:gdLst/>
+          <a:ahLst/>
+          <a:cxnLst/>
+          <a:rect l="0" t="0" r="0" b="0"/>
+          <a:pathLst>
+            <a:path>
+              <a:moveTo>
+                <a:pt x="74355" y="0"/>
+              </a:moveTo>
+              <a:lnTo>
+                <a:pt x="74355" y="410510"/>
+              </a:lnTo>
+              <a:lnTo>
+                <a:pt x="45720" y="410510"/>
+              </a:lnTo>
+              <a:lnTo>
+                <a:pt x="45720" y="602388"/>
+              </a:lnTo>
+            </a:path>
+          </a:pathLst>
+        </a:custGeom>
+        <a:noFill/>
+        <a:ln w="25400" cap="flat" cmpd="sng" algn="ctr">
+          <a:solidFill>
+            <a:schemeClr val="accent1">
+              <a:shade val="60000"/>
+              <a:hueOff val="0"/>
+              <a:satOff val="0"/>
+              <a:lumOff val="0"/>
+              <a:alphaOff val="0"/>
+            </a:schemeClr>
+          </a:solidFill>
+          <a:prstDash val="solid"/>
+        </a:ln>
+        <a:effectLst/>
+      </dsp:spPr>
+      <dsp:style>
+        <a:lnRef idx="2">
+          <a:scrgbClr r="0" g="0" b="0"/>
+        </a:lnRef>
+        <a:fillRef idx="0">
+          <a:scrgbClr r="0" g="0" b="0"/>
+        </a:fillRef>
+        <a:effectRef idx="0">
+          <a:scrgbClr r="0" g="0" b="0"/>
+        </a:effectRef>
+        <a:fontRef idx="minor"/>
+      </dsp:style>
+    </dsp:sp>
+    <dsp:sp modelId="{60EDBC92-32A1-49F9-94E9-7483DDE7E40B}">
+      <dsp:nvSpPr>
+        <dsp:cNvPr id="0" name=""/>
+        <dsp:cNvSpPr/>
+      </dsp:nvSpPr>
+      <dsp:spPr>
+        <a:xfrm>
+          <a:off x="1222736" y="1665081"/>
+          <a:ext cx="2916022" cy="602388"/>
+        </a:xfrm>
+        <a:custGeom>
+          <a:avLst/>
+          <a:gdLst/>
+          <a:ahLst/>
+          <a:cxnLst/>
+          <a:rect l="0" t="0" r="0" b="0"/>
+          <a:pathLst>
+            <a:path>
+              <a:moveTo>
+                <a:pt x="2916022" y="0"/>
+              </a:moveTo>
+              <a:lnTo>
+                <a:pt x="2916022" y="410510"/>
+              </a:lnTo>
+              <a:lnTo>
+                <a:pt x="0" y="410510"/>
+              </a:lnTo>
+              <a:lnTo>
+                <a:pt x="0" y="602388"/>
+              </a:lnTo>
+            </a:path>
+          </a:pathLst>
+        </a:custGeom>
+        <a:noFill/>
+        <a:ln w="25400" cap="flat" cmpd="sng" algn="ctr">
+          <a:solidFill>
+            <a:schemeClr val="accent1">
+              <a:shade val="60000"/>
+              <a:hueOff val="0"/>
+              <a:satOff val="0"/>
+              <a:lumOff val="0"/>
+              <a:alphaOff val="0"/>
+            </a:schemeClr>
+          </a:solidFill>
+          <a:prstDash val="solid"/>
+        </a:ln>
+        <a:effectLst/>
+      </dsp:spPr>
+      <dsp:style>
+        <a:lnRef idx="2">
+          <a:scrgbClr r="0" g="0" b="0"/>
+        </a:lnRef>
+        <a:fillRef idx="0">
+          <a:scrgbClr r="0" g="0" b="0"/>
+        </a:fillRef>
+        <a:effectRef idx="0">
+          <a:scrgbClr r="0" g="0" b="0"/>
+        </a:effectRef>
+        <a:fontRef idx="minor"/>
+      </dsp:style>
+    </dsp:sp>
+    <dsp:sp modelId="{740C5C29-9641-470A-8CF1-98DCF1E70D25}">
+      <dsp:nvSpPr>
+        <dsp:cNvPr id="0" name=""/>
+        <dsp:cNvSpPr/>
+      </dsp:nvSpPr>
+      <dsp:spPr>
+        <a:xfrm>
+          <a:off x="2665635" y="349838"/>
+          <a:ext cx="2946248" cy="1315243"/>
+        </a:xfrm>
+        <a:prstGeom prst="roundRect">
+          <a:avLst>
+            <a:gd name="adj" fmla="val 10000"/>
+          </a:avLst>
+        </a:prstGeom>
+        <a:solidFill>
+          <a:schemeClr val="accent1">
+            <a:hueOff val="0"/>
+            <a:satOff val="0"/>
+            <a:lumOff val="0"/>
+            <a:alphaOff val="0"/>
+          </a:schemeClr>
+        </a:solidFill>
+        <a:ln w="25400" cap="flat" cmpd="sng" algn="ctr">
+          <a:solidFill>
+            <a:schemeClr val="lt1">
+              <a:hueOff val="0"/>
+              <a:satOff val="0"/>
+              <a:lumOff val="0"/>
+              <a:alphaOff val="0"/>
+            </a:schemeClr>
+          </a:solidFill>
+          <a:prstDash val="solid"/>
+        </a:ln>
+        <a:effectLst/>
+      </dsp:spPr>
+      <dsp:style>
+        <a:lnRef idx="2">
+          <a:scrgbClr r="0" g="0" b="0"/>
+        </a:lnRef>
+        <a:fillRef idx="1">
+          <a:scrgbClr r="0" g="0" b="0"/>
+        </a:fillRef>
+        <a:effectRef idx="0">
+          <a:scrgbClr r="0" g="0" b="0"/>
+        </a:effectRef>
+        <a:fontRef idx="minor">
+          <a:schemeClr val="lt1"/>
+        </a:fontRef>
+      </dsp:style>
+    </dsp:sp>
+    <dsp:sp modelId="{26243D0F-49E9-4624-B9D1-DA584AED8B03}">
+      <dsp:nvSpPr>
+        <dsp:cNvPr id="0" name=""/>
+        <dsp:cNvSpPr/>
+      </dsp:nvSpPr>
+      <dsp:spPr>
+        <a:xfrm>
+          <a:off x="2895773" y="568470"/>
+          <a:ext cx="2946248" cy="1315243"/>
+        </a:xfrm>
+        <a:prstGeom prst="roundRect">
+          <a:avLst>
+            <a:gd name="adj" fmla="val 10000"/>
+          </a:avLst>
+        </a:prstGeom>
+        <a:solidFill>
+          <a:schemeClr val="lt1">
+            <a:alpha val="90000"/>
+            <a:hueOff val="0"/>
+            <a:satOff val="0"/>
+            <a:lumOff val="0"/>
+            <a:alphaOff val="0"/>
+          </a:schemeClr>
+        </a:solidFill>
+        <a:ln w="25400" cap="flat" cmpd="sng" algn="ctr">
+          <a:solidFill>
+            <a:schemeClr val="accent1">
+              <a:hueOff val="0"/>
+              <a:satOff val="0"/>
+              <a:lumOff val="0"/>
+              <a:alphaOff val="0"/>
+            </a:schemeClr>
+          </a:solidFill>
+          <a:prstDash val="solid"/>
+        </a:ln>
+        <a:effectLst/>
+      </dsp:spPr>
+      <dsp:style>
+        <a:lnRef idx="2">
+          <a:scrgbClr r="0" g="0" b="0"/>
+        </a:lnRef>
+        <a:fillRef idx="1">
+          <a:scrgbClr r="0" g="0" b="0"/>
+        </a:fillRef>
+        <a:effectRef idx="0">
+          <a:scrgbClr r="0" g="0" b="0"/>
+        </a:effectRef>
+        <a:fontRef idx="minor"/>
+      </dsp:style>
+      <dsp:txBody>
+        <a:bodyPr spcFirstLastPara="0" vert="horz" wrap="square" lIns="68580" tIns="68580" rIns="68580" bIns="68580" numCol="1" spcCol="1270" anchor="ctr" anchorCtr="0">
+          <a:noAutofit/>
+        </a:bodyPr>
+        <a:lstStyle/>
+        <a:p>
+          <a:pPr lvl="0" algn="ctr" defTabSz="800100">
+            <a:lnSpc>
+              <a:spcPct val="90000"/>
+            </a:lnSpc>
+            <a:spcBef>
+              <a:spcPct val="0"/>
+            </a:spcBef>
+            <a:spcAft>
+              <a:spcPct val="35000"/>
+            </a:spcAft>
+          </a:pPr>
+          <a:r>
+            <a:rPr lang="en-GB" sz="1800" b="1" kern="1200" dirty="0" smtClean="0"/>
+            <a:t>Hariharan</a:t>
+          </a:r>
+        </a:p>
+        <a:p>
+          <a:pPr lvl="0" algn="ctr" defTabSz="800100">
+            <a:lnSpc>
+              <a:spcPct val="90000"/>
+            </a:lnSpc>
+            <a:spcBef>
+              <a:spcPct val="0"/>
+            </a:spcBef>
+            <a:spcAft>
+              <a:spcPct val="35000"/>
+            </a:spcAft>
+          </a:pPr>
+          <a:r>
+            <a:rPr lang="en-GB" sz="1800" kern="1200" dirty="0" smtClean="0"/>
+            <a:t>(Head-IT &amp; Systems)</a:t>
+          </a:r>
+          <a:endParaRPr lang="en-GB" sz="1800" kern="1200" dirty="0"/>
+        </a:p>
+      </dsp:txBody>
+      <dsp:txXfrm>
+        <a:off x="2934295" y="606992"/>
+        <a:ext cx="2869204" cy="1238199"/>
+      </dsp:txXfrm>
+    </dsp:sp>
+    <dsp:sp modelId="{55A5E781-0B7B-412D-A76A-DE507C15BC6C}">
+      <dsp:nvSpPr>
+        <dsp:cNvPr id="0" name=""/>
+        <dsp:cNvSpPr/>
+      </dsp:nvSpPr>
+      <dsp:spPr>
+        <a:xfrm>
+          <a:off x="6271" y="2267470"/>
+          <a:ext cx="2432930" cy="1315243"/>
+        </a:xfrm>
+        <a:prstGeom prst="roundRect">
+          <a:avLst>
+            <a:gd name="adj" fmla="val 10000"/>
+          </a:avLst>
+        </a:prstGeom>
+        <a:solidFill>
+          <a:schemeClr val="accent1">
+            <a:hueOff val="0"/>
+            <a:satOff val="0"/>
+            <a:lumOff val="0"/>
+            <a:alphaOff val="0"/>
+          </a:schemeClr>
+        </a:solidFill>
+        <a:ln w="25400" cap="flat" cmpd="sng" algn="ctr">
+          <a:solidFill>
+            <a:schemeClr val="lt1">
+              <a:hueOff val="0"/>
+              <a:satOff val="0"/>
+              <a:lumOff val="0"/>
+              <a:alphaOff val="0"/>
+            </a:schemeClr>
+          </a:solidFill>
+          <a:prstDash val="solid"/>
+        </a:ln>
+        <a:effectLst/>
+      </dsp:spPr>
+      <dsp:style>
+        <a:lnRef idx="2">
+          <a:scrgbClr r="0" g="0" b="0"/>
+        </a:lnRef>
+        <a:fillRef idx="1">
+          <a:scrgbClr r="0" g="0" b="0"/>
+        </a:fillRef>
+        <a:effectRef idx="0">
+          <a:scrgbClr r="0" g="0" b="0"/>
+        </a:effectRef>
+        <a:fontRef idx="minor">
+          <a:schemeClr val="lt1"/>
+        </a:fontRef>
+      </dsp:style>
+    </dsp:sp>
+    <dsp:sp modelId="{EC5F7CD7-92BD-4380-AF1B-AB0D2D7DB8B2}">
+      <dsp:nvSpPr>
+        <dsp:cNvPr id="0" name=""/>
+        <dsp:cNvSpPr/>
+      </dsp:nvSpPr>
+      <dsp:spPr>
+        <a:xfrm>
+          <a:off x="236409" y="2486102"/>
+          <a:ext cx="2432930" cy="1315243"/>
+        </a:xfrm>
+        <a:prstGeom prst="roundRect">
+          <a:avLst>
+            <a:gd name="adj" fmla="val 10000"/>
+          </a:avLst>
+        </a:prstGeom>
+        <a:solidFill>
+          <a:schemeClr val="lt1">
+            <a:alpha val="90000"/>
+            <a:hueOff val="0"/>
+            <a:satOff val="0"/>
+            <a:lumOff val="0"/>
+            <a:alphaOff val="0"/>
+          </a:schemeClr>
+        </a:solidFill>
+        <a:ln w="25400" cap="flat" cmpd="sng" algn="ctr">
+          <a:solidFill>
+            <a:schemeClr val="accent1">
+              <a:hueOff val="0"/>
+              <a:satOff val="0"/>
+              <a:lumOff val="0"/>
+              <a:alphaOff val="0"/>
+            </a:schemeClr>
+          </a:solidFill>
+          <a:prstDash val="solid"/>
+        </a:ln>
+        <a:effectLst/>
+      </dsp:spPr>
+      <dsp:style>
+        <a:lnRef idx="2">
+          <a:scrgbClr r="0" g="0" b="0"/>
+        </a:lnRef>
+        <a:fillRef idx="1">
+          <a:scrgbClr r="0" g="0" b="0"/>
+        </a:fillRef>
+        <a:effectRef idx="0">
+          <a:scrgbClr r="0" g="0" b="0"/>
+        </a:effectRef>
+        <a:fontRef idx="minor"/>
+      </dsp:style>
+      <dsp:txBody>
+        <a:bodyPr spcFirstLastPara="0" vert="horz" wrap="square" lIns="68580" tIns="68580" rIns="68580" bIns="68580" numCol="1" spcCol="1270" anchor="ctr" anchorCtr="0">
+          <a:noAutofit/>
+        </a:bodyPr>
+        <a:lstStyle/>
+        <a:p>
+          <a:pPr lvl="0" algn="ctr" defTabSz="800100">
+            <a:lnSpc>
+              <a:spcPct val="90000"/>
+            </a:lnSpc>
+            <a:spcBef>
+              <a:spcPct val="0"/>
+            </a:spcBef>
+            <a:spcAft>
+              <a:spcPct val="35000"/>
+            </a:spcAft>
+          </a:pPr>
+          <a:r>
+            <a:rPr lang="en-GB" sz="1800" b="1" kern="1200" dirty="0" smtClean="0"/>
+            <a:t>Dhirendra Singh</a:t>
+          </a:r>
+        </a:p>
+        <a:p>
+          <a:pPr lvl="0" algn="ctr" defTabSz="800100">
+            <a:lnSpc>
+              <a:spcPct val="90000"/>
+            </a:lnSpc>
+            <a:spcBef>
+              <a:spcPct val="0"/>
+            </a:spcBef>
+            <a:spcAft>
+              <a:spcPct val="35000"/>
+            </a:spcAft>
+          </a:pPr>
+          <a:r>
+            <a:rPr lang="en-GB" sz="1800" kern="1200" dirty="0" smtClean="0"/>
+            <a:t>(IT Facilities &amp; Support)</a:t>
+          </a:r>
+          <a:endParaRPr lang="en-GB" sz="1800" kern="1200" dirty="0"/>
+        </a:p>
+      </dsp:txBody>
+      <dsp:txXfrm>
+        <a:off x="274931" y="2524624"/>
+        <a:ext cx="2355886" cy="1238199"/>
+      </dsp:txXfrm>
+    </dsp:sp>
+    <dsp:sp modelId="{2517B15E-F8A3-4B0D-84C6-9ADF1836C397}">
+      <dsp:nvSpPr>
+        <dsp:cNvPr id="0" name=""/>
+        <dsp:cNvSpPr/>
+      </dsp:nvSpPr>
+      <dsp:spPr>
+        <a:xfrm>
+          <a:off x="2899479" y="2267470"/>
+          <a:ext cx="2421289" cy="1315243"/>
+        </a:xfrm>
+        <a:prstGeom prst="roundRect">
+          <a:avLst>
+            <a:gd name="adj" fmla="val 10000"/>
+          </a:avLst>
+        </a:prstGeom>
+        <a:solidFill>
+          <a:schemeClr val="accent1">
+            <a:hueOff val="0"/>
+            <a:satOff val="0"/>
+            <a:lumOff val="0"/>
+            <a:alphaOff val="0"/>
+          </a:schemeClr>
+        </a:solidFill>
+        <a:ln w="25400" cap="flat" cmpd="sng" algn="ctr">
+          <a:solidFill>
+            <a:schemeClr val="lt1">
+              <a:hueOff val="0"/>
+              <a:satOff val="0"/>
+              <a:lumOff val="0"/>
+              <a:alphaOff val="0"/>
+            </a:schemeClr>
+          </a:solidFill>
+          <a:prstDash val="solid"/>
+        </a:ln>
+        <a:effectLst/>
+      </dsp:spPr>
+      <dsp:style>
+        <a:lnRef idx="2">
+          <a:scrgbClr r="0" g="0" b="0"/>
+        </a:lnRef>
+        <a:fillRef idx="1">
+          <a:scrgbClr r="0" g="0" b="0"/>
+        </a:fillRef>
+        <a:effectRef idx="0">
+          <a:scrgbClr r="0" g="0" b="0"/>
+        </a:effectRef>
+        <a:fontRef idx="minor">
+          <a:schemeClr val="lt1"/>
+        </a:fontRef>
+      </dsp:style>
+    </dsp:sp>
+    <dsp:sp modelId="{54CDEA14-F245-48F4-9832-125065A01019}">
+      <dsp:nvSpPr>
+        <dsp:cNvPr id="0" name=""/>
+        <dsp:cNvSpPr/>
+      </dsp:nvSpPr>
+      <dsp:spPr>
+        <a:xfrm>
+          <a:off x="3129617" y="2486102"/>
+          <a:ext cx="2421289" cy="1315243"/>
+        </a:xfrm>
+        <a:prstGeom prst="roundRect">
+          <a:avLst>
+            <a:gd name="adj" fmla="val 10000"/>
+          </a:avLst>
+        </a:prstGeom>
+        <a:solidFill>
+          <a:schemeClr val="lt1">
+            <a:alpha val="90000"/>
+            <a:hueOff val="0"/>
+            <a:satOff val="0"/>
+            <a:lumOff val="0"/>
+            <a:alphaOff val="0"/>
+          </a:schemeClr>
+        </a:solidFill>
+        <a:ln w="25400" cap="flat" cmpd="sng" algn="ctr">
+          <a:solidFill>
+            <a:schemeClr val="accent1">
+              <a:hueOff val="0"/>
+              <a:satOff val="0"/>
+              <a:lumOff val="0"/>
+              <a:alphaOff val="0"/>
+            </a:schemeClr>
+          </a:solidFill>
+          <a:prstDash val="solid"/>
+        </a:ln>
+        <a:effectLst/>
+      </dsp:spPr>
+      <dsp:style>
+        <a:lnRef idx="2">
+          <a:scrgbClr r="0" g="0" b="0"/>
+        </a:lnRef>
+        <a:fillRef idx="1">
+          <a:scrgbClr r="0" g="0" b="0"/>
+        </a:fillRef>
+        <a:effectRef idx="0">
+          <a:scrgbClr r="0" g="0" b="0"/>
+        </a:effectRef>
+        <a:fontRef idx="minor"/>
+      </dsp:style>
+      <dsp:txBody>
+        <a:bodyPr spcFirstLastPara="0" vert="horz" wrap="square" lIns="68580" tIns="68580" rIns="68580" bIns="68580" numCol="1" spcCol="1270" anchor="ctr" anchorCtr="0">
+          <a:noAutofit/>
+        </a:bodyPr>
+        <a:lstStyle/>
+        <a:p>
+          <a:pPr lvl="0" algn="ctr" defTabSz="800100">
+            <a:lnSpc>
+              <a:spcPct val="90000"/>
+            </a:lnSpc>
+            <a:spcBef>
+              <a:spcPct val="0"/>
+            </a:spcBef>
+            <a:spcAft>
+              <a:spcPct val="35000"/>
+            </a:spcAft>
+          </a:pPr>
+          <a:r>
+            <a:rPr lang="en-GB" sz="1800" b="1" kern="1200" dirty="0" smtClean="0"/>
+            <a:t>Lalit Gupta</a:t>
+          </a:r>
+        </a:p>
+        <a:p>
+          <a:pPr lvl="0" algn="ctr" defTabSz="800100">
+            <a:lnSpc>
+              <a:spcPct val="90000"/>
+            </a:lnSpc>
+            <a:spcBef>
+              <a:spcPct val="0"/>
+            </a:spcBef>
+            <a:spcAft>
+              <a:spcPct val="35000"/>
+            </a:spcAft>
+          </a:pPr>
+          <a:r>
+            <a:rPr lang="en-GB" sz="1800" kern="1200" dirty="0" smtClean="0"/>
+            <a:t>(HR, Engineering Applications)</a:t>
+          </a:r>
+          <a:endParaRPr lang="en-GB" sz="1800" kern="1200" dirty="0"/>
+        </a:p>
+      </dsp:txBody>
+      <dsp:txXfrm>
+        <a:off x="3168139" y="2524624"/>
+        <a:ext cx="2344245" cy="1238199"/>
+      </dsp:txXfrm>
+    </dsp:sp>
+    <dsp:sp modelId="{277DCC10-3C4C-4DBB-8FF7-241E4E11B661}">
+      <dsp:nvSpPr>
+        <dsp:cNvPr id="0" name=""/>
+        <dsp:cNvSpPr/>
+      </dsp:nvSpPr>
+      <dsp:spPr>
+        <a:xfrm>
+          <a:off x="5781046" y="2267470"/>
+          <a:ext cx="2490200" cy="1315243"/>
+        </a:xfrm>
+        <a:prstGeom prst="roundRect">
+          <a:avLst>
+            <a:gd name="adj" fmla="val 10000"/>
+          </a:avLst>
+        </a:prstGeom>
+        <a:solidFill>
+          <a:schemeClr val="accent1">
+            <a:hueOff val="0"/>
+            <a:satOff val="0"/>
+            <a:lumOff val="0"/>
+            <a:alphaOff val="0"/>
+          </a:schemeClr>
+        </a:solidFill>
+        <a:ln w="25400" cap="flat" cmpd="sng" algn="ctr">
+          <a:solidFill>
+            <a:schemeClr val="lt1">
+              <a:hueOff val="0"/>
+              <a:satOff val="0"/>
+              <a:lumOff val="0"/>
+              <a:alphaOff val="0"/>
+            </a:schemeClr>
+          </a:solidFill>
+          <a:prstDash val="solid"/>
+        </a:ln>
+        <a:effectLst/>
+      </dsp:spPr>
+      <dsp:style>
+        <a:lnRef idx="2">
+          <a:scrgbClr r="0" g="0" b="0"/>
+        </a:lnRef>
+        <a:fillRef idx="1">
+          <a:scrgbClr r="0" g="0" b="0"/>
+        </a:fillRef>
+        <a:effectRef idx="0">
+          <a:scrgbClr r="0" g="0" b="0"/>
+        </a:effectRef>
+        <a:fontRef idx="minor">
+          <a:schemeClr val="lt1"/>
+        </a:fontRef>
+      </dsp:style>
+    </dsp:sp>
+    <dsp:sp modelId="{5374055F-39FB-40D0-A07F-66B5102D7CE2}">
+      <dsp:nvSpPr>
+        <dsp:cNvPr id="0" name=""/>
+        <dsp:cNvSpPr/>
+      </dsp:nvSpPr>
+      <dsp:spPr>
+        <a:xfrm>
+          <a:off x="6011185" y="2486102"/>
+          <a:ext cx="2490200" cy="1315243"/>
+        </a:xfrm>
+        <a:prstGeom prst="roundRect">
+          <a:avLst>
+            <a:gd name="adj" fmla="val 10000"/>
+          </a:avLst>
+        </a:prstGeom>
+        <a:solidFill>
+          <a:schemeClr val="lt1">
+            <a:alpha val="90000"/>
+            <a:hueOff val="0"/>
+            <a:satOff val="0"/>
+            <a:lumOff val="0"/>
+            <a:alphaOff val="0"/>
+          </a:schemeClr>
+        </a:solidFill>
+        <a:ln w="25400" cap="flat" cmpd="sng" algn="ctr">
+          <a:solidFill>
+            <a:schemeClr val="accent1">
+              <a:hueOff val="0"/>
+              <a:satOff val="0"/>
+              <a:lumOff val="0"/>
+              <a:alphaOff val="0"/>
+            </a:schemeClr>
+          </a:solidFill>
+          <a:prstDash val="solid"/>
+        </a:ln>
+        <a:effectLst/>
+      </dsp:spPr>
+      <dsp:style>
+        <a:lnRef idx="2">
+          <a:scrgbClr r="0" g="0" b="0"/>
+        </a:lnRef>
+        <a:fillRef idx="1">
+          <a:scrgbClr r="0" g="0" b="0"/>
+        </a:fillRef>
+        <a:effectRef idx="0">
+          <a:scrgbClr r="0" g="0" b="0"/>
+        </a:effectRef>
+        <a:fontRef idx="minor"/>
+      </dsp:style>
+      <dsp:txBody>
+        <a:bodyPr spcFirstLastPara="0" vert="horz" wrap="square" lIns="68580" tIns="68580" rIns="68580" bIns="68580" numCol="1" spcCol="1270" anchor="ctr" anchorCtr="0">
+          <a:noAutofit/>
+        </a:bodyPr>
+        <a:lstStyle/>
+        <a:p>
+          <a:pPr lvl="0" algn="ctr" defTabSz="800100">
+            <a:lnSpc>
+              <a:spcPct val="90000"/>
+            </a:lnSpc>
+            <a:spcBef>
+              <a:spcPct val="0"/>
+            </a:spcBef>
+            <a:spcAft>
+              <a:spcPct val="35000"/>
+            </a:spcAft>
+          </a:pPr>
+          <a:r>
+            <a:rPr lang="en-GB" sz="1800" b="1" kern="1200" dirty="0" smtClean="0"/>
+            <a:t>Veena</a:t>
+          </a:r>
+        </a:p>
+        <a:p>
+          <a:pPr lvl="0" algn="ctr" defTabSz="800100">
+            <a:lnSpc>
+              <a:spcPct val="90000"/>
+            </a:lnSpc>
+            <a:spcBef>
+              <a:spcPct val="0"/>
+            </a:spcBef>
+            <a:spcAft>
+              <a:spcPct val="35000"/>
+            </a:spcAft>
+          </a:pPr>
+          <a:r>
+            <a:rPr lang="en-GB" sz="1800" kern="1200" dirty="0" smtClean="0"/>
+            <a:t>(ERP Applications)</a:t>
+          </a:r>
+          <a:endParaRPr lang="en-GB" sz="1800" kern="1200" dirty="0"/>
+        </a:p>
+      </dsp:txBody>
+      <dsp:txXfrm>
+        <a:off x="6049707" y="2524624"/>
+        <a:ext cx="2413156" cy="1238199"/>
+      </dsp:txXfrm>
+    </dsp:sp>
+  </dsp:spTree>
+</dsp:drawing>
+</file>
+
+<file path=ppt/diagrams/drawing2.xml><?xml version="1.0" encoding="utf-8"?>
 <dsp:drawing xmlns:dgm="http://schemas.openxmlformats.org/drawingml/2006/diagram" xmlns:dsp="http://schemas.microsoft.com/office/drawing/2008/diagram" xmlns:a="http://schemas.openxmlformats.org/drawingml/2006/main">
   <dsp:spTree>
     <dsp:nvGrpSpPr>
@@ -3722,7 +5715,7 @@
 </dsp:drawing>
 </file>
 
-<file path=ppt/diagrams/drawing2.xml><?xml version="1.0" encoding="utf-8"?>
+<file path=ppt/diagrams/drawing3.xml><?xml version="1.0" encoding="utf-8"?>
 <dsp:drawing xmlns:dgm="http://schemas.openxmlformats.org/drawingml/2006/diagram" xmlns:dsp="http://schemas.microsoft.com/office/drawing/2008/diagram" xmlns:a="http://schemas.openxmlformats.org/drawingml/2006/main">
   <dsp:spTree>
     <dsp:nvGrpSpPr>
@@ -4645,6 +6638,569 @@
 </file>
 
 <file path=ppt/diagrams/layout1.xml><?xml version="1.0" encoding="utf-8"?>
+<dgm:layoutDef xmlns:dgm="http://schemas.openxmlformats.org/drawingml/2006/diagram" xmlns:a="http://schemas.openxmlformats.org/drawingml/2006/main" uniqueId="urn:microsoft.com/office/officeart/2005/8/layout/hierarchy1">
+  <dgm:title val=""/>
+  <dgm:desc val=""/>
+  <dgm:catLst>
+    <dgm:cat type="hierarchy" pri="2000"/>
+  </dgm:catLst>
+  <dgm:sampData>
+    <dgm:dataModel>
+      <dgm:ptLst>
+        <dgm:pt modelId="0" type="doc"/>
+        <dgm:pt modelId="1">
+          <dgm:prSet phldr="1"/>
+        </dgm:pt>
+        <dgm:pt modelId="2">
+          <dgm:prSet phldr="1"/>
+        </dgm:pt>
+        <dgm:pt modelId="21">
+          <dgm:prSet phldr="1"/>
+        </dgm:pt>
+        <dgm:pt modelId="22">
+          <dgm:prSet phldr="1"/>
+        </dgm:pt>
+        <dgm:pt modelId="3">
+          <dgm:prSet phldr="1"/>
+        </dgm:pt>
+        <dgm:pt modelId="31">
+          <dgm:prSet phldr="1"/>
+        </dgm:pt>
+      </dgm:ptLst>
+      <dgm:cxnLst>
+        <dgm:cxn modelId="4" srcId="0" destId="1" srcOrd="0" destOrd="0"/>
+        <dgm:cxn modelId="5" srcId="1" destId="2" srcOrd="0" destOrd="0"/>
+        <dgm:cxn modelId="6" srcId="1" destId="3" srcOrd="1" destOrd="0"/>
+        <dgm:cxn modelId="23" srcId="2" destId="21" srcOrd="0" destOrd="0"/>
+        <dgm:cxn modelId="24" srcId="2" destId="22" srcOrd="1" destOrd="0"/>
+        <dgm:cxn modelId="33" srcId="3" destId="31" srcOrd="0" destOrd="0"/>
+      </dgm:cxnLst>
+      <dgm:bg/>
+      <dgm:whole/>
+    </dgm:dataModel>
+  </dgm:sampData>
+  <dgm:styleData>
+    <dgm:dataModel>
+      <dgm:ptLst>
+        <dgm:pt modelId="0" type="doc"/>
+        <dgm:pt modelId="1"/>
+        <dgm:pt modelId="11"/>
+        <dgm:pt modelId="12"/>
+      </dgm:ptLst>
+      <dgm:cxnLst>
+        <dgm:cxn modelId="2" srcId="0" destId="1" srcOrd="0" destOrd="0"/>
+        <dgm:cxn modelId="13" srcId="1" destId="11" srcOrd="0" destOrd="0"/>
+        <dgm:cxn modelId="14" srcId="1" destId="12" srcOrd="1" destOrd="0"/>
+      </dgm:cxnLst>
+      <dgm:bg/>
+      <dgm:whole/>
+    </dgm:dataModel>
+  </dgm:styleData>
+  <dgm:clrData>
+    <dgm:dataModel>
+      <dgm:ptLst>
+        <dgm:pt modelId="0" type="doc"/>
+        <dgm:pt modelId="1"/>
+        <dgm:pt modelId="2"/>
+        <dgm:pt modelId="21"/>
+        <dgm:pt modelId="211"/>
+        <dgm:pt modelId="3"/>
+        <dgm:pt modelId="31"/>
+        <dgm:pt modelId="311"/>
+      </dgm:ptLst>
+      <dgm:cxnLst>
+        <dgm:cxn modelId="4" srcId="0" destId="1" srcOrd="0" destOrd="0"/>
+        <dgm:cxn modelId="5" srcId="1" destId="2" srcOrd="0" destOrd="0"/>
+        <dgm:cxn modelId="6" srcId="1" destId="3" srcOrd="1" destOrd="0"/>
+        <dgm:cxn modelId="23" srcId="2" destId="21" srcOrd="0" destOrd="0"/>
+        <dgm:cxn modelId="24" srcId="21" destId="211" srcOrd="0" destOrd="0"/>
+        <dgm:cxn modelId="33" srcId="3" destId="31" srcOrd="0" destOrd="0"/>
+        <dgm:cxn modelId="34" srcId="31" destId="311" srcOrd="0" destOrd="0"/>
+      </dgm:cxnLst>
+      <dgm:bg/>
+      <dgm:whole/>
+    </dgm:dataModel>
+  </dgm:clrData>
+  <dgm:layoutNode name="hierChild1">
+    <dgm:varLst>
+      <dgm:chPref val="1"/>
+      <dgm:dir/>
+      <dgm:animOne val="branch"/>
+      <dgm:animLvl val="lvl"/>
+      <dgm:resizeHandles/>
+    </dgm:varLst>
+    <dgm:choose name="Name0">
+      <dgm:if name="Name1" func="var" arg="dir" op="equ" val="norm">
+        <dgm:alg type="hierChild">
+          <dgm:param type="linDir" val="fromL"/>
+        </dgm:alg>
+      </dgm:if>
+      <dgm:else name="Name2">
+        <dgm:alg type="hierChild">
+          <dgm:param type="linDir" val="fromR"/>
+        </dgm:alg>
+      </dgm:else>
+    </dgm:choose>
+    <dgm:shape xmlns:r="http://schemas.openxmlformats.org/officeDocument/2006/relationships" r:blip="">
+      <dgm:adjLst/>
+    </dgm:shape>
+    <dgm:presOf/>
+    <dgm:constrLst>
+      <dgm:constr type="primFontSz" for="des" ptType="node" op="equ" val="65"/>
+      <dgm:constr type="w" for="des" forName="composite" refType="w"/>
+      <dgm:constr type="h" for="des" forName="composite" refType="w" refFor="des" refForName="composite" fact="0.667"/>
+      <dgm:constr type="w" for="des" forName="composite2" refType="w" refFor="des" refForName="composite"/>
+      <dgm:constr type="h" for="des" forName="composite2" refType="h" refFor="des" refForName="composite"/>
+      <dgm:constr type="w" for="des" forName="composite3" refType="w" refFor="des" refForName="composite"/>
+      <dgm:constr type="h" for="des" forName="composite3" refType="h" refFor="des" refForName="composite"/>
+      <dgm:constr type="w" for="des" forName="composite4" refType="w" refFor="des" refForName="composite"/>
+      <dgm:constr type="h" for="des" forName="composite4" refType="h" refFor="des" refForName="composite"/>
+      <dgm:constr type="w" for="des" forName="composite5" refType="w" refFor="des" refForName="composite"/>
+      <dgm:constr type="h" for="des" forName="composite5" refType="h" refFor="des" refForName="composite"/>
+      <dgm:constr type="sibSp" refType="w" refFor="des" refForName="composite" fact="0.1"/>
+      <dgm:constr type="sibSp" for="des" forName="hierChild2" refType="sibSp"/>
+      <dgm:constr type="sibSp" for="des" forName="hierChild3" refType="sibSp"/>
+      <dgm:constr type="sibSp" for="des" forName="hierChild4" refType="sibSp"/>
+      <dgm:constr type="sibSp" for="des" forName="hierChild5" refType="sibSp"/>
+      <dgm:constr type="sibSp" for="des" forName="hierChild6" refType="sibSp"/>
+      <dgm:constr type="sp" for="des" forName="hierRoot1" refType="h" refFor="des" refForName="composite" fact="0.25"/>
+      <dgm:constr type="sp" for="des" forName="hierRoot2" refType="sp" refFor="des" refForName="hierRoot1"/>
+      <dgm:constr type="sp" for="des" forName="hierRoot3" refType="sp" refFor="des" refForName="hierRoot1"/>
+      <dgm:constr type="sp" for="des" forName="hierRoot4" refType="sp" refFor="des" refForName="hierRoot1"/>
+      <dgm:constr type="sp" for="des" forName="hierRoot5" refType="sp" refFor="des" refForName="hierRoot1"/>
+    </dgm:constrLst>
+    <dgm:ruleLst/>
+    <dgm:forEach name="Name3" axis="ch">
+      <dgm:forEach name="Name4" axis="self" ptType="node">
+        <dgm:layoutNode name="hierRoot1">
+          <dgm:alg type="hierRoot"/>
+          <dgm:shape xmlns:r="http://schemas.openxmlformats.org/officeDocument/2006/relationships" r:blip="">
+            <dgm:adjLst/>
+          </dgm:shape>
+          <dgm:presOf/>
+          <dgm:constrLst>
+            <dgm:constr type="bendDist" for="des" ptType="parTrans" refType="sp" fact="0.5"/>
+          </dgm:constrLst>
+          <dgm:ruleLst/>
+          <dgm:layoutNode name="composite">
+            <dgm:alg type="composite"/>
+            <dgm:shape xmlns:r="http://schemas.openxmlformats.org/officeDocument/2006/relationships" r:blip="">
+              <dgm:adjLst/>
+            </dgm:shape>
+            <dgm:presOf/>
+            <dgm:constrLst>
+              <dgm:constr type="w" for="ch" forName="background" refType="w" fact="0.9"/>
+              <dgm:constr type="h" for="ch" forName="background" refType="w" refFor="ch" refForName="background" fact="0.635"/>
+              <dgm:constr type="t" for="ch" forName="background"/>
+              <dgm:constr type="l" for="ch" forName="background"/>
+              <dgm:constr type="w" for="ch" forName="text" refType="w" fact="0.9"/>
+              <dgm:constr type="h" for="ch" forName="text" refType="w" refFor="ch" refForName="text" fact="0.635"/>
+              <dgm:constr type="t" for="ch" forName="text" refType="w" fact="0.095"/>
+              <dgm:constr type="l" for="ch" forName="text" refType="w" fact="0.1"/>
+            </dgm:constrLst>
+            <dgm:ruleLst/>
+            <dgm:layoutNode name="background" styleLbl="node0" moveWith="text">
+              <dgm:alg type="sp"/>
+              <dgm:shape xmlns:r="http://schemas.openxmlformats.org/officeDocument/2006/relationships" type="roundRect" r:blip="">
+                <dgm:adjLst>
+                  <dgm:adj idx="1" val="0.1"/>
+                </dgm:adjLst>
+              </dgm:shape>
+              <dgm:presOf/>
+              <dgm:constrLst/>
+              <dgm:ruleLst/>
+            </dgm:layoutNode>
+            <dgm:layoutNode name="text" styleLbl="fgAcc0">
+              <dgm:varLst>
+                <dgm:chPref val="3"/>
+              </dgm:varLst>
+              <dgm:alg type="tx"/>
+              <dgm:shape xmlns:r="http://schemas.openxmlformats.org/officeDocument/2006/relationships" type="roundRect" r:blip="">
+                <dgm:adjLst>
+                  <dgm:adj idx="1" val="0.1"/>
+                </dgm:adjLst>
+              </dgm:shape>
+              <dgm:presOf axis="self"/>
+              <dgm:constrLst>
+                <dgm:constr type="tMarg" refType="primFontSz" fact="0.3"/>
+                <dgm:constr type="bMarg" refType="primFontSz" fact="0.3"/>
+                <dgm:constr type="lMarg" refType="primFontSz" fact="0.3"/>
+                <dgm:constr type="rMarg" refType="primFontSz" fact="0.3"/>
+              </dgm:constrLst>
+              <dgm:ruleLst>
+                <dgm:rule type="primFontSz" val="5" fact="NaN" max="NaN"/>
+              </dgm:ruleLst>
+            </dgm:layoutNode>
+          </dgm:layoutNode>
+          <dgm:layoutNode name="hierChild2">
+            <dgm:choose name="Name5">
+              <dgm:if name="Name6" func="var" arg="dir" op="equ" val="norm">
+                <dgm:alg type="hierChild">
+                  <dgm:param type="linDir" val="fromL"/>
+                </dgm:alg>
+              </dgm:if>
+              <dgm:else name="Name7">
+                <dgm:alg type="hierChild">
+                  <dgm:param type="linDir" val="fromR"/>
+                </dgm:alg>
+              </dgm:else>
+            </dgm:choose>
+            <dgm:shape xmlns:r="http://schemas.openxmlformats.org/officeDocument/2006/relationships" r:blip="">
+              <dgm:adjLst/>
+            </dgm:shape>
+            <dgm:presOf/>
+            <dgm:constrLst/>
+            <dgm:ruleLst/>
+            <dgm:forEach name="Name8" axis="ch">
+              <dgm:forEach name="Name9" axis="self" ptType="parTrans" cnt="1">
+                <dgm:layoutNode name="Name10">
+                  <dgm:alg type="conn">
+                    <dgm:param type="dim" val="1D"/>
+                    <dgm:param type="endSty" val="noArr"/>
+                    <dgm:param type="connRout" val="bend"/>
+                    <dgm:param type="bendPt" val="end"/>
+                    <dgm:param type="begPts" val="bCtr"/>
+                    <dgm:param type="endPts" val="tCtr"/>
+                    <dgm:param type="srcNode" val="background"/>
+                    <dgm:param type="dstNode" val="background2"/>
+                  </dgm:alg>
+                  <dgm:shape xmlns:r="http://schemas.openxmlformats.org/officeDocument/2006/relationships" type="conn" r:blip="" zOrderOff="-999">
+                    <dgm:adjLst/>
+                  </dgm:shape>
+                  <dgm:presOf axis="self"/>
+                  <dgm:constrLst>
+                    <dgm:constr type="begPad"/>
+                    <dgm:constr type="endPad"/>
+                  </dgm:constrLst>
+                  <dgm:ruleLst/>
+                </dgm:layoutNode>
+              </dgm:forEach>
+              <dgm:forEach name="Name11" axis="self" ptType="node">
+                <dgm:layoutNode name="hierRoot2">
+                  <dgm:alg type="hierRoot"/>
+                  <dgm:shape xmlns:r="http://schemas.openxmlformats.org/officeDocument/2006/relationships" r:blip="">
+                    <dgm:adjLst/>
+                  </dgm:shape>
+                  <dgm:presOf/>
+                  <dgm:constrLst>
+                    <dgm:constr type="bendDist" for="des" ptType="parTrans" refType="sp" fact="0.5"/>
+                  </dgm:constrLst>
+                  <dgm:ruleLst/>
+                  <dgm:layoutNode name="composite2">
+                    <dgm:alg type="composite"/>
+                    <dgm:shape xmlns:r="http://schemas.openxmlformats.org/officeDocument/2006/relationships" r:blip="">
+                      <dgm:adjLst/>
+                    </dgm:shape>
+                    <dgm:presOf/>
+                    <dgm:constrLst>
+                      <dgm:constr type="w" for="ch" forName="background2" refType="w" fact="0.9"/>
+                      <dgm:constr type="h" for="ch" forName="background2" refType="w" refFor="ch" refForName="background2" fact="0.635"/>
+                      <dgm:constr type="t" for="ch" forName="background2"/>
+                      <dgm:constr type="l" for="ch" forName="background2"/>
+                      <dgm:constr type="w" for="ch" forName="text2" refType="w" fact="0.9"/>
+                      <dgm:constr type="h" for="ch" forName="text2" refType="w" refFor="ch" refForName="text2" fact="0.635"/>
+                      <dgm:constr type="t" for="ch" forName="text2" refType="w" fact="0.095"/>
+                      <dgm:constr type="l" for="ch" forName="text2" refType="w" fact="0.1"/>
+                    </dgm:constrLst>
+                    <dgm:ruleLst/>
+                    <dgm:layoutNode name="background2" moveWith="text2">
+                      <dgm:alg type="sp"/>
+                      <dgm:shape xmlns:r="http://schemas.openxmlformats.org/officeDocument/2006/relationships" type="roundRect" r:blip="">
+                        <dgm:adjLst>
+                          <dgm:adj idx="1" val="0.1"/>
+                        </dgm:adjLst>
+                      </dgm:shape>
+                      <dgm:presOf/>
+                      <dgm:constrLst/>
+                      <dgm:ruleLst/>
+                    </dgm:layoutNode>
+                    <dgm:layoutNode name="text2" styleLbl="fgAcc2">
+                      <dgm:varLst>
+                        <dgm:chPref val="3"/>
+                      </dgm:varLst>
+                      <dgm:alg type="tx"/>
+                      <dgm:shape xmlns:r="http://schemas.openxmlformats.org/officeDocument/2006/relationships" type="roundRect" r:blip="">
+                        <dgm:adjLst>
+                          <dgm:adj idx="1" val="0.1"/>
+                        </dgm:adjLst>
+                      </dgm:shape>
+                      <dgm:presOf axis="self"/>
+                      <dgm:constrLst>
+                        <dgm:constr type="tMarg" refType="primFontSz" fact="0.3"/>
+                        <dgm:constr type="bMarg" refType="primFontSz" fact="0.3"/>
+                        <dgm:constr type="lMarg" refType="primFontSz" fact="0.3"/>
+                        <dgm:constr type="rMarg" refType="primFontSz" fact="0.3"/>
+                      </dgm:constrLst>
+                      <dgm:ruleLst>
+                        <dgm:rule type="primFontSz" val="5" fact="NaN" max="NaN"/>
+                      </dgm:ruleLst>
+                    </dgm:layoutNode>
+                  </dgm:layoutNode>
+                  <dgm:layoutNode name="hierChild3">
+                    <dgm:choose name="Name12">
+                      <dgm:if name="Name13" func="var" arg="dir" op="equ" val="norm">
+                        <dgm:alg type="hierChild">
+                          <dgm:param type="linDir" val="fromL"/>
+                        </dgm:alg>
+                      </dgm:if>
+                      <dgm:else name="Name14">
+                        <dgm:alg type="hierChild">
+                          <dgm:param type="linDir" val="fromR"/>
+                        </dgm:alg>
+                      </dgm:else>
+                    </dgm:choose>
+                    <dgm:shape xmlns:r="http://schemas.openxmlformats.org/officeDocument/2006/relationships" r:blip="">
+                      <dgm:adjLst/>
+                    </dgm:shape>
+                    <dgm:presOf/>
+                    <dgm:constrLst/>
+                    <dgm:ruleLst/>
+                    <dgm:forEach name="Name15" axis="ch">
+                      <dgm:forEach name="Name16" axis="self" ptType="parTrans" cnt="1">
+                        <dgm:layoutNode name="Name17">
+                          <dgm:alg type="conn">
+                            <dgm:param type="dim" val="1D"/>
+                            <dgm:param type="endSty" val="noArr"/>
+                            <dgm:param type="connRout" val="bend"/>
+                            <dgm:param type="bendPt" val="end"/>
+                            <dgm:param type="begPts" val="bCtr"/>
+                            <dgm:param type="endPts" val="tCtr"/>
+                            <dgm:param type="srcNode" val="background2"/>
+                            <dgm:param type="dstNode" val="background3"/>
+                          </dgm:alg>
+                          <dgm:shape xmlns:r="http://schemas.openxmlformats.org/officeDocument/2006/relationships" type="conn" r:blip="" zOrderOff="-999">
+                            <dgm:adjLst/>
+                          </dgm:shape>
+                          <dgm:presOf axis="self"/>
+                          <dgm:constrLst>
+                            <dgm:constr type="begPad"/>
+                            <dgm:constr type="endPad"/>
+                          </dgm:constrLst>
+                          <dgm:ruleLst/>
+                        </dgm:layoutNode>
+                      </dgm:forEach>
+                      <dgm:forEach name="Name18" axis="self" ptType="node">
+                        <dgm:layoutNode name="hierRoot3">
+                          <dgm:alg type="hierRoot"/>
+                          <dgm:shape xmlns:r="http://schemas.openxmlformats.org/officeDocument/2006/relationships" r:blip="">
+                            <dgm:adjLst/>
+                          </dgm:shape>
+                          <dgm:presOf/>
+                          <dgm:constrLst>
+                            <dgm:constr type="bendDist" for="des" ptType="parTrans" refType="sp" fact="0.5"/>
+                          </dgm:constrLst>
+                          <dgm:ruleLst/>
+                          <dgm:layoutNode name="composite3">
+                            <dgm:alg type="composite"/>
+                            <dgm:shape xmlns:r="http://schemas.openxmlformats.org/officeDocument/2006/relationships" r:blip="">
+                              <dgm:adjLst/>
+                            </dgm:shape>
+                            <dgm:presOf/>
+                            <dgm:constrLst>
+                              <dgm:constr type="w" for="ch" forName="background3" refType="w" fact="0.9"/>
+                              <dgm:constr type="h" for="ch" forName="background3" refType="w" refFor="ch" refForName="background3" fact="0.635"/>
+                              <dgm:constr type="t" for="ch" forName="background3"/>
+                              <dgm:constr type="l" for="ch" forName="background3"/>
+                              <dgm:constr type="w" for="ch" forName="text3" refType="w" fact="0.9"/>
+                              <dgm:constr type="h" for="ch" forName="text3" refType="w" refFor="ch" refForName="text3" fact="0.635"/>
+                              <dgm:constr type="t" for="ch" forName="text3" refType="w" fact="0.095"/>
+                              <dgm:constr type="l" for="ch" forName="text3" refType="w" fact="0.1"/>
+                            </dgm:constrLst>
+                            <dgm:ruleLst/>
+                            <dgm:layoutNode name="background3" moveWith="text3">
+                              <dgm:alg type="sp"/>
+                              <dgm:shape xmlns:r="http://schemas.openxmlformats.org/officeDocument/2006/relationships" type="roundRect" r:blip="">
+                                <dgm:adjLst>
+                                  <dgm:adj idx="1" val="0.1"/>
+                                </dgm:adjLst>
+                              </dgm:shape>
+                              <dgm:presOf/>
+                              <dgm:constrLst/>
+                              <dgm:ruleLst/>
+                            </dgm:layoutNode>
+                            <dgm:layoutNode name="text3" styleLbl="fgAcc3">
+                              <dgm:varLst>
+                                <dgm:chPref val="3"/>
+                              </dgm:varLst>
+                              <dgm:alg type="tx"/>
+                              <dgm:shape xmlns:r="http://schemas.openxmlformats.org/officeDocument/2006/relationships" type="roundRect" r:blip="">
+                                <dgm:adjLst>
+                                  <dgm:adj idx="1" val="0.1"/>
+                                </dgm:adjLst>
+                              </dgm:shape>
+                              <dgm:presOf axis="self"/>
+                              <dgm:constrLst>
+                                <dgm:constr type="tMarg" refType="primFontSz" fact="0.3"/>
+                                <dgm:constr type="bMarg" refType="primFontSz" fact="0.3"/>
+                                <dgm:constr type="lMarg" refType="primFontSz" fact="0.3"/>
+                                <dgm:constr type="rMarg" refType="primFontSz" fact="0.3"/>
+                              </dgm:constrLst>
+                              <dgm:ruleLst>
+                                <dgm:rule type="primFontSz" val="5" fact="NaN" max="NaN"/>
+                              </dgm:ruleLst>
+                            </dgm:layoutNode>
+                          </dgm:layoutNode>
+                          <dgm:layoutNode name="hierChild4">
+                            <dgm:choose name="Name19">
+                              <dgm:if name="Name20" func="var" arg="dir" op="equ" val="norm">
+                                <dgm:alg type="hierChild">
+                                  <dgm:param type="linDir" val="fromL"/>
+                                </dgm:alg>
+                              </dgm:if>
+                              <dgm:else name="Name21">
+                                <dgm:alg type="hierChild">
+                                  <dgm:param type="linDir" val="fromR"/>
+                                </dgm:alg>
+                              </dgm:else>
+                            </dgm:choose>
+                            <dgm:shape xmlns:r="http://schemas.openxmlformats.org/officeDocument/2006/relationships" r:blip="">
+                              <dgm:adjLst/>
+                            </dgm:shape>
+                            <dgm:presOf/>
+                            <dgm:constrLst/>
+                            <dgm:ruleLst/>
+                            <dgm:forEach name="repeat" axis="ch">
+                              <dgm:forEach name="Name22" axis="self" ptType="parTrans" cnt="1">
+                                <dgm:layoutNode name="Name23">
+                                  <dgm:choose name="Name24">
+                                    <dgm:if name="Name25" axis="self" func="depth" op="lte" val="4">
+                                      <dgm:alg type="conn">
+                                        <dgm:param type="dim" val="1D"/>
+                                        <dgm:param type="endSty" val="noArr"/>
+                                        <dgm:param type="connRout" val="bend"/>
+                                        <dgm:param type="bendPt" val="end"/>
+                                        <dgm:param type="begPts" val="bCtr"/>
+                                        <dgm:param type="endPts" val="tCtr"/>
+                                        <dgm:param type="srcNode" val="background3"/>
+                                        <dgm:param type="dstNode" val="background4"/>
+                                      </dgm:alg>
+                                    </dgm:if>
+                                    <dgm:else name="Name26">
+                                      <dgm:alg type="conn">
+                                        <dgm:param type="dim" val="1D"/>
+                                        <dgm:param type="endSty" val="noArr"/>
+                                        <dgm:param type="connRout" val="bend"/>
+                                        <dgm:param type="bendPt" val="end"/>
+                                        <dgm:param type="begPts" val="bCtr"/>
+                                        <dgm:param type="endPts" val="tCtr"/>
+                                        <dgm:param type="srcNode" val="background4"/>
+                                        <dgm:param type="dstNode" val="background4"/>
+                                      </dgm:alg>
+                                    </dgm:else>
+                                  </dgm:choose>
+                                  <dgm:shape xmlns:r="http://schemas.openxmlformats.org/officeDocument/2006/relationships" type="conn" r:blip="" zOrderOff="-999">
+                                    <dgm:adjLst/>
+                                  </dgm:shape>
+                                  <dgm:presOf axis="self"/>
+                                  <dgm:constrLst>
+                                    <dgm:constr type="begPad"/>
+                                    <dgm:constr type="endPad"/>
+                                  </dgm:constrLst>
+                                  <dgm:ruleLst/>
+                                </dgm:layoutNode>
+                              </dgm:forEach>
+                              <dgm:forEach name="Name27" axis="self" ptType="node">
+                                <dgm:layoutNode name="hierRoot4">
+                                  <dgm:alg type="hierRoot"/>
+                                  <dgm:shape xmlns:r="http://schemas.openxmlformats.org/officeDocument/2006/relationships" r:blip="">
+                                    <dgm:adjLst/>
+                                  </dgm:shape>
+                                  <dgm:presOf/>
+                                  <dgm:constrLst>
+                                    <dgm:constr type="bendDist" for="des" ptType="parTrans" refType="sp" fact="0.5"/>
+                                  </dgm:constrLst>
+                                  <dgm:ruleLst/>
+                                  <dgm:layoutNode name="composite4">
+                                    <dgm:alg type="composite"/>
+                                    <dgm:shape xmlns:r="http://schemas.openxmlformats.org/officeDocument/2006/relationships" r:blip="">
+                                      <dgm:adjLst/>
+                                    </dgm:shape>
+                                    <dgm:presOf/>
+                                    <dgm:constrLst>
+                                      <dgm:constr type="w" for="ch" forName="background4" refType="w" fact="0.9"/>
+                                      <dgm:constr type="h" for="ch" forName="background4" refType="w" refFor="ch" refForName="background4" fact="0.635"/>
+                                      <dgm:constr type="t" for="ch" forName="background4"/>
+                                      <dgm:constr type="l" for="ch" forName="background4"/>
+                                      <dgm:constr type="w" for="ch" forName="text4" refType="w" fact="0.9"/>
+                                      <dgm:constr type="h" for="ch" forName="text4" refType="w" refFor="ch" refForName="text4" fact="0.635"/>
+                                      <dgm:constr type="t" for="ch" forName="text4" refType="w" fact="0.095"/>
+                                      <dgm:constr type="l" for="ch" forName="text4" refType="w" fact="0.1"/>
+                                    </dgm:constrLst>
+                                    <dgm:ruleLst/>
+                                    <dgm:layoutNode name="background4" moveWith="text4">
+                                      <dgm:alg type="sp"/>
+                                      <dgm:shape xmlns:r="http://schemas.openxmlformats.org/officeDocument/2006/relationships" type="roundRect" r:blip="">
+                                        <dgm:adjLst>
+                                          <dgm:adj idx="1" val="0.1"/>
+                                        </dgm:adjLst>
+                                      </dgm:shape>
+                                      <dgm:presOf/>
+                                      <dgm:constrLst/>
+                                      <dgm:ruleLst/>
+                                    </dgm:layoutNode>
+                                    <dgm:layoutNode name="text4" styleLbl="fgAcc4">
+                                      <dgm:varLst>
+                                        <dgm:chPref val="3"/>
+                                      </dgm:varLst>
+                                      <dgm:alg type="tx"/>
+                                      <dgm:shape xmlns:r="http://schemas.openxmlformats.org/officeDocument/2006/relationships" type="roundRect" r:blip="">
+                                        <dgm:adjLst>
+                                          <dgm:adj idx="1" val="0.1"/>
+                                        </dgm:adjLst>
+                                      </dgm:shape>
+                                      <dgm:presOf axis="self"/>
+                                      <dgm:constrLst>
+                                        <dgm:constr type="tMarg" refType="primFontSz" fact="0.3"/>
+                                        <dgm:constr type="bMarg" refType="primFontSz" fact="0.3"/>
+                                        <dgm:constr type="lMarg" refType="primFontSz" fact="0.3"/>
+                                        <dgm:constr type="rMarg" refType="primFontSz" fact="0.3"/>
+                                      </dgm:constrLst>
+                                      <dgm:ruleLst>
+                                        <dgm:rule type="primFontSz" val="5" fact="NaN" max="NaN"/>
+                                      </dgm:ruleLst>
+                                    </dgm:layoutNode>
+                                  </dgm:layoutNode>
+                                  <dgm:layoutNode name="hierChild5">
+                                    <dgm:choose name="Name28">
+                                      <dgm:if name="Name29" func="var" arg="dir" op="equ" val="norm">
+                                        <dgm:alg type="hierChild">
+                                          <dgm:param type="linDir" val="fromL"/>
+                                        </dgm:alg>
+                                      </dgm:if>
+                                      <dgm:else name="Name30">
+                                        <dgm:alg type="hierChild">
+                                          <dgm:param type="linDir" val="fromR"/>
+                                        </dgm:alg>
+                                      </dgm:else>
+                                    </dgm:choose>
+                                    <dgm:shape xmlns:r="http://schemas.openxmlformats.org/officeDocument/2006/relationships" r:blip="">
+                                      <dgm:adjLst/>
+                                    </dgm:shape>
+                                    <dgm:presOf/>
+                                    <dgm:constrLst/>
+                                    <dgm:ruleLst/>
+                                    <dgm:forEach name="Name31" ref="repeat"/>
+                                  </dgm:layoutNode>
+                                </dgm:layoutNode>
+                              </dgm:forEach>
+                            </dgm:forEach>
+                          </dgm:layoutNode>
+                        </dgm:layoutNode>
+                      </dgm:forEach>
+                    </dgm:forEach>
+                  </dgm:layoutNode>
+                </dgm:layoutNode>
+              </dgm:forEach>
+            </dgm:forEach>
+          </dgm:layoutNode>
+        </dgm:layoutNode>
+      </dgm:forEach>
+    </dgm:forEach>
+  </dgm:layoutNode>
+</dgm:layoutDef>
+</file>
+
+<file path=ppt/diagrams/layout2.xml><?xml version="1.0" encoding="utf-8"?>
 <dgm:layoutDef xmlns:dgm="http://schemas.openxmlformats.org/drawingml/2006/diagram" xmlns:a="http://schemas.openxmlformats.org/drawingml/2006/main" uniqueId="urn:microsoft.com/office/officeart/2008/layout/AlternatingHexagons">
   <dgm:title val=""/>
   <dgm:desc val=""/>
@@ -4999,7 +7555,7 @@
 </dgm:layoutDef>
 </file>
 
-<file path=ppt/diagrams/layout2.xml><?xml version="1.0" encoding="utf-8"?>
+<file path=ppt/diagrams/layout3.xml><?xml version="1.0" encoding="utf-8"?>
 <dgm:layoutDef xmlns:dgm="http://schemas.openxmlformats.org/drawingml/2006/diagram" xmlns:a="http://schemas.openxmlformats.org/drawingml/2006/main" uniqueId="urn:microsoft.com/office/officeart/2005/8/layout/default">
   <dgm:title val=""/>
   <dgm:desc val=""/>
@@ -6181,6 +8737,1040 @@
 </file>
 
 <file path=ppt/diagrams/quickStyle2.xml><?xml version="1.0" encoding="utf-8"?>
+<dgm:styleDef xmlns:dgm="http://schemas.openxmlformats.org/drawingml/2006/diagram" xmlns:a="http://schemas.openxmlformats.org/drawingml/2006/main" uniqueId="urn:microsoft.com/office/officeart/2005/8/quickstyle/simple1">
+  <dgm:title val=""/>
+  <dgm:desc val=""/>
+  <dgm:catLst>
+    <dgm:cat type="simple" pri="10100"/>
+  </dgm:catLst>
+  <dgm:scene3d>
+    <a:camera prst="orthographicFront"/>
+    <a:lightRig rig="threePt" dir="t"/>
+  </dgm:scene3d>
+  <dgm:styleLbl name="node0">
+    <dgm:scene3d>
+      <a:camera prst="orthographicFront"/>
+      <a:lightRig rig="threePt" dir="t"/>
+    </dgm:scene3d>
+    <dgm:sp3d/>
+    <dgm:txPr/>
+    <dgm:style>
+      <a:lnRef idx="2">
+        <a:scrgbClr r="0" g="0" b="0"/>
+      </a:lnRef>
+      <a:fillRef idx="1">
+        <a:scrgbClr r="0" g="0" b="0"/>
+      </a:fillRef>
+      <a:effectRef idx="0">
+        <a:scrgbClr r="0" g="0" b="0"/>
+      </a:effectRef>
+      <a:fontRef idx="minor">
+        <a:schemeClr val="lt1"/>
+      </a:fontRef>
+    </dgm:style>
+  </dgm:styleLbl>
+  <dgm:styleLbl name="lnNode1">
+    <dgm:scene3d>
+      <a:camera prst="orthographicFront"/>
+      <a:lightRig rig="threePt" dir="t"/>
+    </dgm:scene3d>
+    <dgm:sp3d/>
+    <dgm:txPr/>
+    <dgm:style>
+      <a:lnRef idx="2">
+        <a:scrgbClr r="0" g="0" b="0"/>
+      </a:lnRef>
+      <a:fillRef idx="1">
+        <a:scrgbClr r="0" g="0" b="0"/>
+      </a:fillRef>
+      <a:effectRef idx="0">
+        <a:scrgbClr r="0" g="0" b="0"/>
+      </a:effectRef>
+      <a:fontRef idx="minor">
+        <a:schemeClr val="lt1"/>
+      </a:fontRef>
+    </dgm:style>
+  </dgm:styleLbl>
+  <dgm:styleLbl name="vennNode1">
+    <dgm:scene3d>
+      <a:camera prst="orthographicFront"/>
+      <a:lightRig rig="threePt" dir="t"/>
+    </dgm:scene3d>
+    <dgm:sp3d/>
+    <dgm:txPr/>
+    <dgm:style>
+      <a:lnRef idx="2">
+        <a:scrgbClr r="0" g="0" b="0"/>
+      </a:lnRef>
+      <a:fillRef idx="1">
+        <a:scrgbClr r="0" g="0" b="0"/>
+      </a:fillRef>
+      <a:effectRef idx="0">
+        <a:scrgbClr r="0" g="0" b="0"/>
+      </a:effectRef>
+      <a:fontRef idx="minor">
+        <a:schemeClr val="tx1"/>
+      </a:fontRef>
+    </dgm:style>
+  </dgm:styleLbl>
+  <dgm:styleLbl name="alignNode1">
+    <dgm:scene3d>
+      <a:camera prst="orthographicFront"/>
+      <a:lightRig rig="threePt" dir="t"/>
+    </dgm:scene3d>
+    <dgm:sp3d/>
+    <dgm:txPr/>
+    <dgm:style>
+      <a:lnRef idx="2">
+        <a:scrgbClr r="0" g="0" b="0"/>
+      </a:lnRef>
+      <a:fillRef idx="1">
+        <a:scrgbClr r="0" g="0" b="0"/>
+      </a:fillRef>
+      <a:effectRef idx="0">
+        <a:scrgbClr r="0" g="0" b="0"/>
+      </a:effectRef>
+      <a:fontRef idx="minor">
+        <a:schemeClr val="lt1"/>
+      </a:fontRef>
+    </dgm:style>
+  </dgm:styleLbl>
+  <dgm:styleLbl name="node1">
+    <dgm:scene3d>
+      <a:camera prst="orthographicFront"/>
+      <a:lightRig rig="threePt" dir="t"/>
+    </dgm:scene3d>
+    <dgm:sp3d/>
+    <dgm:txPr/>
+    <dgm:style>
+      <a:lnRef idx="2">
+        <a:scrgbClr r="0" g="0" b="0"/>
+      </a:lnRef>
+      <a:fillRef idx="1">
+        <a:scrgbClr r="0" g="0" b="0"/>
+      </a:fillRef>
+      <a:effectRef idx="0">
+        <a:scrgbClr r="0" g="0" b="0"/>
+      </a:effectRef>
+      <a:fontRef idx="minor">
+        <a:schemeClr val="lt1"/>
+      </a:fontRef>
+    </dgm:style>
+  </dgm:styleLbl>
+  <dgm:styleLbl name="node2">
+    <dgm:scene3d>
+      <a:camera prst="orthographicFront"/>
+      <a:lightRig rig="threePt" dir="t"/>
+    </dgm:scene3d>
+    <dgm:sp3d/>
+    <dgm:txPr/>
+    <dgm:style>
+      <a:lnRef idx="2">
+        <a:scrgbClr r="0" g="0" b="0"/>
+      </a:lnRef>
+      <a:fillRef idx="1">
+        <a:scrgbClr r="0" g="0" b="0"/>
+      </a:fillRef>
+      <a:effectRef idx="0">
+        <a:scrgbClr r="0" g="0" b="0"/>
+      </a:effectRef>
+      <a:fontRef idx="minor">
+        <a:schemeClr val="lt1"/>
+      </a:fontRef>
+    </dgm:style>
+  </dgm:styleLbl>
+  <dgm:styleLbl name="node3">
+    <dgm:scene3d>
+      <a:camera prst="orthographicFront"/>
+      <a:lightRig rig="threePt" dir="t"/>
+    </dgm:scene3d>
+    <dgm:sp3d/>
+    <dgm:txPr/>
+    <dgm:style>
+      <a:lnRef idx="2">
+        <a:scrgbClr r="0" g="0" b="0"/>
+      </a:lnRef>
+      <a:fillRef idx="1">
+        <a:scrgbClr r="0" g="0" b="0"/>
+      </a:fillRef>
+      <a:effectRef idx="0">
+        <a:scrgbClr r="0" g="0" b="0"/>
+      </a:effectRef>
+      <a:fontRef idx="minor">
+        <a:schemeClr val="lt1"/>
+      </a:fontRef>
+    </dgm:style>
+  </dgm:styleLbl>
+  <dgm:styleLbl name="node4">
+    <dgm:scene3d>
+      <a:camera prst="orthographicFront"/>
+      <a:lightRig rig="threePt" dir="t"/>
+    </dgm:scene3d>
+    <dgm:sp3d/>
+    <dgm:txPr/>
+    <dgm:style>
+      <a:lnRef idx="2">
+        <a:scrgbClr r="0" g="0" b="0"/>
+      </a:lnRef>
+      <a:fillRef idx="1">
+        <a:scrgbClr r="0" g="0" b="0"/>
+      </a:fillRef>
+      <a:effectRef idx="0">
+        <a:scrgbClr r="0" g="0" b="0"/>
+      </a:effectRef>
+      <a:fontRef idx="minor">
+        <a:schemeClr val="lt1"/>
+      </a:fontRef>
+    </dgm:style>
+  </dgm:styleLbl>
+  <dgm:styleLbl name="fgImgPlace1">
+    <dgm:scene3d>
+      <a:camera prst="orthographicFront"/>
+      <a:lightRig rig="threePt" dir="t"/>
+    </dgm:scene3d>
+    <dgm:sp3d/>
+    <dgm:txPr/>
+    <dgm:style>
+      <a:lnRef idx="2">
+        <a:scrgbClr r="0" g="0" b="0"/>
+      </a:lnRef>
+      <a:fillRef idx="1">
+        <a:scrgbClr r="0" g="0" b="0"/>
+      </a:fillRef>
+      <a:effectRef idx="0">
+        <a:scrgbClr r="0" g="0" b="0"/>
+      </a:effectRef>
+      <a:fontRef idx="minor"/>
+    </dgm:style>
+  </dgm:styleLbl>
+  <dgm:styleLbl name="alignImgPlace1">
+    <dgm:scene3d>
+      <a:camera prst="orthographicFront"/>
+      <a:lightRig rig="threePt" dir="t"/>
+    </dgm:scene3d>
+    <dgm:sp3d/>
+    <dgm:txPr/>
+    <dgm:style>
+      <a:lnRef idx="2">
+        <a:scrgbClr r="0" g="0" b="0"/>
+      </a:lnRef>
+      <a:fillRef idx="1">
+        <a:scrgbClr r="0" g="0" b="0"/>
+      </a:fillRef>
+      <a:effectRef idx="0">
+        <a:scrgbClr r="0" g="0" b="0"/>
+      </a:effectRef>
+      <a:fontRef idx="minor"/>
+    </dgm:style>
+  </dgm:styleLbl>
+  <dgm:styleLbl name="bgImgPlace1">
+    <dgm:scene3d>
+      <a:camera prst="orthographicFront"/>
+      <a:lightRig rig="threePt" dir="t"/>
+    </dgm:scene3d>
+    <dgm:sp3d/>
+    <dgm:txPr/>
+    <dgm:style>
+      <a:lnRef idx="2">
+        <a:scrgbClr r="0" g="0" b="0"/>
+      </a:lnRef>
+      <a:fillRef idx="1">
+        <a:scrgbClr r="0" g="0" b="0"/>
+      </a:fillRef>
+      <a:effectRef idx="0">
+        <a:scrgbClr r="0" g="0" b="0"/>
+      </a:effectRef>
+      <a:fontRef idx="minor"/>
+    </dgm:style>
+  </dgm:styleLbl>
+  <dgm:styleLbl name="sibTrans2D1">
+    <dgm:scene3d>
+      <a:camera prst="orthographicFront"/>
+      <a:lightRig rig="threePt" dir="t"/>
+    </dgm:scene3d>
+    <dgm:sp3d/>
+    <dgm:txPr/>
+    <dgm:style>
+      <a:lnRef idx="0">
+        <a:scrgbClr r="0" g="0" b="0"/>
+      </a:lnRef>
+      <a:fillRef idx="1">
+        <a:scrgbClr r="0" g="0" b="0"/>
+      </a:fillRef>
+      <a:effectRef idx="0">
+        <a:scrgbClr r="0" g="0" b="0"/>
+      </a:effectRef>
+      <a:fontRef idx="minor">
+        <a:schemeClr val="lt1"/>
+      </a:fontRef>
+    </dgm:style>
+  </dgm:styleLbl>
+  <dgm:styleLbl name="fgSibTrans2D1">
+    <dgm:scene3d>
+      <a:camera prst="orthographicFront"/>
+      <a:lightRig rig="threePt" dir="t"/>
+    </dgm:scene3d>
+    <dgm:sp3d/>
+    <dgm:txPr/>
+    <dgm:style>
+      <a:lnRef idx="0">
+        <a:scrgbClr r="0" g="0" b="0"/>
+      </a:lnRef>
+      <a:fillRef idx="1">
+        <a:scrgbClr r="0" g="0" b="0"/>
+      </a:fillRef>
+      <a:effectRef idx="0">
+        <a:scrgbClr r="0" g="0" b="0"/>
+      </a:effectRef>
+      <a:fontRef idx="minor">
+        <a:schemeClr val="lt1"/>
+      </a:fontRef>
+    </dgm:style>
+  </dgm:styleLbl>
+  <dgm:styleLbl name="bgSibTrans2D1">
+    <dgm:scene3d>
+      <a:camera prst="orthographicFront"/>
+      <a:lightRig rig="threePt" dir="t"/>
+    </dgm:scene3d>
+    <dgm:sp3d/>
+    <dgm:txPr/>
+    <dgm:style>
+      <a:lnRef idx="0">
+        <a:scrgbClr r="0" g="0" b="0"/>
+      </a:lnRef>
+      <a:fillRef idx="1">
+        <a:scrgbClr r="0" g="0" b="0"/>
+      </a:fillRef>
+      <a:effectRef idx="0">
+        <a:scrgbClr r="0" g="0" b="0"/>
+      </a:effectRef>
+      <a:fontRef idx="minor">
+        <a:schemeClr val="lt1"/>
+      </a:fontRef>
+    </dgm:style>
+  </dgm:styleLbl>
+  <dgm:styleLbl name="sibTrans1D1">
+    <dgm:scene3d>
+      <a:camera prst="orthographicFront"/>
+      <a:lightRig rig="threePt" dir="t"/>
+    </dgm:scene3d>
+    <dgm:sp3d/>
+    <dgm:txPr/>
+    <dgm:style>
+      <a:lnRef idx="1">
+        <a:scrgbClr r="0" g="0" b="0"/>
+      </a:lnRef>
+      <a:fillRef idx="0">
+        <a:scrgbClr r="0" g="0" b="0"/>
+      </a:fillRef>
+      <a:effectRef idx="0">
+        <a:scrgbClr r="0" g="0" b="0"/>
+      </a:effectRef>
+      <a:fontRef idx="minor"/>
+    </dgm:style>
+  </dgm:styleLbl>
+  <dgm:styleLbl name="callout">
+    <dgm:scene3d>
+      <a:camera prst="orthographicFront"/>
+      <a:lightRig rig="threePt" dir="t"/>
+    </dgm:scene3d>
+    <dgm:sp3d/>
+    <dgm:txPr/>
+    <dgm:style>
+      <a:lnRef idx="2">
+        <a:scrgbClr r="0" g="0" b="0"/>
+      </a:lnRef>
+      <a:fillRef idx="1">
+        <a:scrgbClr r="0" g="0" b="0"/>
+      </a:fillRef>
+      <a:effectRef idx="0">
+        <a:scrgbClr r="0" g="0" b="0"/>
+      </a:effectRef>
+      <a:fontRef idx="minor"/>
+    </dgm:style>
+  </dgm:styleLbl>
+  <dgm:styleLbl name="asst0">
+    <dgm:scene3d>
+      <a:camera prst="orthographicFront"/>
+      <a:lightRig rig="threePt" dir="t"/>
+    </dgm:scene3d>
+    <dgm:sp3d/>
+    <dgm:txPr/>
+    <dgm:style>
+      <a:lnRef idx="2">
+        <a:scrgbClr r="0" g="0" b="0"/>
+      </a:lnRef>
+      <a:fillRef idx="1">
+        <a:scrgbClr r="0" g="0" b="0"/>
+      </a:fillRef>
+      <a:effectRef idx="0">
+        <a:scrgbClr r="0" g="0" b="0"/>
+      </a:effectRef>
+      <a:fontRef idx="minor">
+        <a:schemeClr val="lt1"/>
+      </a:fontRef>
+    </dgm:style>
+  </dgm:styleLbl>
+  <dgm:styleLbl name="asst1">
+    <dgm:scene3d>
+      <a:camera prst="orthographicFront"/>
+      <a:lightRig rig="threePt" dir="t"/>
+    </dgm:scene3d>
+    <dgm:sp3d/>
+    <dgm:txPr/>
+    <dgm:style>
+      <a:lnRef idx="2">
+        <a:scrgbClr r="0" g="0" b="0"/>
+      </a:lnRef>
+      <a:fillRef idx="1">
+        <a:scrgbClr r="0" g="0" b="0"/>
+      </a:fillRef>
+      <a:effectRef idx="0">
+        <a:scrgbClr r="0" g="0" b="0"/>
+      </a:effectRef>
+      <a:fontRef idx="minor">
+        <a:schemeClr val="lt1"/>
+      </a:fontRef>
+    </dgm:style>
+  </dgm:styleLbl>
+  <dgm:styleLbl name="asst2">
+    <dgm:scene3d>
+      <a:camera prst="orthographicFront"/>
+      <a:lightRig rig="threePt" dir="t"/>
+    </dgm:scene3d>
+    <dgm:sp3d/>
+    <dgm:txPr/>
+    <dgm:style>
+      <a:lnRef idx="2">
+        <a:scrgbClr r="0" g="0" b="0"/>
+      </a:lnRef>
+      <a:fillRef idx="1">
+        <a:scrgbClr r="0" g="0" b="0"/>
+      </a:fillRef>
+      <a:effectRef idx="0">
+        <a:scrgbClr r="0" g="0" b="0"/>
+      </a:effectRef>
+      <a:fontRef idx="minor">
+        <a:schemeClr val="lt1"/>
+      </a:fontRef>
+    </dgm:style>
+  </dgm:styleLbl>
+  <dgm:styleLbl name="asst3">
+    <dgm:scene3d>
+      <a:camera prst="orthographicFront"/>
+      <a:lightRig rig="threePt" dir="t"/>
+    </dgm:scene3d>
+    <dgm:sp3d/>
+    <dgm:txPr/>
+    <dgm:style>
+      <a:lnRef idx="2">
+        <a:scrgbClr r="0" g="0" b="0"/>
+      </a:lnRef>
+      <a:fillRef idx="1">
+        <a:scrgbClr r="0" g="0" b="0"/>
+      </a:fillRef>
+      <a:effectRef idx="0">
+        <a:scrgbClr r="0" g="0" b="0"/>
+      </a:effectRef>
+      <a:fontRef idx="minor">
+        <a:schemeClr val="lt1"/>
+      </a:fontRef>
+    </dgm:style>
+  </dgm:styleLbl>
+  <dgm:styleLbl name="asst4">
+    <dgm:scene3d>
+      <a:camera prst="orthographicFront"/>
+      <a:lightRig rig="threePt" dir="t"/>
+    </dgm:scene3d>
+    <dgm:sp3d/>
+    <dgm:txPr/>
+    <dgm:style>
+      <a:lnRef idx="2">
+        <a:scrgbClr r="0" g="0" b="0"/>
+      </a:lnRef>
+      <a:fillRef idx="1">
+        <a:scrgbClr r="0" g="0" b="0"/>
+      </a:fillRef>
+      <a:effectRef idx="0">
+        <a:scrgbClr r="0" g="0" b="0"/>
+      </a:effectRef>
+      <a:fontRef idx="minor">
+        <a:schemeClr val="lt1"/>
+      </a:fontRef>
+    </dgm:style>
+  </dgm:styleLbl>
+  <dgm:styleLbl name="parChTrans2D1">
+    <dgm:scene3d>
+      <a:camera prst="orthographicFront"/>
+      <a:lightRig rig="threePt" dir="t"/>
+    </dgm:scene3d>
+    <dgm:sp3d/>
+    <dgm:txPr/>
+    <dgm:style>
+      <a:lnRef idx="2">
+        <a:scrgbClr r="0" g="0" b="0"/>
+      </a:lnRef>
+      <a:fillRef idx="1">
+        <a:scrgbClr r="0" g="0" b="0"/>
+      </a:fillRef>
+      <a:effectRef idx="0">
+        <a:scrgbClr r="0" g="0" b="0"/>
+      </a:effectRef>
+      <a:fontRef idx="minor">
+        <a:schemeClr val="lt1"/>
+      </a:fontRef>
+    </dgm:style>
+  </dgm:styleLbl>
+  <dgm:styleLbl name="parChTrans2D2">
+    <dgm:scene3d>
+      <a:camera prst="orthographicFront"/>
+      <a:lightRig rig="threePt" dir="t"/>
+    </dgm:scene3d>
+    <dgm:sp3d/>
+    <dgm:txPr/>
+    <dgm:style>
+      <a:lnRef idx="2">
+        <a:scrgbClr r="0" g="0" b="0"/>
+      </a:lnRef>
+      <a:fillRef idx="1">
+        <a:scrgbClr r="0" g="0" b="0"/>
+      </a:fillRef>
+      <a:effectRef idx="0">
+        <a:scrgbClr r="0" g="0" b="0"/>
+      </a:effectRef>
+      <a:fontRef idx="minor">
+        <a:schemeClr val="lt1"/>
+      </a:fontRef>
+    </dgm:style>
+  </dgm:styleLbl>
+  <dgm:styleLbl name="parChTrans2D3">
+    <dgm:scene3d>
+      <a:camera prst="orthographicFront"/>
+      <a:lightRig rig="threePt" dir="t"/>
+    </dgm:scene3d>
+    <dgm:sp3d/>
+    <dgm:txPr/>
+    <dgm:style>
+      <a:lnRef idx="2">
+        <a:scrgbClr r="0" g="0" b="0"/>
+      </a:lnRef>
+      <a:fillRef idx="1">
+        <a:scrgbClr r="0" g="0" b="0"/>
+      </a:fillRef>
+      <a:effectRef idx="0">
+        <a:scrgbClr r="0" g="0" b="0"/>
+      </a:effectRef>
+      <a:fontRef idx="minor">
+        <a:schemeClr val="lt1"/>
+      </a:fontRef>
+    </dgm:style>
+  </dgm:styleLbl>
+  <dgm:styleLbl name="parChTrans2D4">
+    <dgm:scene3d>
+      <a:camera prst="orthographicFront"/>
+      <a:lightRig rig="threePt" dir="t"/>
+    </dgm:scene3d>
+    <dgm:sp3d/>
+    <dgm:txPr/>
+    <dgm:style>
+      <a:lnRef idx="2">
+        <a:scrgbClr r="0" g="0" b="0"/>
+      </a:lnRef>
+      <a:fillRef idx="1">
+        <a:scrgbClr r="0" g="0" b="0"/>
+      </a:fillRef>
+      <a:effectRef idx="0">
+        <a:scrgbClr r="0" g="0" b="0"/>
+      </a:effectRef>
+      <a:fontRef idx="minor">
+        <a:schemeClr val="lt1"/>
+      </a:fontRef>
+    </dgm:style>
+  </dgm:styleLbl>
+  <dgm:styleLbl name="parChTrans1D1">
+    <dgm:scene3d>
+      <a:camera prst="orthographicFront"/>
+      <a:lightRig rig="threePt" dir="t"/>
+    </dgm:scene3d>
+    <dgm:sp3d/>
+    <dgm:txPr/>
+    <dgm:style>
+      <a:lnRef idx="2">
+        <a:scrgbClr r="0" g="0" b="0"/>
+      </a:lnRef>
+      <a:fillRef idx="0">
+        <a:scrgbClr r="0" g="0" b="0"/>
+      </a:fillRef>
+      <a:effectRef idx="0">
+        <a:scrgbClr r="0" g="0" b="0"/>
+      </a:effectRef>
+      <a:fontRef idx="minor"/>
+    </dgm:style>
+  </dgm:styleLbl>
+  <dgm:styleLbl name="parChTrans1D2">
+    <dgm:scene3d>
+      <a:camera prst="orthographicFront"/>
+      <a:lightRig rig="threePt" dir="t"/>
+    </dgm:scene3d>
+    <dgm:sp3d/>
+    <dgm:txPr/>
+    <dgm:style>
+      <a:lnRef idx="2">
+        <a:scrgbClr r="0" g="0" b="0"/>
+      </a:lnRef>
+      <a:fillRef idx="0">
+        <a:scrgbClr r="0" g="0" b="0"/>
+      </a:fillRef>
+      <a:effectRef idx="0">
+        <a:scrgbClr r="0" g="0" b="0"/>
+      </a:effectRef>
+      <a:fontRef idx="minor"/>
+    </dgm:style>
+  </dgm:styleLbl>
+  <dgm:styleLbl name="parChTrans1D3">
+    <dgm:scene3d>
+      <a:camera prst="orthographicFront"/>
+      <a:lightRig rig="threePt" dir="t"/>
+    </dgm:scene3d>
+    <dgm:sp3d/>
+    <dgm:txPr/>
+    <dgm:style>
+      <a:lnRef idx="2">
+        <a:scrgbClr r="0" g="0" b="0"/>
+      </a:lnRef>
+      <a:fillRef idx="0">
+        <a:scrgbClr r="0" g="0" b="0"/>
+      </a:fillRef>
+      <a:effectRef idx="0">
+        <a:scrgbClr r="0" g="0" b="0"/>
+      </a:effectRef>
+      <a:fontRef idx="minor"/>
+    </dgm:style>
+  </dgm:styleLbl>
+  <dgm:styleLbl name="parChTrans1D4">
+    <dgm:scene3d>
+      <a:camera prst="orthographicFront"/>
+      <a:lightRig rig="threePt" dir="t"/>
+    </dgm:scene3d>
+    <dgm:sp3d/>
+    <dgm:txPr/>
+    <dgm:style>
+      <a:lnRef idx="2">
+        <a:scrgbClr r="0" g="0" b="0"/>
+      </a:lnRef>
+      <a:fillRef idx="0">
+        <a:scrgbClr r="0" g="0" b="0"/>
+      </a:fillRef>
+      <a:effectRef idx="0">
+        <a:scrgbClr r="0" g="0" b="0"/>
+      </a:effectRef>
+      <a:fontRef idx="minor"/>
+    </dgm:style>
+  </dgm:styleLbl>
+  <dgm:styleLbl name="fgAcc1">
+    <dgm:scene3d>
+      <a:camera prst="orthographicFront"/>
+      <a:lightRig rig="threePt" dir="t"/>
+    </dgm:scene3d>
+    <dgm:sp3d/>
+    <dgm:txPr/>
+    <dgm:style>
+      <a:lnRef idx="2">
+        <a:scrgbClr r="0" g="0" b="0"/>
+      </a:lnRef>
+      <a:fillRef idx="1">
+        <a:scrgbClr r="0" g="0" b="0"/>
+      </a:fillRef>
+      <a:effectRef idx="0">
+        <a:scrgbClr r="0" g="0" b="0"/>
+      </a:effectRef>
+      <a:fontRef idx="minor"/>
+    </dgm:style>
+  </dgm:styleLbl>
+  <dgm:styleLbl name="conFgAcc1">
+    <dgm:scene3d>
+      <a:camera prst="orthographicFront"/>
+      <a:lightRig rig="threePt" dir="t"/>
+    </dgm:scene3d>
+    <dgm:sp3d/>
+    <dgm:txPr/>
+    <dgm:style>
+      <a:lnRef idx="2">
+        <a:scrgbClr r="0" g="0" b="0"/>
+      </a:lnRef>
+      <a:fillRef idx="1">
+        <a:scrgbClr r="0" g="0" b="0"/>
+      </a:fillRef>
+      <a:effectRef idx="0">
+        <a:scrgbClr r="0" g="0" b="0"/>
+      </a:effectRef>
+      <a:fontRef idx="minor"/>
+    </dgm:style>
+  </dgm:styleLbl>
+  <dgm:styleLbl name="alignAcc1">
+    <dgm:scene3d>
+      <a:camera prst="orthographicFront"/>
+      <a:lightRig rig="threePt" dir="t"/>
+    </dgm:scene3d>
+    <dgm:sp3d/>
+    <dgm:txPr/>
+    <dgm:style>
+      <a:lnRef idx="2">
+        <a:scrgbClr r="0" g="0" b="0"/>
+      </a:lnRef>
+      <a:fillRef idx="1">
+        <a:scrgbClr r="0" g="0" b="0"/>
+      </a:fillRef>
+      <a:effectRef idx="0">
+        <a:scrgbClr r="0" g="0" b="0"/>
+      </a:effectRef>
+      <a:fontRef idx="minor"/>
+    </dgm:style>
+  </dgm:styleLbl>
+  <dgm:styleLbl name="trAlignAcc1">
+    <dgm:scene3d>
+      <a:camera prst="orthographicFront"/>
+      <a:lightRig rig="threePt" dir="t"/>
+    </dgm:scene3d>
+    <dgm:sp3d/>
+    <dgm:txPr/>
+    <dgm:style>
+      <a:lnRef idx="1">
+        <a:scrgbClr r="0" g="0" b="0"/>
+      </a:lnRef>
+      <a:fillRef idx="1">
+        <a:scrgbClr r="0" g="0" b="0"/>
+      </a:fillRef>
+      <a:effectRef idx="0">
+        <a:scrgbClr r="0" g="0" b="0"/>
+      </a:effectRef>
+      <a:fontRef idx="minor"/>
+    </dgm:style>
+  </dgm:styleLbl>
+  <dgm:styleLbl name="bgAcc1">
+    <dgm:scene3d>
+      <a:camera prst="orthographicFront"/>
+      <a:lightRig rig="threePt" dir="t"/>
+    </dgm:scene3d>
+    <dgm:sp3d/>
+    <dgm:txPr/>
+    <dgm:style>
+      <a:lnRef idx="2">
+        <a:scrgbClr r="0" g="0" b="0"/>
+      </a:lnRef>
+      <a:fillRef idx="1">
+        <a:scrgbClr r="0" g="0" b="0"/>
+      </a:fillRef>
+      <a:effectRef idx="0">
+        <a:scrgbClr r="0" g="0" b="0"/>
+      </a:effectRef>
+      <a:fontRef idx="minor"/>
+    </dgm:style>
+  </dgm:styleLbl>
+  <dgm:styleLbl name="solidFgAcc1">
+    <dgm:scene3d>
+      <a:camera prst="orthographicFront"/>
+      <a:lightRig rig="threePt" dir="t"/>
+    </dgm:scene3d>
+    <dgm:sp3d/>
+    <dgm:txPr/>
+    <dgm:style>
+      <a:lnRef idx="2">
+        <a:scrgbClr r="0" g="0" b="0"/>
+      </a:lnRef>
+      <a:fillRef idx="1">
+        <a:scrgbClr r="0" g="0" b="0"/>
+      </a:fillRef>
+      <a:effectRef idx="0">
+        <a:scrgbClr r="0" g="0" b="0"/>
+      </a:effectRef>
+      <a:fontRef idx="minor"/>
+    </dgm:style>
+  </dgm:styleLbl>
+  <dgm:styleLbl name="solidAlignAcc1">
+    <dgm:scene3d>
+      <a:camera prst="orthographicFront"/>
+      <a:lightRig rig="threePt" dir="t"/>
+    </dgm:scene3d>
+    <dgm:sp3d/>
+    <dgm:txPr/>
+    <dgm:style>
+      <a:lnRef idx="2">
+        <a:scrgbClr r="0" g="0" b="0"/>
+      </a:lnRef>
+      <a:fillRef idx="1">
+        <a:scrgbClr r="0" g="0" b="0"/>
+      </a:fillRef>
+      <a:effectRef idx="0">
+        <a:scrgbClr r="0" g="0" b="0"/>
+      </a:effectRef>
+      <a:fontRef idx="minor"/>
+    </dgm:style>
+  </dgm:styleLbl>
+  <dgm:styleLbl name="solidBgAcc1">
+    <dgm:scene3d>
+      <a:camera prst="orthographicFront"/>
+      <a:lightRig rig="threePt" dir="t"/>
+    </dgm:scene3d>
+    <dgm:sp3d/>
+    <dgm:txPr/>
+    <dgm:style>
+      <a:lnRef idx="2">
+        <a:scrgbClr r="0" g="0" b="0"/>
+      </a:lnRef>
+      <a:fillRef idx="1">
+        <a:scrgbClr r="0" g="0" b="0"/>
+      </a:fillRef>
+      <a:effectRef idx="0">
+        <a:scrgbClr r="0" g="0" b="0"/>
+      </a:effectRef>
+      <a:fontRef idx="minor"/>
+    </dgm:style>
+  </dgm:styleLbl>
+  <dgm:styleLbl name="fgAccFollowNode1">
+    <dgm:scene3d>
+      <a:camera prst="orthographicFront"/>
+      <a:lightRig rig="threePt" dir="t"/>
+    </dgm:scene3d>
+    <dgm:sp3d/>
+    <dgm:txPr/>
+    <dgm:style>
+      <a:lnRef idx="2">
+        <a:scrgbClr r="0" g="0" b="0"/>
+      </a:lnRef>
+      <a:fillRef idx="1">
+        <a:scrgbClr r="0" g="0" b="0"/>
+      </a:fillRef>
+      <a:effectRef idx="0">
+        <a:scrgbClr r="0" g="0" b="0"/>
+      </a:effectRef>
+      <a:fontRef idx="minor"/>
+    </dgm:style>
+  </dgm:styleLbl>
+  <dgm:styleLbl name="alignAccFollowNode1">
+    <dgm:scene3d>
+      <a:camera prst="orthographicFront"/>
+      <a:lightRig rig="threePt" dir="t"/>
+    </dgm:scene3d>
+    <dgm:sp3d/>
+    <dgm:txPr/>
+    <dgm:style>
+      <a:lnRef idx="2">
+        <a:scrgbClr r="0" g="0" b="0"/>
+      </a:lnRef>
+      <a:fillRef idx="1">
+        <a:scrgbClr r="0" g="0" b="0"/>
+      </a:fillRef>
+      <a:effectRef idx="0">
+        <a:scrgbClr r="0" g="0" b="0"/>
+      </a:effectRef>
+      <a:fontRef idx="minor"/>
+    </dgm:style>
+  </dgm:styleLbl>
+  <dgm:styleLbl name="bgAccFollowNode1">
+    <dgm:scene3d>
+      <a:camera prst="orthographicFront"/>
+      <a:lightRig rig="threePt" dir="t"/>
+    </dgm:scene3d>
+    <dgm:sp3d/>
+    <dgm:txPr/>
+    <dgm:style>
+      <a:lnRef idx="2">
+        <a:scrgbClr r="0" g="0" b="0"/>
+      </a:lnRef>
+      <a:fillRef idx="1">
+        <a:scrgbClr r="0" g="0" b="0"/>
+      </a:fillRef>
+      <a:effectRef idx="0">
+        <a:scrgbClr r="0" g="0" b="0"/>
+      </a:effectRef>
+      <a:fontRef idx="minor"/>
+    </dgm:style>
+  </dgm:styleLbl>
+  <dgm:styleLbl name="fgAcc0">
+    <dgm:scene3d>
+      <a:camera prst="orthographicFront"/>
+      <a:lightRig rig="threePt" dir="t"/>
+    </dgm:scene3d>
+    <dgm:sp3d/>
+    <dgm:txPr/>
+    <dgm:style>
+      <a:lnRef idx="2">
+        <a:scrgbClr r="0" g="0" b="0"/>
+      </a:lnRef>
+      <a:fillRef idx="1">
+        <a:scrgbClr r="0" g="0" b="0"/>
+      </a:fillRef>
+      <a:effectRef idx="0">
+        <a:scrgbClr r="0" g="0" b="0"/>
+      </a:effectRef>
+      <a:fontRef idx="minor"/>
+    </dgm:style>
+  </dgm:styleLbl>
+  <dgm:styleLbl name="fgAcc2">
+    <dgm:scene3d>
+      <a:camera prst="orthographicFront"/>
+      <a:lightRig rig="threePt" dir="t"/>
+    </dgm:scene3d>
+    <dgm:sp3d/>
+    <dgm:txPr/>
+    <dgm:style>
+      <a:lnRef idx="2">
+        <a:scrgbClr r="0" g="0" b="0"/>
+      </a:lnRef>
+      <a:fillRef idx="1">
+        <a:scrgbClr r="0" g="0" b="0"/>
+      </a:fillRef>
+      <a:effectRef idx="0">
+        <a:scrgbClr r="0" g="0" b="0"/>
+      </a:effectRef>
+      <a:fontRef idx="minor"/>
+    </dgm:style>
+  </dgm:styleLbl>
+  <dgm:styleLbl name="fgAcc3">
+    <dgm:scene3d>
+      <a:camera prst="orthographicFront"/>
+      <a:lightRig rig="threePt" dir="t"/>
+    </dgm:scene3d>
+    <dgm:sp3d/>
+    <dgm:txPr/>
+    <dgm:style>
+      <a:lnRef idx="2">
+        <a:scrgbClr r="0" g="0" b="0"/>
+      </a:lnRef>
+      <a:fillRef idx="1">
+        <a:scrgbClr r="0" g="0" b="0"/>
+      </a:fillRef>
+      <a:effectRef idx="0">
+        <a:scrgbClr r="0" g="0" b="0"/>
+      </a:effectRef>
+      <a:fontRef idx="minor"/>
+    </dgm:style>
+  </dgm:styleLbl>
+  <dgm:styleLbl name="fgAcc4">
+    <dgm:scene3d>
+      <a:camera prst="orthographicFront"/>
+      <a:lightRig rig="threePt" dir="t"/>
+    </dgm:scene3d>
+    <dgm:sp3d/>
+    <dgm:txPr/>
+    <dgm:style>
+      <a:lnRef idx="2">
+        <a:scrgbClr r="0" g="0" b="0"/>
+      </a:lnRef>
+      <a:fillRef idx="1">
+        <a:scrgbClr r="0" g="0" b="0"/>
+      </a:fillRef>
+      <a:effectRef idx="0">
+        <a:scrgbClr r="0" g="0" b="0"/>
+      </a:effectRef>
+      <a:fontRef idx="minor"/>
+    </dgm:style>
+  </dgm:styleLbl>
+  <dgm:styleLbl name="bgShp">
+    <dgm:scene3d>
+      <a:camera prst="orthographicFront"/>
+      <a:lightRig rig="threePt" dir="t"/>
+    </dgm:scene3d>
+    <dgm:sp3d/>
+    <dgm:txPr/>
+    <dgm:style>
+      <a:lnRef idx="0">
+        <a:scrgbClr r="0" g="0" b="0"/>
+      </a:lnRef>
+      <a:fillRef idx="1">
+        <a:scrgbClr r="0" g="0" b="0"/>
+      </a:fillRef>
+      <a:effectRef idx="0">
+        <a:scrgbClr r="0" g="0" b="0"/>
+      </a:effectRef>
+      <a:fontRef idx="minor"/>
+    </dgm:style>
+  </dgm:styleLbl>
+  <dgm:styleLbl name="dkBgShp">
+    <dgm:scene3d>
+      <a:camera prst="orthographicFront"/>
+      <a:lightRig rig="threePt" dir="t"/>
+    </dgm:scene3d>
+    <dgm:sp3d/>
+    <dgm:txPr/>
+    <dgm:style>
+      <a:lnRef idx="0">
+        <a:scrgbClr r="0" g="0" b="0"/>
+      </a:lnRef>
+      <a:fillRef idx="1">
+        <a:scrgbClr r="0" g="0" b="0"/>
+      </a:fillRef>
+      <a:effectRef idx="0">
+        <a:scrgbClr r="0" g="0" b="0"/>
+      </a:effectRef>
+      <a:fontRef idx="minor"/>
+    </dgm:style>
+  </dgm:styleLbl>
+  <dgm:styleLbl name="trBgShp">
+    <dgm:scene3d>
+      <a:camera prst="orthographicFront"/>
+      <a:lightRig rig="threePt" dir="t"/>
+    </dgm:scene3d>
+    <dgm:sp3d/>
+    <dgm:txPr/>
+    <dgm:style>
+      <a:lnRef idx="0">
+        <a:scrgbClr r="0" g="0" b="0"/>
+      </a:lnRef>
+      <a:fillRef idx="1">
+        <a:scrgbClr r="0" g="0" b="0"/>
+      </a:fillRef>
+      <a:effectRef idx="0">
+        <a:scrgbClr r="0" g="0" b="0"/>
+      </a:effectRef>
+      <a:fontRef idx="minor"/>
+    </dgm:style>
+  </dgm:styleLbl>
+  <dgm:styleLbl name="fgShp">
+    <dgm:scene3d>
+      <a:camera prst="orthographicFront"/>
+      <a:lightRig rig="threePt" dir="t"/>
+    </dgm:scene3d>
+    <dgm:sp3d/>
+    <dgm:txPr/>
+    <dgm:style>
+      <a:lnRef idx="2">
+        <a:scrgbClr r="0" g="0" b="0"/>
+      </a:lnRef>
+      <a:fillRef idx="1">
+        <a:scrgbClr r="0" g="0" b="0"/>
+      </a:fillRef>
+      <a:effectRef idx="0">
+        <a:scrgbClr r="0" g="0" b="0"/>
+      </a:effectRef>
+      <a:fontRef idx="minor"/>
+    </dgm:style>
+  </dgm:styleLbl>
+  <dgm:styleLbl name="revTx">
+    <dgm:scene3d>
+      <a:camera prst="orthographicFront"/>
+      <a:lightRig rig="threePt" dir="t"/>
+    </dgm:scene3d>
+    <dgm:sp3d/>
+    <dgm:txPr/>
+    <dgm:style>
+      <a:lnRef idx="0">
+        <a:scrgbClr r="0" g="0" b="0"/>
+      </a:lnRef>
+      <a:fillRef idx="0">
+        <a:scrgbClr r="0" g="0" b="0"/>
+      </a:fillRef>
+      <a:effectRef idx="0">
+        <a:scrgbClr r="0" g="0" b="0"/>
+      </a:effectRef>
+      <a:fontRef idx="minor"/>
+    </dgm:style>
+  </dgm:styleLbl>
+</dgm:styleDef>
+</file>
+
+<file path=ppt/diagrams/quickStyle3.xml><?xml version="1.0" encoding="utf-8"?>
 <dgm:styleDef xmlns:dgm="http://schemas.openxmlformats.org/drawingml/2006/diagram" xmlns:a="http://schemas.openxmlformats.org/drawingml/2006/main" uniqueId="urn:microsoft.com/office/officeart/2005/8/quickstyle/simple3">
   <dgm:title val=""/>
   <dgm:desc val=""/>
@@ -8502,7 +12092,7 @@
               <a:pPr>
                 <a:defRPr/>
               </a:pPr>
-              <a:t>12</a:t>
+              <a:t>13</a:t>
             </a:fld>
             <a:endParaRPr lang="en-US" altLang="zh-CN" dirty="0"/>
           </a:p>
@@ -8594,7 +12184,7 @@
               <a:pPr>
                 <a:defRPr/>
               </a:pPr>
-              <a:t>13</a:t>
+              <a:t>14</a:t>
             </a:fld>
             <a:endParaRPr lang="en-US" altLang="zh-CN" dirty="0"/>
           </a:p>
@@ -8908,6 +12498,148 @@
 </p:sldLayout>
 </file>
 
+<file path=ppt/slideLayouts/slideLayout4.xml><?xml version="1.0" encoding="utf-8"?>
+<p:sldLayout xmlns:a="http://schemas.openxmlformats.org/drawingml/2006/main" xmlns:r="http://schemas.openxmlformats.org/officeDocument/2006/relationships" xmlns:p="http://schemas.openxmlformats.org/presentationml/2006/main" type="titleOnly">
+  <p:cSld name="Title Only">
+    <p:spTree>
+      <p:nvGrpSpPr>
+        <p:cNvPr id="1" name=""/>
+        <p:cNvGrpSpPr/>
+        <p:nvPr/>
+      </p:nvGrpSpPr>
+      <p:grpSpPr>
+        <a:xfrm>
+          <a:off x="0" y="0"/>
+          <a:ext cx="0" cy="0"/>
+          <a:chOff x="0" y="0"/>
+          <a:chExt cx="0" cy="0"/>
+        </a:xfrm>
+      </p:grpSpPr>
+      <p:sp>
+        <p:nvSpPr>
+          <p:cNvPr id="2" name="Title 1"/>
+          <p:cNvSpPr>
+            <a:spLocks noGrp="1"/>
+          </p:cNvSpPr>
+          <p:nvPr>
+            <p:ph type="title"/>
+          </p:nvPr>
+        </p:nvSpPr>
+        <p:spPr/>
+        <p:txBody>
+          <a:bodyPr/>
+          <a:lstStyle/>
+          <a:p>
+            <a:r>
+              <a:rPr lang="en-US" smtClean="0"/>
+              <a:t>Click to edit Master title style</a:t>
+            </a:r>
+            <a:endParaRPr lang="en-IN"/>
+          </a:p>
+        </p:txBody>
+      </p:sp>
+      <p:sp>
+        <p:nvSpPr>
+          <p:cNvPr id="3" name="Date Placeholder 2"/>
+          <p:cNvSpPr>
+            <a:spLocks noGrp="1"/>
+          </p:cNvSpPr>
+          <p:nvPr>
+            <p:ph type="dt" sz="half" idx="10"/>
+          </p:nvPr>
+        </p:nvSpPr>
+        <p:spPr>
+          <a:xfrm>
+            <a:off x="628650" y="6356351"/>
+            <a:ext cx="2057400" cy="365125"/>
+          </a:xfrm>
+          <a:prstGeom prst="rect">
+            <a:avLst/>
+          </a:prstGeom>
+        </p:spPr>
+        <p:txBody>
+          <a:bodyPr/>
+          <a:lstStyle/>
+          <a:p>
+            <a:fld id="{EDA8F00A-5471-46D0-8328-9493E588D2A8}" type="datetimeFigureOut">
+              <a:rPr lang="en-IN" smtClean="0"/>
+              <a:t>12-01-2019</a:t>
+            </a:fld>
+            <a:endParaRPr lang="en-IN"/>
+          </a:p>
+        </p:txBody>
+      </p:sp>
+      <p:sp>
+        <p:nvSpPr>
+          <p:cNvPr id="4" name="Footer Placeholder 3"/>
+          <p:cNvSpPr>
+            <a:spLocks noGrp="1"/>
+          </p:cNvSpPr>
+          <p:nvPr>
+            <p:ph type="ftr" sz="quarter" idx="11"/>
+          </p:nvPr>
+        </p:nvSpPr>
+        <p:spPr>
+          <a:xfrm>
+            <a:off x="3028950" y="6356351"/>
+            <a:ext cx="3086100" cy="365125"/>
+          </a:xfrm>
+          <a:prstGeom prst="rect">
+            <a:avLst/>
+          </a:prstGeom>
+        </p:spPr>
+        <p:txBody>
+          <a:bodyPr/>
+          <a:lstStyle/>
+          <a:p>
+            <a:endParaRPr lang="en-IN"/>
+          </a:p>
+        </p:txBody>
+      </p:sp>
+      <p:sp>
+        <p:nvSpPr>
+          <p:cNvPr id="5" name="Slide Number Placeholder 4"/>
+          <p:cNvSpPr>
+            <a:spLocks noGrp="1"/>
+          </p:cNvSpPr>
+          <p:nvPr>
+            <p:ph type="sldNum" sz="quarter" idx="12"/>
+          </p:nvPr>
+        </p:nvSpPr>
+        <p:spPr>
+          <a:xfrm>
+            <a:off x="6457950" y="6356351"/>
+            <a:ext cx="2057400" cy="365125"/>
+          </a:xfrm>
+          <a:prstGeom prst="rect">
+            <a:avLst/>
+          </a:prstGeom>
+        </p:spPr>
+        <p:txBody>
+          <a:bodyPr/>
+          <a:lstStyle/>
+          <a:p>
+            <a:fld id="{56567D21-90CD-4A48-82A3-79E9AAB11615}" type="slidenum">
+              <a:rPr lang="en-IN" smtClean="0"/>
+              <a:t>‹#›</a:t>
+            </a:fld>
+            <a:endParaRPr lang="en-IN"/>
+          </a:p>
+        </p:txBody>
+      </p:sp>
+    </p:spTree>
+    <p:extLst>
+      <p:ext uri="{BB962C8B-B14F-4D97-AF65-F5344CB8AC3E}">
+        <p14:creationId xmlns:p14="http://schemas.microsoft.com/office/powerpoint/2010/main" val="4274961014"/>
+      </p:ext>
+    </p:extLst>
+  </p:cSld>
+  <p:clrMapOvr>
+    <a:masterClrMapping/>
+  </p:clrMapOvr>
+</p:sldLayout>
+</file>
+
 <file path=ppt/slideMasters/slideMaster1.xml><?xml version="1.0" encoding="utf-8"?>
 <p:sldMaster xmlns:a="http://schemas.openxmlformats.org/drawingml/2006/main" xmlns:r="http://schemas.openxmlformats.org/officeDocument/2006/relationships" xmlns:p="http://schemas.openxmlformats.org/presentationml/2006/main">
   <p:cSld>
@@ -9039,6 +12771,7 @@
     <p:sldLayoutId id="2147483723" r:id="rId1"/>
     <p:sldLayoutId id="2147483733" r:id="rId2"/>
     <p:sldLayoutId id="2147483737" r:id="rId3"/>
+    <p:sldLayoutId id="2147483738" r:id="rId4"/>
   </p:sldLayoutIdLst>
   <p:transition spd="med"/>
   <p:txStyles>
@@ -9292,7 +13025,7 @@
         <a:buSzPct val="60000"/>
         <a:buFont typeface="Wingdings" pitchFamily="2" charset="2"/>
         <a:buBlip>
-          <a:blip r:embed="rId5"/>
+          <a:blip r:embed="rId6"/>
         </a:buBlip>
         <a:defRPr sz="2000">
           <a:solidFill>
@@ -9319,7 +13052,7 @@
         <a:buSzPct val="60000"/>
         <a:buFont typeface="Wingdings" pitchFamily="2" charset="2"/>
         <a:buBlip>
-          <a:blip r:embed="rId5"/>
+          <a:blip r:embed="rId6"/>
         </a:buBlip>
         <a:defRPr sz="2000">
           <a:solidFill>
@@ -9346,7 +13079,7 @@
         <a:buSzPct val="60000"/>
         <a:buFont typeface="Wingdings" pitchFamily="2" charset="2"/>
         <a:buBlip>
-          <a:blip r:embed="rId5"/>
+          <a:blip r:embed="rId6"/>
         </a:buBlip>
         <a:defRPr sz="2000">
           <a:solidFill>
@@ -9373,7 +13106,7 @@
         <a:buSzPct val="60000"/>
         <a:buFont typeface="Wingdings" pitchFamily="2" charset="2"/>
         <a:buBlip>
-          <a:blip r:embed="rId5"/>
+          <a:blip r:embed="rId6"/>
         </a:buBlip>
         <a:defRPr sz="2000">
           <a:solidFill>
@@ -9400,7 +13133,7 @@
         <a:buSzPct val="60000"/>
         <a:buFont typeface="Wingdings" pitchFamily="2" charset="2"/>
         <a:buBlip>
-          <a:blip r:embed="rId5"/>
+          <a:blip r:embed="rId6"/>
         </a:buBlip>
         <a:defRPr sz="2000">
           <a:solidFill>
@@ -9427,7 +13160,7 @@
         <a:buSzPct val="60000"/>
         <a:buFont typeface="Wingdings" pitchFamily="2" charset="2"/>
         <a:buBlip>
-          <a:blip r:embed="rId5"/>
+          <a:blip r:embed="rId6"/>
         </a:buBlip>
         <a:defRPr sz="2000">
           <a:solidFill>
@@ -9596,10 +13329,6 @@
               <a:rPr lang="en-GB" sz="3600" dirty="0" smtClean="0"/>
               <a:t>Induction Presentation</a:t>
             </a:r>
-            <a:r>
-              <a:rPr lang="en-GB" sz="3600" dirty="0" smtClean="0"/>
-              <a:t/>
-            </a:r>
             <a:br>
               <a:rPr lang="en-GB" sz="3600" dirty="0" smtClean="0"/>
             </a:br>
@@ -9638,6 +13367,333 @@
 </file>
 
 <file path=ppt/slides/slide10.xml><?xml version="1.0" encoding="utf-8"?>
+<p:sld xmlns:a="http://schemas.openxmlformats.org/drawingml/2006/main" xmlns:r="http://schemas.openxmlformats.org/officeDocument/2006/relationships" xmlns:p="http://schemas.openxmlformats.org/presentationml/2006/main">
+  <p:cSld>
+    <p:spTree>
+      <p:nvGrpSpPr>
+        <p:cNvPr id="1" name=""/>
+        <p:cNvGrpSpPr/>
+        <p:nvPr/>
+      </p:nvGrpSpPr>
+      <p:grpSpPr>
+        <a:xfrm>
+          <a:off x="0" y="0"/>
+          <a:ext cx="0" cy="0"/>
+          <a:chOff x="0" y="0"/>
+          <a:chExt cx="0" cy="0"/>
+        </a:xfrm>
+      </p:grpSpPr>
+      <p:sp>
+        <p:nvSpPr>
+          <p:cNvPr id="64" name="Title 1"/>
+          <p:cNvSpPr txBox="1">
+            <a:spLocks/>
+          </p:cNvSpPr>
+          <p:nvPr/>
+        </p:nvSpPr>
+        <p:spPr bwMode="auto">
+          <a:xfrm>
+            <a:off x="833438" y="60325"/>
+            <a:ext cx="8297862" cy="701675"/>
+          </a:xfrm>
+          <a:prstGeom prst="rect">
+            <a:avLst/>
+          </a:prstGeom>
+          <a:noFill/>
+          <a:ln w="9525">
+            <a:noFill/>
+            <a:miter lim="800000"/>
+            <a:headEnd/>
+            <a:tailEnd/>
+          </a:ln>
+          <a:effectLst/>
+        </p:spPr>
+        <p:txBody>
+          <a:bodyPr vert="horz" wrap="square" lIns="91440" tIns="45720" rIns="91440" bIns="45720" numCol="1" anchor="ctr" anchorCtr="0" compatLnSpc="1">
+            <a:prstTxWarp prst="textNoShape">
+              <a:avLst/>
+            </a:prstTxWarp>
+          </a:bodyPr>
+          <a:lstStyle>
+            <a:lvl1pPr eaLnBrk="0" hangingPunct="0">
+              <a:lnSpc>
+                <a:spcPct val="80000"/>
+              </a:lnSpc>
+              <a:defRPr sz="3500" b="1">
+                <a:solidFill>
+                  <a:schemeClr val="bg2"/>
+                </a:solidFill>
+                <a:effectLst/>
+                <a:latin typeface="+mj-lt"/>
+                <a:ea typeface="+mj-ea"/>
+                <a:cs typeface="+mj-cs"/>
+              </a:defRPr>
+            </a:lvl1pPr>
+            <a:lvl2pPr eaLnBrk="0" hangingPunct="0">
+              <a:defRPr sz="4000">
+                <a:solidFill>
+                  <a:srgbClr val="000066"/>
+                </a:solidFill>
+                <a:effectLst>
+                  <a:outerShdw blurRad="38100" dist="38100" dir="2700000" algn="tl">
+                    <a:srgbClr val="C0C0C0"/>
+                  </a:outerShdw>
+                </a:effectLst>
+                <a:latin typeface="Franklin Gothic Book" pitchFamily="34" charset="0"/>
+              </a:defRPr>
+            </a:lvl2pPr>
+            <a:lvl3pPr eaLnBrk="0" hangingPunct="0">
+              <a:defRPr sz="4000">
+                <a:solidFill>
+                  <a:srgbClr val="000066"/>
+                </a:solidFill>
+                <a:effectLst>
+                  <a:outerShdw blurRad="38100" dist="38100" dir="2700000" algn="tl">
+                    <a:srgbClr val="C0C0C0"/>
+                  </a:outerShdw>
+                </a:effectLst>
+                <a:latin typeface="Franklin Gothic Book" pitchFamily="34" charset="0"/>
+              </a:defRPr>
+            </a:lvl3pPr>
+            <a:lvl4pPr eaLnBrk="0" hangingPunct="0">
+              <a:defRPr sz="4000">
+                <a:solidFill>
+                  <a:srgbClr val="000066"/>
+                </a:solidFill>
+                <a:effectLst>
+                  <a:outerShdw blurRad="38100" dist="38100" dir="2700000" algn="tl">
+                    <a:srgbClr val="C0C0C0"/>
+                  </a:outerShdw>
+                </a:effectLst>
+                <a:latin typeface="Franklin Gothic Book" pitchFamily="34" charset="0"/>
+              </a:defRPr>
+            </a:lvl4pPr>
+            <a:lvl5pPr eaLnBrk="0" hangingPunct="0">
+              <a:defRPr sz="4000">
+                <a:solidFill>
+                  <a:srgbClr val="000066"/>
+                </a:solidFill>
+                <a:effectLst>
+                  <a:outerShdw blurRad="38100" dist="38100" dir="2700000" algn="tl">
+                    <a:srgbClr val="C0C0C0"/>
+                  </a:outerShdw>
+                </a:effectLst>
+                <a:latin typeface="Franklin Gothic Book" pitchFamily="34" charset="0"/>
+              </a:defRPr>
+            </a:lvl5pPr>
+            <a:lvl6pPr marL="457200" fontAlgn="base">
+              <a:spcBef>
+                <a:spcPct val="0"/>
+              </a:spcBef>
+              <a:spcAft>
+                <a:spcPct val="0"/>
+              </a:spcAft>
+              <a:defRPr sz="4000">
+                <a:solidFill>
+                  <a:srgbClr val="000066"/>
+                </a:solidFill>
+                <a:effectLst>
+                  <a:outerShdw blurRad="38100" dist="38100" dir="2700000" algn="tl">
+                    <a:srgbClr val="C0C0C0"/>
+                  </a:outerShdw>
+                </a:effectLst>
+                <a:latin typeface="Franklin Gothic Book" pitchFamily="34" charset="0"/>
+              </a:defRPr>
+            </a:lvl6pPr>
+            <a:lvl7pPr marL="914400" fontAlgn="base">
+              <a:spcBef>
+                <a:spcPct val="0"/>
+              </a:spcBef>
+              <a:spcAft>
+                <a:spcPct val="0"/>
+              </a:spcAft>
+              <a:defRPr sz="4000">
+                <a:solidFill>
+                  <a:srgbClr val="000066"/>
+                </a:solidFill>
+                <a:effectLst>
+                  <a:outerShdw blurRad="38100" dist="38100" dir="2700000" algn="tl">
+                    <a:srgbClr val="C0C0C0"/>
+                  </a:outerShdw>
+                </a:effectLst>
+                <a:latin typeface="Franklin Gothic Book" pitchFamily="34" charset="0"/>
+              </a:defRPr>
+            </a:lvl7pPr>
+            <a:lvl8pPr marL="1371600" fontAlgn="base">
+              <a:spcBef>
+                <a:spcPct val="0"/>
+              </a:spcBef>
+              <a:spcAft>
+                <a:spcPct val="0"/>
+              </a:spcAft>
+              <a:defRPr sz="4000">
+                <a:solidFill>
+                  <a:srgbClr val="000066"/>
+                </a:solidFill>
+                <a:effectLst>
+                  <a:outerShdw blurRad="38100" dist="38100" dir="2700000" algn="tl">
+                    <a:srgbClr val="C0C0C0"/>
+                  </a:outerShdw>
+                </a:effectLst>
+                <a:latin typeface="Franklin Gothic Book" pitchFamily="34" charset="0"/>
+              </a:defRPr>
+            </a:lvl8pPr>
+            <a:lvl9pPr marL="1828800" fontAlgn="base">
+              <a:spcBef>
+                <a:spcPct val="0"/>
+              </a:spcBef>
+              <a:spcAft>
+                <a:spcPct val="0"/>
+              </a:spcAft>
+              <a:defRPr sz="4000">
+                <a:solidFill>
+                  <a:srgbClr val="000066"/>
+                </a:solidFill>
+                <a:effectLst>
+                  <a:outerShdw blurRad="38100" dist="38100" dir="2700000" algn="tl">
+                    <a:srgbClr val="C0C0C0"/>
+                  </a:outerShdw>
+                </a:effectLst>
+                <a:latin typeface="Franklin Gothic Book" pitchFamily="34" charset="0"/>
+              </a:defRPr>
+            </a:lvl9pPr>
+          </a:lstStyle>
+          <a:p>
+            <a:r>
+              <a:rPr lang="en-GB" dirty="0"/>
+              <a:t>Project Control Tower</a:t>
+            </a:r>
+          </a:p>
+        </p:txBody>
+      </p:sp>
+      <p:sp>
+        <p:nvSpPr>
+          <p:cNvPr id="66" name="Rectangle 65"/>
+          <p:cNvSpPr/>
+          <p:nvPr/>
+        </p:nvSpPr>
+        <p:spPr bwMode="auto">
+          <a:xfrm>
+            <a:off x="227510" y="201893"/>
+            <a:ext cx="496389" cy="458742"/>
+          </a:xfrm>
+          <a:prstGeom prst="rect">
+            <a:avLst/>
+          </a:prstGeom>
+          <a:solidFill>
+            <a:schemeClr val="tx1">
+              <a:lumMod val="65000"/>
+            </a:schemeClr>
+          </a:solidFill>
+          <a:ln w="9525" cap="flat" cmpd="sng" algn="ctr">
+            <a:solidFill>
+              <a:schemeClr val="tx1">
+                <a:lumMod val="65000"/>
+              </a:schemeClr>
+            </a:solidFill>
+            <a:prstDash val="solid"/>
+            <a:round/>
+            <a:headEnd type="none" w="med" len="med"/>
+            <a:tailEnd type="none" w="med" len="med"/>
+          </a:ln>
+          <a:effectLst/>
+        </p:spPr>
+        <p:txBody>
+          <a:bodyPr vert="horz" wrap="square" lIns="0" tIns="0" rIns="0" bIns="0" numCol="1" rtlCol="0" anchor="ctr" anchorCtr="0" compatLnSpc="1">
+            <a:prstTxWarp prst="textNoShape">
+              <a:avLst/>
+            </a:prstTxWarp>
+          </a:bodyPr>
+          <a:lstStyle/>
+          <a:p>
+            <a:pPr algn="ctr" eaLnBrk="0" hangingPunct="0"/>
+            <a:r>
+              <a:rPr lang="en-GB" sz="2600" b="1" dirty="0" smtClean="0">
+                <a:solidFill>
+                  <a:schemeClr val="tx1"/>
+                </a:solidFill>
+                <a:latin typeface="+mn-lt"/>
+              </a:rPr>
+              <a:t>2</a:t>
+            </a:r>
+          </a:p>
+        </p:txBody>
+      </p:sp>
+      <p:pic>
+        <p:nvPicPr>
+          <p:cNvPr id="2" name="Picture 2"/>
+          <p:cNvPicPr>
+            <a:picLocks noChangeAspect="1" noChangeArrowheads="1"/>
+          </p:cNvPicPr>
+          <p:nvPr/>
+        </p:nvPicPr>
+        <p:blipFill>
+          <a:blip r:embed="rId2">
+            <a:extLst>
+              <a:ext uri="{28A0092B-C50C-407E-A947-70E740481C1C}">
+                <a14:useLocalDpi xmlns:a14="http://schemas.microsoft.com/office/drawing/2010/main" val="0"/>
+              </a:ext>
+            </a:extLst>
+          </a:blip>
+          <a:srcRect/>
+          <a:stretch>
+            <a:fillRect/>
+          </a:stretch>
+        </p:blipFill>
+        <p:spPr bwMode="auto">
+          <a:xfrm>
+            <a:off x="0" y="762000"/>
+            <a:ext cx="9199411" cy="5205026"/>
+          </a:xfrm>
+          <a:prstGeom prst="rect">
+            <a:avLst/>
+          </a:prstGeom>
+          <a:noFill/>
+          <a:ln>
+            <a:noFill/>
+          </a:ln>
+          <a:extLst>
+            <a:ext uri="{909E8E84-426E-40DD-AFC4-6F175D3DCCD1}">
+              <a14:hiddenFill xmlns:a14="http://schemas.microsoft.com/office/drawing/2010/main">
+                <a:solidFill>
+                  <a:schemeClr val="accent1"/>
+                </a:solidFill>
+              </a14:hiddenFill>
+            </a:ext>
+            <a:ext uri="{91240B29-F687-4F45-9708-019B960494DF}">
+              <a14:hiddenLine xmlns:a14="http://schemas.microsoft.com/office/drawing/2010/main" w="9525">
+                <a:solidFill>
+                  <a:schemeClr val="tx1"/>
+                </a:solidFill>
+                <a:miter lim="800000"/>
+                <a:headEnd/>
+                <a:tailEnd/>
+              </a14:hiddenLine>
+            </a:ext>
+          </a:extLst>
+        </p:spPr>
+      </p:pic>
+    </p:spTree>
+    <p:extLst>
+      <p:ext uri="{BB962C8B-B14F-4D97-AF65-F5344CB8AC3E}">
+        <p14:creationId xmlns:p14="http://schemas.microsoft.com/office/powerpoint/2010/main" val="1984287571"/>
+      </p:ext>
+    </p:extLst>
+  </p:cSld>
+  <p:clrMapOvr>
+    <a:masterClrMapping/>
+  </p:clrMapOvr>
+  <p:timing>
+    <p:tnLst>
+      <p:par>
+        <p:cTn id="1" dur="indefinite" restart="never" nodeType="tmRoot"/>
+      </p:par>
+    </p:tnLst>
+  </p:timing>
+</p:sld>
+</file>
+
+<file path=ppt/slides/slide11.xml><?xml version="1.0" encoding="utf-8"?>
 <p:sld xmlns:a="http://schemas.openxmlformats.org/drawingml/2006/main" xmlns:r="http://schemas.openxmlformats.org/officeDocument/2006/relationships" xmlns:p="http://schemas.openxmlformats.org/presentationml/2006/main">
   <p:cSld>
     <p:spTree>
@@ -10080,7 +14136,7 @@
 </p:sld>
 </file>
 
-<file path=ppt/slides/slide11.xml><?xml version="1.0" encoding="utf-8"?>
+<file path=ppt/slides/slide12.xml><?xml version="1.0" encoding="utf-8"?>
 <p:sld xmlns:a="http://schemas.openxmlformats.org/drawingml/2006/main" xmlns:r="http://schemas.openxmlformats.org/officeDocument/2006/relationships" xmlns:p="http://schemas.openxmlformats.org/presentationml/2006/main">
   <p:cSld>
     <p:spTree>
@@ -10524,7 +14580,7 @@
 </p:sld>
 </file>
 
-<file path=ppt/slides/slide12.xml><?xml version="1.0" encoding="utf-8"?>
+<file path=ppt/slides/slide13.xml><?xml version="1.0" encoding="utf-8"?>
 <p:sld xmlns:a="http://schemas.openxmlformats.org/drawingml/2006/main" xmlns:r="http://schemas.openxmlformats.org/officeDocument/2006/relationships" xmlns:p="http://schemas.openxmlformats.org/presentationml/2006/main">
   <p:cSld>
     <p:spTree>
@@ -10685,7 +14741,7 @@
 </p:sld>
 </file>
 
-<file path=ppt/slides/slide13.xml><?xml version="1.0" encoding="utf-8"?>
+<file path=ppt/slides/slide14.xml><?xml version="1.0" encoding="utf-8"?>
 <p:sld xmlns:a="http://schemas.openxmlformats.org/drawingml/2006/main" xmlns:r="http://schemas.openxmlformats.org/officeDocument/2006/relationships" xmlns:p="http://schemas.openxmlformats.org/presentationml/2006/main">
   <p:cSld>
     <p:spTree>
@@ -10829,7 +14885,7 @@
 </p:sld>
 </file>
 
-<file path=ppt/slides/slide14.xml><?xml version="1.0" encoding="utf-8"?>
+<file path=ppt/slides/slide15.xml><?xml version="1.0" encoding="utf-8"?>
 <p:sld xmlns:a="http://schemas.openxmlformats.org/drawingml/2006/main" xmlns:r="http://schemas.openxmlformats.org/officeDocument/2006/relationships" xmlns:p="http://schemas.openxmlformats.org/presentationml/2006/main">
   <p:cSld>
     <p:spTree>
@@ -10945,10 +15001,17 @@
     <a:masterClrMapping/>
   </p:clrMapOvr>
   <p:transition spd="med"/>
+  <p:timing>
+    <p:tnLst>
+      <p:par>
+        <p:cTn id="1" dur="indefinite" restart="never" nodeType="tmRoot"/>
+      </p:par>
+    </p:tnLst>
+  </p:timing>
 </p:sld>
 </file>
 
-<file path=ppt/slides/slide15.xml><?xml version="1.0" encoding="utf-8"?>
+<file path=ppt/slides/slide16.xml><?xml version="1.0" encoding="utf-8"?>
 <p:sld xmlns:a="http://schemas.openxmlformats.org/drawingml/2006/main" xmlns:r="http://schemas.openxmlformats.org/officeDocument/2006/relationships" xmlns:p="http://schemas.openxmlformats.org/presentationml/2006/main">
   <p:cSld>
     <p:spTree>
@@ -11999,11 +16062,6 @@
               </a:rPr>
               <a:t>Team</a:t>
             </a:r>
-            <a:endParaRPr lang="en-GB" sz="3500" dirty="0" smtClean="0">
-              <a:solidFill>
-                <a:schemeClr val="bg2"/>
-              </a:solidFill>
-            </a:endParaRPr>
           </a:p>
         </p:txBody>
       </p:sp>
@@ -12060,37 +16118,28 @@
           </a:p>
         </p:txBody>
       </p:sp>
-      <p:pic>
-        <p:nvPicPr>
-          <p:cNvPr id="1026" name="Picture 2"/>
-          <p:cNvPicPr>
-            <a:picLocks noChangeAspect="1" noChangeArrowheads="1"/>
-          </p:cNvPicPr>
-          <p:nvPr/>
-        </p:nvPicPr>
-        <p:blipFill rotWithShape="1">
-          <a:blip r:embed="rId3" cstate="print"/>
-          <a:srcRect l="5532" t="12685" r="2632" b="46701"/>
-          <a:stretch/>
-        </p:blipFill>
-        <p:spPr bwMode="auto">
-          <a:xfrm>
-            <a:off x="299643" y="1596572"/>
-            <a:ext cx="8609605" cy="2950714"/>
-          </a:xfrm>
-          <a:prstGeom prst="rect">
-            <a:avLst/>
-          </a:prstGeom>
-          <a:noFill/>
-          <a:ln w="9525">
-            <a:noFill/>
-            <a:miter lim="800000"/>
-            <a:headEnd/>
-            <a:tailEnd/>
-          </a:ln>
-          <a:effectLst/>
-        </p:spPr>
-      </p:pic>
+      <p:graphicFrame>
+        <p:nvGraphicFramePr>
+          <p:cNvPr id="2" name="Diagram 1"/>
+          <p:cNvGraphicFramePr/>
+          <p:nvPr>
+            <p:extLst>
+              <p:ext uri="{D42A27DB-BD31-4B8C-83A1-F6EECF244321}">
+                <p14:modId xmlns:p14="http://schemas.microsoft.com/office/powerpoint/2010/main" val="2484408407"/>
+              </p:ext>
+            </p:extLst>
+          </p:nvPr>
+        </p:nvGraphicFramePr>
+        <p:xfrm>
+          <a:off x="475704" y="1347573"/>
+          <a:ext cx="8507657" cy="4151184"/>
+        </p:xfrm>
+        <a:graphic>
+          <a:graphicData uri="http://schemas.openxmlformats.org/drawingml/2006/diagram">
+            <dgm:relIds xmlns:dgm="http://schemas.openxmlformats.org/drawingml/2006/diagram" xmlns:r="http://schemas.openxmlformats.org/officeDocument/2006/relationships" r:dm="rId3" r:lo="rId4" r:qs="rId5" r:cs="rId6"/>
+          </a:graphicData>
+        </a:graphic>
+      </p:graphicFrame>
     </p:spTree>
   </p:cSld>
   <p:clrMapOvr>

</xml_diff>

<commit_message>
Modified IT Org Structure and Technology Adoption slides
</commit_message>
<xml_diff>
--- a/IT & Systems- Induction.pptx
+++ b/IT & Systems- Induction.pptx
@@ -2620,6 +2620,186 @@
         </a:p>
       </dgm:t>
     </dgm:pt>
+    <dgm:pt modelId="{AC655AE5-4ADB-47DE-9DC5-64A32B5E615B}">
+      <dgm:prSet phldrT="[Text]" custT="1"/>
+      <dgm:spPr/>
+      <dgm:t>
+        <a:bodyPr/>
+        <a:lstStyle/>
+        <a:p>
+          <a:r>
+            <a:rPr lang="en-GB" sz="1800" b="1" dirty="0" smtClean="0"/>
+            <a:t>Vinay</a:t>
+          </a:r>
+        </a:p>
+        <a:p>
+          <a:r>
+            <a:rPr lang="en-GB" sz="1800" dirty="0" smtClean="0"/>
+            <a:t>(</a:t>
+          </a:r>
+          <a:r>
+            <a:rPr lang="en-GB" sz="1800" dirty="0" smtClean="0"/>
+            <a:t>Helpdesk Support)</a:t>
+          </a:r>
+          <a:endParaRPr lang="en-GB" sz="1800" dirty="0"/>
+        </a:p>
+      </dgm:t>
+    </dgm:pt>
+    <dgm:pt modelId="{6F261686-7D2F-4705-ADCF-C7A730105E5F}" type="parTrans" cxnId="{DCA66F41-4285-4F31-B15A-1D05BAC8FCFE}">
+      <dgm:prSet/>
+      <dgm:spPr/>
+      <dgm:t>
+        <a:bodyPr/>
+        <a:lstStyle/>
+        <a:p>
+          <a:endParaRPr lang="en-GB"/>
+        </a:p>
+      </dgm:t>
+    </dgm:pt>
+    <dgm:pt modelId="{37AFAECE-F0F3-4982-BCF1-8B632C5D006C}" type="sibTrans" cxnId="{DCA66F41-4285-4F31-B15A-1D05BAC8FCFE}">
+      <dgm:prSet/>
+      <dgm:spPr/>
+      <dgm:t>
+        <a:bodyPr/>
+        <a:lstStyle/>
+        <a:p>
+          <a:endParaRPr lang="en-GB"/>
+        </a:p>
+      </dgm:t>
+    </dgm:pt>
+    <dgm:pt modelId="{93EA5504-5412-4DA9-9A2D-B5A310D6E22C}">
+      <dgm:prSet phldrT="[Text]" custT="1"/>
+      <dgm:spPr/>
+      <dgm:t>
+        <a:bodyPr/>
+        <a:lstStyle/>
+        <a:p>
+          <a:r>
+            <a:rPr lang="en-GB" sz="1800" b="1" dirty="0" smtClean="0"/>
+            <a:t>Bhupender</a:t>
+          </a:r>
+        </a:p>
+        <a:p>
+          <a:r>
+            <a:rPr lang="en-GB" sz="1800" dirty="0" smtClean="0"/>
+            <a:t>(E-mail Support)</a:t>
+          </a:r>
+          <a:endParaRPr lang="en-GB" sz="1800" dirty="0"/>
+        </a:p>
+      </dgm:t>
+    </dgm:pt>
+    <dgm:pt modelId="{FEE7CA3C-92C6-4E9F-824A-414282C0543C}" type="parTrans" cxnId="{F55E0A49-F562-43E9-B77B-DBE13A9F3E3A}">
+      <dgm:prSet/>
+      <dgm:spPr/>
+      <dgm:t>
+        <a:bodyPr/>
+        <a:lstStyle/>
+        <a:p>
+          <a:endParaRPr lang="en-GB"/>
+        </a:p>
+      </dgm:t>
+    </dgm:pt>
+    <dgm:pt modelId="{609BA0BE-AC37-49CA-9FDB-06A57D9C8A02}" type="sibTrans" cxnId="{F55E0A49-F562-43E9-B77B-DBE13A9F3E3A}">
+      <dgm:prSet/>
+      <dgm:spPr/>
+      <dgm:t>
+        <a:bodyPr/>
+        <a:lstStyle/>
+        <a:p>
+          <a:endParaRPr lang="en-GB"/>
+        </a:p>
+      </dgm:t>
+    </dgm:pt>
+    <dgm:pt modelId="{C239C9BB-3443-4D36-930F-519DE73A34C1}">
+      <dgm:prSet phldrT="[Text]" custT="1"/>
+      <dgm:spPr/>
+      <dgm:t>
+        <a:bodyPr/>
+        <a:lstStyle/>
+        <a:p>
+          <a:r>
+            <a:rPr lang="en-GB" sz="1800" b="1" dirty="0" smtClean="0"/>
+            <a:t>Praveen</a:t>
+          </a:r>
+        </a:p>
+        <a:p>
+          <a:r>
+            <a:rPr lang="en-GB" sz="1800" dirty="0" smtClean="0"/>
+            <a:t>(IT Security</a:t>
+          </a:r>
+          <a:r>
+            <a:rPr lang="en-GB" sz="1800" dirty="0" smtClean="0"/>
+            <a:t>)</a:t>
+          </a:r>
+          <a:endParaRPr lang="en-GB" sz="1800" dirty="0"/>
+        </a:p>
+      </dgm:t>
+    </dgm:pt>
+    <dgm:pt modelId="{561CF44C-7629-44AD-9EFC-695917C12562}" type="parTrans" cxnId="{E6D9557E-FB4D-4D32-ACE6-2F0391040BB1}">
+      <dgm:prSet/>
+      <dgm:spPr/>
+      <dgm:t>
+        <a:bodyPr/>
+        <a:lstStyle/>
+        <a:p>
+          <a:endParaRPr lang="en-GB"/>
+        </a:p>
+      </dgm:t>
+    </dgm:pt>
+    <dgm:pt modelId="{186E8B56-0AEF-4C98-B0D4-CAD6A354FC0D}" type="sibTrans" cxnId="{E6D9557E-FB4D-4D32-ACE6-2F0391040BB1}">
+      <dgm:prSet/>
+      <dgm:spPr/>
+      <dgm:t>
+        <a:bodyPr/>
+        <a:lstStyle/>
+        <a:p>
+          <a:endParaRPr lang="en-GB"/>
+        </a:p>
+      </dgm:t>
+    </dgm:pt>
+    <dgm:pt modelId="{2C39B455-4210-4FFE-9391-F00E670BF92D}">
+      <dgm:prSet phldrT="[Text]" custT="1"/>
+      <dgm:spPr/>
+      <dgm:t>
+        <a:bodyPr/>
+        <a:lstStyle/>
+        <a:p>
+          <a:r>
+            <a:rPr lang="en-GB" sz="1800" dirty="0" smtClean="0"/>
+            <a:t>Pankaj Gupta</a:t>
+          </a:r>
+        </a:p>
+        <a:p>
+          <a:r>
+            <a:rPr lang="en-GB" sz="1800" dirty="0" smtClean="0"/>
+            <a:t>(ERP Support)</a:t>
+          </a:r>
+          <a:endParaRPr lang="en-GB" sz="1800" dirty="0"/>
+        </a:p>
+      </dgm:t>
+    </dgm:pt>
+    <dgm:pt modelId="{A4FCDA3A-62AE-4CB1-AB73-B6C115436026}" type="parTrans" cxnId="{CE75761F-C0EE-4945-AC05-5A8233042629}">
+      <dgm:prSet/>
+      <dgm:spPr/>
+      <dgm:t>
+        <a:bodyPr/>
+        <a:lstStyle/>
+        <a:p>
+          <a:endParaRPr lang="en-GB"/>
+        </a:p>
+      </dgm:t>
+    </dgm:pt>
+    <dgm:pt modelId="{BAA7C32A-BD69-4164-8BFC-E8AFB36CEFE4}" type="sibTrans" cxnId="{CE75761F-C0EE-4945-AC05-5A8233042629}">
+      <dgm:prSet/>
+      <dgm:spPr/>
+      <dgm:t>
+        <a:bodyPr/>
+        <a:lstStyle/>
+        <a:p>
+          <a:endParaRPr lang="en-GB"/>
+        </a:p>
+      </dgm:t>
+    </dgm:pt>
     <dgm:pt modelId="{855F5962-D0E3-4D1E-BA25-19A7188A6F57}" type="pres">
       <dgm:prSet presAssocID="{F31716EB-9596-4887-B464-7DB006EDB068}" presName="hierChild1" presStyleCnt="0">
         <dgm:presLayoutVars>
@@ -2712,6 +2892,132 @@
       <dgm:prSet presAssocID="{AB67389D-89A0-4FC2-BF2C-43AEAE3C8C7E}" presName="hierChild3" presStyleCnt="0"/>
       <dgm:spPr/>
     </dgm:pt>
+    <dgm:pt modelId="{4144F264-8FB6-4B71-9657-FC3DAC0E387B}" type="pres">
+      <dgm:prSet presAssocID="{6F261686-7D2F-4705-ADCF-C7A730105E5F}" presName="Name17" presStyleLbl="parChTrans1D3" presStyleIdx="0" presStyleCnt="4"/>
+      <dgm:spPr/>
+      <dgm:t>
+        <a:bodyPr/>
+        <a:lstStyle/>
+        <a:p>
+          <a:endParaRPr lang="en-GB"/>
+        </a:p>
+      </dgm:t>
+    </dgm:pt>
+    <dgm:pt modelId="{E7FCE27B-A26E-479A-A3FE-7D4920D0ADB7}" type="pres">
+      <dgm:prSet presAssocID="{AC655AE5-4ADB-47DE-9DC5-64A32B5E615B}" presName="hierRoot3" presStyleCnt="0"/>
+      <dgm:spPr/>
+    </dgm:pt>
+    <dgm:pt modelId="{9F8FF3D7-BAB5-47F6-A315-FC4DE3F6933B}" type="pres">
+      <dgm:prSet presAssocID="{AC655AE5-4ADB-47DE-9DC5-64A32B5E615B}" presName="composite3" presStyleCnt="0"/>
+      <dgm:spPr/>
+    </dgm:pt>
+    <dgm:pt modelId="{7C128272-073D-4FB3-9A9A-740C16F04C5A}" type="pres">
+      <dgm:prSet presAssocID="{AC655AE5-4ADB-47DE-9DC5-64A32B5E615B}" presName="background3" presStyleLbl="node3" presStyleIdx="0" presStyleCnt="4"/>
+      <dgm:spPr/>
+    </dgm:pt>
+    <dgm:pt modelId="{818572EA-FC07-428B-B9B8-080DD1FF6294}" type="pres">
+      <dgm:prSet presAssocID="{AC655AE5-4ADB-47DE-9DC5-64A32B5E615B}" presName="text3" presStyleLbl="fgAcc3" presStyleIdx="0" presStyleCnt="4">
+        <dgm:presLayoutVars>
+          <dgm:chPref val="3"/>
+        </dgm:presLayoutVars>
+      </dgm:prSet>
+      <dgm:spPr/>
+      <dgm:t>
+        <a:bodyPr/>
+        <a:lstStyle/>
+        <a:p>
+          <a:endParaRPr lang="en-GB"/>
+        </a:p>
+      </dgm:t>
+    </dgm:pt>
+    <dgm:pt modelId="{B6788280-4055-4965-9F3E-B21505A4DC74}" type="pres">
+      <dgm:prSet presAssocID="{AC655AE5-4ADB-47DE-9DC5-64A32B5E615B}" presName="hierChild4" presStyleCnt="0"/>
+      <dgm:spPr/>
+    </dgm:pt>
+    <dgm:pt modelId="{F8B48F89-18CB-4559-9735-E107366A319D}" type="pres">
+      <dgm:prSet presAssocID="{FEE7CA3C-92C6-4E9F-824A-414282C0543C}" presName="Name17" presStyleLbl="parChTrans1D3" presStyleIdx="1" presStyleCnt="4"/>
+      <dgm:spPr/>
+      <dgm:t>
+        <a:bodyPr/>
+        <a:lstStyle/>
+        <a:p>
+          <a:endParaRPr lang="en-GB"/>
+        </a:p>
+      </dgm:t>
+    </dgm:pt>
+    <dgm:pt modelId="{7D8A9E7D-E177-4911-9DB7-7073C0F74771}" type="pres">
+      <dgm:prSet presAssocID="{93EA5504-5412-4DA9-9A2D-B5A310D6E22C}" presName="hierRoot3" presStyleCnt="0"/>
+      <dgm:spPr/>
+    </dgm:pt>
+    <dgm:pt modelId="{2293BA4B-0CF2-4F1B-9CFC-A7528041DDC4}" type="pres">
+      <dgm:prSet presAssocID="{93EA5504-5412-4DA9-9A2D-B5A310D6E22C}" presName="composite3" presStyleCnt="0"/>
+      <dgm:spPr/>
+    </dgm:pt>
+    <dgm:pt modelId="{8F05C8A6-EEFB-4514-AF7C-E8E88B972781}" type="pres">
+      <dgm:prSet presAssocID="{93EA5504-5412-4DA9-9A2D-B5A310D6E22C}" presName="background3" presStyleLbl="node3" presStyleIdx="1" presStyleCnt="4"/>
+      <dgm:spPr/>
+    </dgm:pt>
+    <dgm:pt modelId="{D4692811-3C60-47C3-BA41-533DC48F95E9}" type="pres">
+      <dgm:prSet presAssocID="{93EA5504-5412-4DA9-9A2D-B5A310D6E22C}" presName="text3" presStyleLbl="fgAcc3" presStyleIdx="1" presStyleCnt="4">
+        <dgm:presLayoutVars>
+          <dgm:chPref val="3"/>
+        </dgm:presLayoutVars>
+      </dgm:prSet>
+      <dgm:spPr/>
+      <dgm:t>
+        <a:bodyPr/>
+        <a:lstStyle/>
+        <a:p>
+          <a:endParaRPr lang="en-GB"/>
+        </a:p>
+      </dgm:t>
+    </dgm:pt>
+    <dgm:pt modelId="{2333C867-049C-4A11-9DE2-30DB58858611}" type="pres">
+      <dgm:prSet presAssocID="{93EA5504-5412-4DA9-9A2D-B5A310D6E22C}" presName="hierChild4" presStyleCnt="0"/>
+      <dgm:spPr/>
+    </dgm:pt>
+    <dgm:pt modelId="{536065B2-22FE-409F-8EAF-861CC4107590}" type="pres">
+      <dgm:prSet presAssocID="{561CF44C-7629-44AD-9EFC-695917C12562}" presName="Name17" presStyleLbl="parChTrans1D3" presStyleIdx="2" presStyleCnt="4"/>
+      <dgm:spPr/>
+      <dgm:t>
+        <a:bodyPr/>
+        <a:lstStyle/>
+        <a:p>
+          <a:endParaRPr lang="en-GB"/>
+        </a:p>
+      </dgm:t>
+    </dgm:pt>
+    <dgm:pt modelId="{211CEE7E-B5A5-431C-A813-BA6E9D20A880}" type="pres">
+      <dgm:prSet presAssocID="{C239C9BB-3443-4D36-930F-519DE73A34C1}" presName="hierRoot3" presStyleCnt="0"/>
+      <dgm:spPr/>
+    </dgm:pt>
+    <dgm:pt modelId="{326C1B2A-20B9-4C16-9E03-3ED0C2563D62}" type="pres">
+      <dgm:prSet presAssocID="{C239C9BB-3443-4D36-930F-519DE73A34C1}" presName="composite3" presStyleCnt="0"/>
+      <dgm:spPr/>
+    </dgm:pt>
+    <dgm:pt modelId="{0223F492-C95A-4803-AEF4-13AB54592055}" type="pres">
+      <dgm:prSet presAssocID="{C239C9BB-3443-4D36-930F-519DE73A34C1}" presName="background3" presStyleLbl="node3" presStyleIdx="2" presStyleCnt="4"/>
+      <dgm:spPr/>
+    </dgm:pt>
+    <dgm:pt modelId="{B73D9AFD-9D06-4B08-B984-9F6A707D953F}" type="pres">
+      <dgm:prSet presAssocID="{C239C9BB-3443-4D36-930F-519DE73A34C1}" presName="text3" presStyleLbl="fgAcc3" presStyleIdx="2" presStyleCnt="4">
+        <dgm:presLayoutVars>
+          <dgm:chPref val="3"/>
+        </dgm:presLayoutVars>
+      </dgm:prSet>
+      <dgm:spPr/>
+      <dgm:t>
+        <a:bodyPr/>
+        <a:lstStyle/>
+        <a:p>
+          <a:endParaRPr lang="en-GB"/>
+        </a:p>
+      </dgm:t>
+    </dgm:pt>
+    <dgm:pt modelId="{2D7A69EC-E5AB-4E5B-BF1C-20EC86E87C03}" type="pres">
+      <dgm:prSet presAssocID="{C239C9BB-3443-4D36-930F-519DE73A34C1}" presName="hierChild4" presStyleCnt="0"/>
+      <dgm:spPr/>
+    </dgm:pt>
     <dgm:pt modelId="{2309E421-38BA-4FB4-88C8-EC230A63CD48}" type="pres">
       <dgm:prSet presAssocID="{36DF3533-93C4-40FE-B373-4E77AFD498F2}" presName="Name10" presStyleLbl="parChTrans1D2" presStyleIdx="1" presStyleCnt="3"/>
       <dgm:spPr/>
@@ -2796,20 +3102,67 @@
       <dgm:prSet presAssocID="{673D36DB-6E7C-41A1-B23A-9C9BD0787B8D}" presName="hierChild3" presStyleCnt="0"/>
       <dgm:spPr/>
     </dgm:pt>
+    <dgm:pt modelId="{1249E27C-B074-4DEE-A51C-C1F2485C074D}" type="pres">
+      <dgm:prSet presAssocID="{A4FCDA3A-62AE-4CB1-AB73-B6C115436026}" presName="Name17" presStyleLbl="parChTrans1D3" presStyleIdx="3" presStyleCnt="4"/>
+      <dgm:spPr/>
+    </dgm:pt>
+    <dgm:pt modelId="{D08B11E9-2500-4C67-B147-18269A406081}" type="pres">
+      <dgm:prSet presAssocID="{2C39B455-4210-4FFE-9391-F00E670BF92D}" presName="hierRoot3" presStyleCnt="0"/>
+      <dgm:spPr/>
+    </dgm:pt>
+    <dgm:pt modelId="{7C51CF49-10ED-41C4-AE78-3013EC2B438F}" type="pres">
+      <dgm:prSet presAssocID="{2C39B455-4210-4FFE-9391-F00E670BF92D}" presName="composite3" presStyleCnt="0"/>
+      <dgm:spPr/>
+    </dgm:pt>
+    <dgm:pt modelId="{95CD6972-2B11-4909-9984-F2181DCEF4AB}" type="pres">
+      <dgm:prSet presAssocID="{2C39B455-4210-4FFE-9391-F00E670BF92D}" presName="background3" presStyleLbl="node3" presStyleIdx="3" presStyleCnt="4"/>
+      <dgm:spPr/>
+    </dgm:pt>
+    <dgm:pt modelId="{2C3D440A-D67F-442B-86C6-4864E8A61D40}" type="pres">
+      <dgm:prSet presAssocID="{2C39B455-4210-4FFE-9391-F00E670BF92D}" presName="text3" presStyleLbl="fgAcc3" presStyleIdx="3" presStyleCnt="4">
+        <dgm:presLayoutVars>
+          <dgm:chPref val="3"/>
+        </dgm:presLayoutVars>
+      </dgm:prSet>
+      <dgm:spPr/>
+      <dgm:t>
+        <a:bodyPr/>
+        <a:lstStyle/>
+        <a:p>
+          <a:endParaRPr lang="en-GB"/>
+        </a:p>
+      </dgm:t>
+    </dgm:pt>
+    <dgm:pt modelId="{E0357B70-7374-4561-9E41-68FAD9F28DD4}" type="pres">
+      <dgm:prSet presAssocID="{2C39B455-4210-4FFE-9391-F00E670BF92D}" presName="hierChild4" presStyleCnt="0"/>
+      <dgm:spPr/>
+    </dgm:pt>
   </dgm:ptLst>
   <dgm:cxnLst>
+    <dgm:cxn modelId="{71059CC8-623F-4B1F-821F-A92FBD4034F8}" type="presOf" srcId="{FEE7CA3C-92C6-4E9F-824A-414282C0543C}" destId="{F8B48F89-18CB-4559-9735-E107366A319D}" srcOrd="0" destOrd="0" presId="urn:microsoft.com/office/officeart/2005/8/layout/hierarchy1"/>
+    <dgm:cxn modelId="{D6FBDEFC-867E-4043-9F8B-BE2F4C9B22CE}" type="presOf" srcId="{673D36DB-6E7C-41A1-B23A-9C9BD0787B8D}" destId="{5374055F-39FB-40D0-A07F-66B5102D7CE2}" srcOrd="0" destOrd="0" presId="urn:microsoft.com/office/officeart/2005/8/layout/hierarchy1"/>
+    <dgm:cxn modelId="{BFD97CB9-EE28-449F-94CB-D389477F71DB}" srcId="{94F5A134-B20A-4658-8680-22F4A314DD0B}" destId="{AB67389D-89A0-4FC2-BF2C-43AEAE3C8C7E}" srcOrd="0" destOrd="0" parTransId="{BD34DFC3-306C-49C4-8850-DBB905ECB0DA}" sibTransId="{F91DF16D-7DDD-40B0-BE13-9FF770B7FB52}"/>
+    <dgm:cxn modelId="{0A496E7C-F64D-44E1-B435-CDADE30D961C}" type="presOf" srcId="{6F261686-7D2F-4705-ADCF-C7A730105E5F}" destId="{4144F264-8FB6-4B71-9657-FC3DAC0E387B}" srcOrd="0" destOrd="0" presId="urn:microsoft.com/office/officeart/2005/8/layout/hierarchy1"/>
     <dgm:cxn modelId="{AE02FC06-C79C-4F23-BD90-0EAD6DFB5367}" type="presOf" srcId="{AB67389D-89A0-4FC2-BF2C-43AEAE3C8C7E}" destId="{EC5F7CD7-92BD-4380-AF1B-AB0D2D7DB8B2}" srcOrd="0" destOrd="0" presId="urn:microsoft.com/office/officeart/2005/8/layout/hierarchy1"/>
-    <dgm:cxn modelId="{D6FBDEFC-867E-4043-9F8B-BE2F4C9B22CE}" type="presOf" srcId="{673D36DB-6E7C-41A1-B23A-9C9BD0787B8D}" destId="{5374055F-39FB-40D0-A07F-66B5102D7CE2}" srcOrd="0" destOrd="0" presId="urn:microsoft.com/office/officeart/2005/8/layout/hierarchy1"/>
+    <dgm:cxn modelId="{CB7FB9EA-A9C0-4734-B950-0E2B4A6ED218}" type="presOf" srcId="{2C39B455-4210-4FFE-9391-F00E670BF92D}" destId="{2C3D440A-D67F-442B-86C6-4864E8A61D40}" srcOrd="0" destOrd="0" presId="urn:microsoft.com/office/officeart/2005/8/layout/hierarchy1"/>
+    <dgm:cxn modelId="{D266511D-19A5-4EB7-81F8-25E8A203F000}" type="presOf" srcId="{AC655AE5-4ADB-47DE-9DC5-64A32B5E615B}" destId="{818572EA-FC07-428B-B9B8-080DD1FF6294}" srcOrd="0" destOrd="0" presId="urn:microsoft.com/office/officeart/2005/8/layout/hierarchy1"/>
+    <dgm:cxn modelId="{0727ED76-65E8-4C0B-B4A1-30187991B889}" srcId="{F31716EB-9596-4887-B464-7DB006EDB068}" destId="{94F5A134-B20A-4658-8680-22F4A314DD0B}" srcOrd="0" destOrd="0" parTransId="{F67117DE-305D-4F3F-8B84-F1D15CC7605C}" sibTransId="{D7D0E7DF-FC7B-404D-B832-09E2B376DE6F}"/>
+    <dgm:cxn modelId="{5CA8F78E-7305-4C9B-8073-0469A3FE3E80}" type="presOf" srcId="{C239C9BB-3443-4D36-930F-519DE73A34C1}" destId="{B73D9AFD-9D06-4B08-B984-9F6A707D953F}" srcOrd="0" destOrd="0" presId="urn:microsoft.com/office/officeart/2005/8/layout/hierarchy1"/>
     <dgm:cxn modelId="{5CDFEABC-A73A-4C13-9D2D-C5371C5922F3}" srcId="{94F5A134-B20A-4658-8680-22F4A314DD0B}" destId="{A9013CE1-9A40-476E-85D2-FA769B01A6AF}" srcOrd="1" destOrd="0" parTransId="{36DF3533-93C4-40FE-B373-4E77AFD498F2}" sibTransId="{3E7D1108-CB5E-4ED8-9570-4FA5D1AE69F2}"/>
+    <dgm:cxn modelId="{267EEC34-4A3A-4280-AB88-AB9522D73CDA}" srcId="{94F5A134-B20A-4658-8680-22F4A314DD0B}" destId="{673D36DB-6E7C-41A1-B23A-9C9BD0787B8D}" srcOrd="2" destOrd="0" parTransId="{787815C3-6FFA-4DE3-9216-ACF62EA19EDB}" sibTransId="{00A41312-615C-475E-8D96-9806A8F04B97}"/>
+    <dgm:cxn modelId="{E0EA018F-D6CE-4B12-AECA-4AD3BC10A922}" type="presOf" srcId="{93EA5504-5412-4DA9-9A2D-B5A310D6E22C}" destId="{D4692811-3C60-47C3-BA41-533DC48F95E9}" srcOrd="0" destOrd="0" presId="urn:microsoft.com/office/officeart/2005/8/layout/hierarchy1"/>
+    <dgm:cxn modelId="{533017FD-C039-4FEF-8C28-793E54A6742D}" type="presOf" srcId="{787815C3-6FFA-4DE3-9216-ACF62EA19EDB}" destId="{A540D9FD-1B12-42A2-AA38-93A542AF12D5}" srcOrd="0" destOrd="0" presId="urn:microsoft.com/office/officeart/2005/8/layout/hierarchy1"/>
+    <dgm:cxn modelId="{93C7B14D-F508-4B3C-A1D0-C0C083DFD829}" type="presOf" srcId="{94F5A134-B20A-4658-8680-22F4A314DD0B}" destId="{26243D0F-49E9-4624-B9D1-DA584AED8B03}" srcOrd="0" destOrd="0" presId="urn:microsoft.com/office/officeart/2005/8/layout/hierarchy1"/>
+    <dgm:cxn modelId="{DCA66F41-4285-4F31-B15A-1D05BAC8FCFE}" srcId="{AB67389D-89A0-4FC2-BF2C-43AEAE3C8C7E}" destId="{AC655AE5-4ADB-47DE-9DC5-64A32B5E615B}" srcOrd="0" destOrd="0" parTransId="{6F261686-7D2F-4705-ADCF-C7A730105E5F}" sibTransId="{37AFAECE-F0F3-4982-BCF1-8B632C5D006C}"/>
+    <dgm:cxn modelId="{50F64EAB-7259-407B-8996-04B3B643E88C}" type="presOf" srcId="{A9013CE1-9A40-476E-85D2-FA769B01A6AF}" destId="{54CDEA14-F245-48F4-9832-125065A01019}" srcOrd="0" destOrd="0" presId="urn:microsoft.com/office/officeart/2005/8/layout/hierarchy1"/>
+    <dgm:cxn modelId="{74910D35-D490-4FEB-808D-B6ABBAC660B9}" type="presOf" srcId="{A4FCDA3A-62AE-4CB1-AB73-B6C115436026}" destId="{1249E27C-B074-4DEE-A51C-C1F2485C074D}" srcOrd="0" destOrd="0" presId="urn:microsoft.com/office/officeart/2005/8/layout/hierarchy1"/>
     <dgm:cxn modelId="{81CEDFBF-1466-4514-9C89-9D3BDF3CA039}" type="presOf" srcId="{F31716EB-9596-4887-B464-7DB006EDB068}" destId="{855F5962-D0E3-4D1E-BA25-19A7188A6F57}" srcOrd="0" destOrd="0" presId="urn:microsoft.com/office/officeart/2005/8/layout/hierarchy1"/>
-    <dgm:cxn modelId="{0727ED76-65E8-4C0B-B4A1-30187991B889}" srcId="{F31716EB-9596-4887-B464-7DB006EDB068}" destId="{94F5A134-B20A-4658-8680-22F4A314DD0B}" srcOrd="0" destOrd="0" parTransId="{F67117DE-305D-4F3F-8B84-F1D15CC7605C}" sibTransId="{D7D0E7DF-FC7B-404D-B832-09E2B376DE6F}"/>
-    <dgm:cxn modelId="{50F64EAB-7259-407B-8996-04B3B643E88C}" type="presOf" srcId="{A9013CE1-9A40-476E-85D2-FA769B01A6AF}" destId="{54CDEA14-F245-48F4-9832-125065A01019}" srcOrd="0" destOrd="0" presId="urn:microsoft.com/office/officeart/2005/8/layout/hierarchy1"/>
-    <dgm:cxn modelId="{93C7B14D-F508-4B3C-A1D0-C0C083DFD829}" type="presOf" srcId="{94F5A134-B20A-4658-8680-22F4A314DD0B}" destId="{26243D0F-49E9-4624-B9D1-DA584AED8B03}" srcOrd="0" destOrd="0" presId="urn:microsoft.com/office/officeart/2005/8/layout/hierarchy1"/>
-    <dgm:cxn modelId="{533017FD-C039-4FEF-8C28-793E54A6742D}" type="presOf" srcId="{787815C3-6FFA-4DE3-9216-ACF62EA19EDB}" destId="{A540D9FD-1B12-42A2-AA38-93A542AF12D5}" srcOrd="0" destOrd="0" presId="urn:microsoft.com/office/officeart/2005/8/layout/hierarchy1"/>
+    <dgm:cxn modelId="{506E2F04-446F-4268-AFE8-698151FA2C16}" type="presOf" srcId="{561CF44C-7629-44AD-9EFC-695917C12562}" destId="{536065B2-22FE-409F-8EAF-861CC4107590}" srcOrd="0" destOrd="0" presId="urn:microsoft.com/office/officeart/2005/8/layout/hierarchy1"/>
+    <dgm:cxn modelId="{CE75761F-C0EE-4945-AC05-5A8233042629}" srcId="{673D36DB-6E7C-41A1-B23A-9C9BD0787B8D}" destId="{2C39B455-4210-4FFE-9391-F00E670BF92D}" srcOrd="0" destOrd="0" parTransId="{A4FCDA3A-62AE-4CB1-AB73-B6C115436026}" sibTransId="{BAA7C32A-BD69-4164-8BFC-E8AFB36CEFE4}"/>
+    <dgm:cxn modelId="{E6D9557E-FB4D-4D32-ACE6-2F0391040BB1}" srcId="{AB67389D-89A0-4FC2-BF2C-43AEAE3C8C7E}" destId="{C239C9BB-3443-4D36-930F-519DE73A34C1}" srcOrd="2" destOrd="0" parTransId="{561CF44C-7629-44AD-9EFC-695917C12562}" sibTransId="{186E8B56-0AEF-4C98-B0D4-CAD6A354FC0D}"/>
+    <dgm:cxn modelId="{F55E0A49-F562-43E9-B77B-DBE13A9F3E3A}" srcId="{AB67389D-89A0-4FC2-BF2C-43AEAE3C8C7E}" destId="{93EA5504-5412-4DA9-9A2D-B5A310D6E22C}" srcOrd="1" destOrd="0" parTransId="{FEE7CA3C-92C6-4E9F-824A-414282C0543C}" sibTransId="{609BA0BE-AC37-49CA-9FDB-06A57D9C8A02}"/>
+    <dgm:cxn modelId="{8C9C462F-FE55-4F26-8673-F06A520FBE0C}" type="presOf" srcId="{36DF3533-93C4-40FE-B373-4E77AFD498F2}" destId="{2309E421-38BA-4FB4-88C8-EC230A63CD48}" srcOrd="0" destOrd="0" presId="urn:microsoft.com/office/officeart/2005/8/layout/hierarchy1"/>
     <dgm:cxn modelId="{7C4A59AA-A96E-48CF-8C9E-28D5FF143CF7}" type="presOf" srcId="{BD34DFC3-306C-49C4-8850-DBB905ECB0DA}" destId="{60EDBC92-32A1-49F9-94E9-7483DDE7E40B}" srcOrd="0" destOrd="0" presId="urn:microsoft.com/office/officeart/2005/8/layout/hierarchy1"/>
-    <dgm:cxn modelId="{8C9C462F-FE55-4F26-8673-F06A520FBE0C}" type="presOf" srcId="{36DF3533-93C4-40FE-B373-4E77AFD498F2}" destId="{2309E421-38BA-4FB4-88C8-EC230A63CD48}" srcOrd="0" destOrd="0" presId="urn:microsoft.com/office/officeart/2005/8/layout/hierarchy1"/>
-    <dgm:cxn modelId="{267EEC34-4A3A-4280-AB88-AB9522D73CDA}" srcId="{94F5A134-B20A-4658-8680-22F4A314DD0B}" destId="{673D36DB-6E7C-41A1-B23A-9C9BD0787B8D}" srcOrd="2" destOrd="0" parTransId="{787815C3-6FFA-4DE3-9216-ACF62EA19EDB}" sibTransId="{00A41312-615C-475E-8D96-9806A8F04B97}"/>
-    <dgm:cxn modelId="{BFD97CB9-EE28-449F-94CB-D389477F71DB}" srcId="{94F5A134-B20A-4658-8680-22F4A314DD0B}" destId="{AB67389D-89A0-4FC2-BF2C-43AEAE3C8C7E}" srcOrd="0" destOrd="0" parTransId="{BD34DFC3-306C-49C4-8850-DBB905ECB0DA}" sibTransId="{F91DF16D-7DDD-40B0-BE13-9FF770B7FB52}"/>
     <dgm:cxn modelId="{682881E6-98BD-4E29-9F3B-84ADDCEFD9E9}" type="presParOf" srcId="{855F5962-D0E3-4D1E-BA25-19A7188A6F57}" destId="{F95FBEFE-E229-41F4-9F58-25D87539366F}" srcOrd="0" destOrd="0" presId="urn:microsoft.com/office/officeart/2005/8/layout/hierarchy1"/>
     <dgm:cxn modelId="{CA12A609-7200-411B-830F-B6EF80C336F7}" type="presParOf" srcId="{F95FBEFE-E229-41F4-9F58-25D87539366F}" destId="{FF786397-04FC-43DD-B7EE-B3943A46C920}" srcOrd="0" destOrd="0" presId="urn:microsoft.com/office/officeart/2005/8/layout/hierarchy1"/>
     <dgm:cxn modelId="{4D105133-5AEE-4297-9A59-38B3E963B47B}" type="presParOf" srcId="{FF786397-04FC-43DD-B7EE-B3943A46C920}" destId="{740C5C29-9641-470A-8CF1-98DCF1E70D25}" srcOrd="0" destOrd="0" presId="urn:microsoft.com/office/officeart/2005/8/layout/hierarchy1"/>
@@ -2821,6 +3174,24 @@
     <dgm:cxn modelId="{165B4C9E-85AF-4BA2-B7BA-01E383048EB1}" type="presParOf" srcId="{D5A2DD7C-2287-4D45-81D5-691AF7868779}" destId="{55A5E781-0B7B-412D-A76A-DE507C15BC6C}" srcOrd="0" destOrd="0" presId="urn:microsoft.com/office/officeart/2005/8/layout/hierarchy1"/>
     <dgm:cxn modelId="{F7561543-91E5-499D-BF69-704867184707}" type="presParOf" srcId="{D5A2DD7C-2287-4D45-81D5-691AF7868779}" destId="{EC5F7CD7-92BD-4380-AF1B-AB0D2D7DB8B2}" srcOrd="1" destOrd="0" presId="urn:microsoft.com/office/officeart/2005/8/layout/hierarchy1"/>
     <dgm:cxn modelId="{CEE57DF0-F0D1-43C3-BB22-1DC18C2E176D}" type="presParOf" srcId="{784B2152-333D-45E1-8B1E-20B4CB2E25FC}" destId="{855E306D-A0D6-4784-BDD9-681D864FA3C1}" srcOrd="1" destOrd="0" presId="urn:microsoft.com/office/officeart/2005/8/layout/hierarchy1"/>
+    <dgm:cxn modelId="{12024671-358F-4122-B358-29269C2C98C9}" type="presParOf" srcId="{855E306D-A0D6-4784-BDD9-681D864FA3C1}" destId="{4144F264-8FB6-4B71-9657-FC3DAC0E387B}" srcOrd="0" destOrd="0" presId="urn:microsoft.com/office/officeart/2005/8/layout/hierarchy1"/>
+    <dgm:cxn modelId="{5191CFE8-3CF7-44F4-9421-76ABAB372596}" type="presParOf" srcId="{855E306D-A0D6-4784-BDD9-681D864FA3C1}" destId="{E7FCE27B-A26E-479A-A3FE-7D4920D0ADB7}" srcOrd="1" destOrd="0" presId="urn:microsoft.com/office/officeart/2005/8/layout/hierarchy1"/>
+    <dgm:cxn modelId="{15CD6906-E2AA-4597-B6E1-41949732ACC6}" type="presParOf" srcId="{E7FCE27B-A26E-479A-A3FE-7D4920D0ADB7}" destId="{9F8FF3D7-BAB5-47F6-A315-FC4DE3F6933B}" srcOrd="0" destOrd="0" presId="urn:microsoft.com/office/officeart/2005/8/layout/hierarchy1"/>
+    <dgm:cxn modelId="{9308A4AE-734F-4275-B16A-5A8824E6B0AD}" type="presParOf" srcId="{9F8FF3D7-BAB5-47F6-A315-FC4DE3F6933B}" destId="{7C128272-073D-4FB3-9A9A-740C16F04C5A}" srcOrd="0" destOrd="0" presId="urn:microsoft.com/office/officeart/2005/8/layout/hierarchy1"/>
+    <dgm:cxn modelId="{FEE6BB8E-0270-4E5C-8180-A49C4C65C7E1}" type="presParOf" srcId="{9F8FF3D7-BAB5-47F6-A315-FC4DE3F6933B}" destId="{818572EA-FC07-428B-B9B8-080DD1FF6294}" srcOrd="1" destOrd="0" presId="urn:microsoft.com/office/officeart/2005/8/layout/hierarchy1"/>
+    <dgm:cxn modelId="{FE07F219-C81E-4555-A42F-9402973DB155}" type="presParOf" srcId="{E7FCE27B-A26E-479A-A3FE-7D4920D0ADB7}" destId="{B6788280-4055-4965-9F3E-B21505A4DC74}" srcOrd="1" destOrd="0" presId="urn:microsoft.com/office/officeart/2005/8/layout/hierarchy1"/>
+    <dgm:cxn modelId="{EDA617B8-4DC7-42DA-A7E1-BE99232054D5}" type="presParOf" srcId="{855E306D-A0D6-4784-BDD9-681D864FA3C1}" destId="{F8B48F89-18CB-4559-9735-E107366A319D}" srcOrd="2" destOrd="0" presId="urn:microsoft.com/office/officeart/2005/8/layout/hierarchy1"/>
+    <dgm:cxn modelId="{0C8B7561-3B31-4A31-A696-BC7609236994}" type="presParOf" srcId="{855E306D-A0D6-4784-BDD9-681D864FA3C1}" destId="{7D8A9E7D-E177-4911-9DB7-7073C0F74771}" srcOrd="3" destOrd="0" presId="urn:microsoft.com/office/officeart/2005/8/layout/hierarchy1"/>
+    <dgm:cxn modelId="{8FAD1915-807C-494D-AD13-B868ADCF8E62}" type="presParOf" srcId="{7D8A9E7D-E177-4911-9DB7-7073C0F74771}" destId="{2293BA4B-0CF2-4F1B-9CFC-A7528041DDC4}" srcOrd="0" destOrd="0" presId="urn:microsoft.com/office/officeart/2005/8/layout/hierarchy1"/>
+    <dgm:cxn modelId="{30C8982A-556E-491B-8E2E-93513A7B3372}" type="presParOf" srcId="{2293BA4B-0CF2-4F1B-9CFC-A7528041DDC4}" destId="{8F05C8A6-EEFB-4514-AF7C-E8E88B972781}" srcOrd="0" destOrd="0" presId="urn:microsoft.com/office/officeart/2005/8/layout/hierarchy1"/>
+    <dgm:cxn modelId="{57F6DB4C-44ED-40CA-8E19-DF40916BBF75}" type="presParOf" srcId="{2293BA4B-0CF2-4F1B-9CFC-A7528041DDC4}" destId="{D4692811-3C60-47C3-BA41-533DC48F95E9}" srcOrd="1" destOrd="0" presId="urn:microsoft.com/office/officeart/2005/8/layout/hierarchy1"/>
+    <dgm:cxn modelId="{645DC457-6F33-4EA2-8C69-6E71FED79241}" type="presParOf" srcId="{7D8A9E7D-E177-4911-9DB7-7073C0F74771}" destId="{2333C867-049C-4A11-9DE2-30DB58858611}" srcOrd="1" destOrd="0" presId="urn:microsoft.com/office/officeart/2005/8/layout/hierarchy1"/>
+    <dgm:cxn modelId="{C78F7C59-2011-4C08-97CF-4EAB316415ED}" type="presParOf" srcId="{855E306D-A0D6-4784-BDD9-681D864FA3C1}" destId="{536065B2-22FE-409F-8EAF-861CC4107590}" srcOrd="4" destOrd="0" presId="urn:microsoft.com/office/officeart/2005/8/layout/hierarchy1"/>
+    <dgm:cxn modelId="{C34B4C8A-6A9D-451C-A255-F37FC2C762F4}" type="presParOf" srcId="{855E306D-A0D6-4784-BDD9-681D864FA3C1}" destId="{211CEE7E-B5A5-431C-A813-BA6E9D20A880}" srcOrd="5" destOrd="0" presId="urn:microsoft.com/office/officeart/2005/8/layout/hierarchy1"/>
+    <dgm:cxn modelId="{7039F22B-42AA-4293-8EA3-C668877C876A}" type="presParOf" srcId="{211CEE7E-B5A5-431C-A813-BA6E9D20A880}" destId="{326C1B2A-20B9-4C16-9E03-3ED0C2563D62}" srcOrd="0" destOrd="0" presId="urn:microsoft.com/office/officeart/2005/8/layout/hierarchy1"/>
+    <dgm:cxn modelId="{6498AD45-139E-4DF5-9386-C05A72A6DE81}" type="presParOf" srcId="{326C1B2A-20B9-4C16-9E03-3ED0C2563D62}" destId="{0223F492-C95A-4803-AEF4-13AB54592055}" srcOrd="0" destOrd="0" presId="urn:microsoft.com/office/officeart/2005/8/layout/hierarchy1"/>
+    <dgm:cxn modelId="{0CA54D0A-8CC2-45AB-851E-B85E2E2E6692}" type="presParOf" srcId="{326C1B2A-20B9-4C16-9E03-3ED0C2563D62}" destId="{B73D9AFD-9D06-4B08-B984-9F6A707D953F}" srcOrd="1" destOrd="0" presId="urn:microsoft.com/office/officeart/2005/8/layout/hierarchy1"/>
+    <dgm:cxn modelId="{FEAE109A-1680-4FDE-B589-5867C28977AD}" type="presParOf" srcId="{211CEE7E-B5A5-431C-A813-BA6E9D20A880}" destId="{2D7A69EC-E5AB-4E5B-BF1C-20EC86E87C03}" srcOrd="1" destOrd="0" presId="urn:microsoft.com/office/officeart/2005/8/layout/hierarchy1"/>
     <dgm:cxn modelId="{C779C6E5-4A96-465F-BC7C-3AD9956F7759}" type="presParOf" srcId="{DC288CCA-5151-4A8A-827C-AE5AB0922800}" destId="{2309E421-38BA-4FB4-88C8-EC230A63CD48}" srcOrd="2" destOrd="0" presId="urn:microsoft.com/office/officeart/2005/8/layout/hierarchy1"/>
     <dgm:cxn modelId="{98ACAD3D-56EE-4EAB-B831-D22970A21C96}" type="presParOf" srcId="{DC288CCA-5151-4A8A-827C-AE5AB0922800}" destId="{1553F5EE-055A-483A-8097-84978D6D5335}" srcOrd="3" destOrd="0" presId="urn:microsoft.com/office/officeart/2005/8/layout/hierarchy1"/>
     <dgm:cxn modelId="{34ADCA6C-44B3-4DB9-B0B9-87E9702CEF6F}" type="presParOf" srcId="{1553F5EE-055A-483A-8097-84978D6D5335}" destId="{EB3F8F48-1DF5-4DC6-AAE2-68E7DB803A88}" srcOrd="0" destOrd="0" presId="urn:microsoft.com/office/officeart/2005/8/layout/hierarchy1"/>
@@ -2833,6 +3204,12 @@
     <dgm:cxn modelId="{A9D0C82B-CCDD-4D9E-A169-4294F72A54A5}" type="presParOf" srcId="{17315DFF-3069-4F2C-947E-33189B3238B3}" destId="{277DCC10-3C4C-4DBB-8FF7-241E4E11B661}" srcOrd="0" destOrd="0" presId="urn:microsoft.com/office/officeart/2005/8/layout/hierarchy1"/>
     <dgm:cxn modelId="{FD782C10-057C-4808-AA24-8DE8E831D9FA}" type="presParOf" srcId="{17315DFF-3069-4F2C-947E-33189B3238B3}" destId="{5374055F-39FB-40D0-A07F-66B5102D7CE2}" srcOrd="1" destOrd="0" presId="urn:microsoft.com/office/officeart/2005/8/layout/hierarchy1"/>
     <dgm:cxn modelId="{E19CAA51-454C-4F2F-91F6-1E79108FD85E}" type="presParOf" srcId="{7A71156C-3AAB-40AA-8652-836AC97AD70D}" destId="{40C3AE53-E536-4348-A854-D334C1140080}" srcOrd="1" destOrd="0" presId="urn:microsoft.com/office/officeart/2005/8/layout/hierarchy1"/>
+    <dgm:cxn modelId="{37AA4970-DCB6-4877-8645-9DB5BC2B5182}" type="presParOf" srcId="{40C3AE53-E536-4348-A854-D334C1140080}" destId="{1249E27C-B074-4DEE-A51C-C1F2485C074D}" srcOrd="0" destOrd="0" presId="urn:microsoft.com/office/officeart/2005/8/layout/hierarchy1"/>
+    <dgm:cxn modelId="{48E0E5F6-A587-44DD-93AA-0D4F03168622}" type="presParOf" srcId="{40C3AE53-E536-4348-A854-D334C1140080}" destId="{D08B11E9-2500-4C67-B147-18269A406081}" srcOrd="1" destOrd="0" presId="urn:microsoft.com/office/officeart/2005/8/layout/hierarchy1"/>
+    <dgm:cxn modelId="{BBED40D5-DC40-449C-950B-A42FB49F9784}" type="presParOf" srcId="{D08B11E9-2500-4C67-B147-18269A406081}" destId="{7C51CF49-10ED-41C4-AE78-3013EC2B438F}" srcOrd="0" destOrd="0" presId="urn:microsoft.com/office/officeart/2005/8/layout/hierarchy1"/>
+    <dgm:cxn modelId="{220D8F36-DCC3-491B-97BD-CAAD5E843573}" type="presParOf" srcId="{7C51CF49-10ED-41C4-AE78-3013EC2B438F}" destId="{95CD6972-2B11-4909-9984-F2181DCEF4AB}" srcOrd="0" destOrd="0" presId="urn:microsoft.com/office/officeart/2005/8/layout/hierarchy1"/>
+    <dgm:cxn modelId="{934E33C3-FA47-4A43-9ADF-029C6985F8DB}" type="presParOf" srcId="{7C51CF49-10ED-41C4-AE78-3013EC2B438F}" destId="{2C3D440A-D67F-442B-86C6-4864E8A61D40}" srcOrd="1" destOrd="0" presId="urn:microsoft.com/office/officeart/2005/8/layout/hierarchy1"/>
+    <dgm:cxn modelId="{888CE717-A1FB-43E1-B309-B6DE45AE0000}" type="presParOf" srcId="{D08B11E9-2500-4C67-B147-18269A406081}" destId="{E0357B70-7374-4561-9E41-68FAD9F28DD4}" srcOrd="1" destOrd="0" presId="urn:microsoft.com/office/officeart/2005/8/layout/hierarchy1"/>
   </dgm:cxnLst>
   <dgm:bg/>
   <dgm:whole/>
@@ -3374,25 +3751,25 @@
     </dgm:pt>
   </dgm:ptLst>
   <dgm:cxnLst>
-    <dgm:cxn modelId="{FE36B098-FCB1-46DD-9009-047CB51A37FB}" type="presOf" srcId="{E7E9E394-9504-4980-88EB-66A662B0F111}" destId="{3EC5C9B2-C270-46A3-8E5B-330F747B0D88}" srcOrd="0" destOrd="0" presId="urn:microsoft.com/office/officeart/2008/layout/AlternatingHexagons"/>
+    <dgm:cxn modelId="{500975F5-9844-4263-A2B6-70A412A60284}" srcId="{A7C8040A-4875-4FD0-910C-882566E3BA1E}" destId="{AE03FA61-78C6-4588-94A3-401745026354}" srcOrd="3" destOrd="0" parTransId="{9414A8FB-20AF-4209-AF33-9B4AADD13CD0}" sibTransId="{0DFF81D2-49D1-4715-A416-621C20BBC027}"/>
+    <dgm:cxn modelId="{E8827A9A-7ED0-4F5C-8EDC-9DA9131CD38F}" type="presOf" srcId="{0DFF81D2-49D1-4715-A416-621C20BBC027}" destId="{83B95B54-5FC6-4271-A0DB-EF5C40F372DA}" srcOrd="0" destOrd="0" presId="urn:microsoft.com/office/officeart/2008/layout/AlternatingHexagons"/>
     <dgm:cxn modelId="{6B05A5C1-375A-4021-B715-EECE877C525E}" type="presOf" srcId="{4615948C-F8C4-4700-86DF-761FFB42B137}" destId="{11E31C06-BA01-4165-AB20-0D231852A62B}" srcOrd="0" destOrd="0" presId="urn:microsoft.com/office/officeart/2008/layout/AlternatingHexagons"/>
+    <dgm:cxn modelId="{9025DA99-1180-434F-8FCC-379DC70E5572}" srcId="{A7C8040A-4875-4FD0-910C-882566E3BA1E}" destId="{E7E9E394-9504-4980-88EB-66A662B0F111}" srcOrd="0" destOrd="0" parTransId="{BAF9A357-7B39-4905-BC2A-718E27411EDA}" sibTransId="{EE87F12C-0A69-4BA3-847C-4D2060A9B55F}"/>
     <dgm:cxn modelId="{9A74C0F2-F388-44B9-B05E-106F99231DC3}" type="presOf" srcId="{EE58C3BB-49BC-462B-9290-390271F718DE}" destId="{A9C77E33-64A3-430C-BAB2-47B0991A9039}" srcOrd="0" destOrd="0" presId="urn:microsoft.com/office/officeart/2008/layout/AlternatingHexagons"/>
     <dgm:cxn modelId="{A018262F-69B4-4266-AE4F-1CCE61D66B86}" type="presOf" srcId="{EE87F12C-0A69-4BA3-847C-4D2060A9B55F}" destId="{A6221CE3-C4AC-468E-830C-92AB8A88C792}" srcOrd="0" destOrd="0" presId="urn:microsoft.com/office/officeart/2008/layout/AlternatingHexagons"/>
-    <dgm:cxn modelId="{7A8EF146-DD08-47EC-9986-BBC2B47385E5}" type="presOf" srcId="{1D2F5AB5-4D7E-4A82-AD29-23EFFCF012CE}" destId="{6D6BA26F-3EAA-4DA0-B33E-3864A83D814F}" srcOrd="0" destOrd="0" presId="urn:microsoft.com/office/officeart/2008/layout/AlternatingHexagons"/>
-    <dgm:cxn modelId="{500975F5-9844-4263-A2B6-70A412A60284}" srcId="{A7C8040A-4875-4FD0-910C-882566E3BA1E}" destId="{AE03FA61-78C6-4588-94A3-401745026354}" srcOrd="3" destOrd="0" parTransId="{9414A8FB-20AF-4209-AF33-9B4AADD13CD0}" sibTransId="{0DFF81D2-49D1-4715-A416-621C20BBC027}"/>
-    <dgm:cxn modelId="{36CE5DF2-2A94-4D1C-A0D3-4BFBB8E77417}" type="presOf" srcId="{A7C8040A-4875-4FD0-910C-882566E3BA1E}" destId="{011387D6-BB34-4CBD-8EDC-2C078AFD2845}" srcOrd="0" destOrd="0" presId="urn:microsoft.com/office/officeart/2008/layout/AlternatingHexagons"/>
-    <dgm:cxn modelId="{E8827A9A-7ED0-4F5C-8EDC-9DA9131CD38F}" type="presOf" srcId="{0DFF81D2-49D1-4715-A416-621C20BBC027}" destId="{83B95B54-5FC6-4271-A0DB-EF5C40F372DA}" srcOrd="0" destOrd="0" presId="urn:microsoft.com/office/officeart/2008/layout/AlternatingHexagons"/>
-    <dgm:cxn modelId="{713C7776-7322-4913-AB52-5FB855592CFE}" type="presOf" srcId="{DB2069BA-2F67-4530-ABE8-7EB05301D798}" destId="{1337574E-5A1E-44CE-B4EB-27275A62F5EB}" srcOrd="0" destOrd="0" presId="urn:microsoft.com/office/officeart/2008/layout/AlternatingHexagons"/>
-    <dgm:cxn modelId="{487EB2C4-7029-47B7-8F96-D8B35C1F27B6}" srcId="{7139D36E-4289-4651-A334-9BA0102B73C4}" destId="{EEB8A017-F8AE-450C-B57F-F7FEF835F0D7}" srcOrd="0" destOrd="0" parTransId="{C1FD5D0B-6C8B-4313-A689-490B2551FC8D}" sibTransId="{3B6A2AD5-D48C-4607-B357-70ABAE3AFAB7}"/>
-    <dgm:cxn modelId="{C1DF765C-2BFE-4308-A704-CB0ACC82AB0E}" type="presOf" srcId="{7139D36E-4289-4651-A334-9BA0102B73C4}" destId="{89CF2B4D-8EE3-4303-BE59-6B1831E67C44}" srcOrd="0" destOrd="0" presId="urn:microsoft.com/office/officeart/2008/layout/AlternatingHexagons"/>
-    <dgm:cxn modelId="{C7E85D0A-039F-49C3-935B-3BD4C7C7AA95}" srcId="{E7E9E394-9504-4980-88EB-66A662B0F111}" destId="{35AEDC73-2413-4B6E-8131-F3CBF22BAE2B}" srcOrd="0" destOrd="0" parTransId="{D2EC7F39-299E-4750-A46D-DD494844257C}" sibTransId="{AB4E8366-BBA6-41AB-9C54-910AC2E0B896}"/>
     <dgm:cxn modelId="{C09AF45A-8506-4B30-ABAC-1D208336D7F7}" srcId="{A7C8040A-4875-4FD0-910C-882566E3BA1E}" destId="{DB2069BA-2F67-4530-ABE8-7EB05301D798}" srcOrd="2" destOrd="0" parTransId="{FF148CC3-0813-4318-93C1-E9523359C7EE}" sibTransId="{EE58C3BB-49BC-462B-9290-390271F718DE}"/>
     <dgm:cxn modelId="{B07756B4-605C-4B18-BC38-0ED307958A28}" srcId="{A7C8040A-4875-4FD0-910C-882566E3BA1E}" destId="{7139D36E-4289-4651-A334-9BA0102B73C4}" srcOrd="1" destOrd="0" parTransId="{EDFFC453-6128-49A3-82CC-2F54AF2CB424}" sibTransId="{1D2F5AB5-4D7E-4A82-AD29-23EFFCF012CE}"/>
+    <dgm:cxn modelId="{FE36B098-FCB1-46DD-9009-047CB51A37FB}" type="presOf" srcId="{E7E9E394-9504-4980-88EB-66A662B0F111}" destId="{3EC5C9B2-C270-46A3-8E5B-330F747B0D88}" srcOrd="0" destOrd="0" presId="urn:microsoft.com/office/officeart/2008/layout/AlternatingHexagons"/>
+    <dgm:cxn modelId="{36CE5DF2-2A94-4D1C-A0D3-4BFBB8E77417}" type="presOf" srcId="{A7C8040A-4875-4FD0-910C-882566E3BA1E}" destId="{011387D6-BB34-4CBD-8EDC-2C078AFD2845}" srcOrd="0" destOrd="0" presId="urn:microsoft.com/office/officeart/2008/layout/AlternatingHexagons"/>
+    <dgm:cxn modelId="{713C7776-7322-4913-AB52-5FB855592CFE}" type="presOf" srcId="{DB2069BA-2F67-4530-ABE8-7EB05301D798}" destId="{1337574E-5A1E-44CE-B4EB-27275A62F5EB}" srcOrd="0" destOrd="0" presId="urn:microsoft.com/office/officeart/2008/layout/AlternatingHexagons"/>
+    <dgm:cxn modelId="{7A8EF146-DD08-47EC-9986-BBC2B47385E5}" type="presOf" srcId="{1D2F5AB5-4D7E-4A82-AD29-23EFFCF012CE}" destId="{6D6BA26F-3EAA-4DA0-B33E-3864A83D814F}" srcOrd="0" destOrd="0" presId="urn:microsoft.com/office/officeart/2008/layout/AlternatingHexagons"/>
+    <dgm:cxn modelId="{FADAD0A2-D3FB-4606-993F-287802893B13}" type="presOf" srcId="{EEB8A017-F8AE-450C-B57F-F7FEF835F0D7}" destId="{49CF29B0-A7B7-4FC7-9215-2CCEF1475892}" srcOrd="0" destOrd="0" presId="urn:microsoft.com/office/officeart/2008/layout/AlternatingHexagons"/>
+    <dgm:cxn modelId="{487EB2C4-7029-47B7-8F96-D8B35C1F27B6}" srcId="{7139D36E-4289-4651-A334-9BA0102B73C4}" destId="{EEB8A017-F8AE-450C-B57F-F7FEF835F0D7}" srcOrd="0" destOrd="0" parTransId="{C1FD5D0B-6C8B-4313-A689-490B2551FC8D}" sibTransId="{3B6A2AD5-D48C-4607-B357-70ABAE3AFAB7}"/>
     <dgm:cxn modelId="{B8F4FBDF-576A-4030-96C4-674098392540}" type="presOf" srcId="{35AEDC73-2413-4B6E-8131-F3CBF22BAE2B}" destId="{AD6F1B2D-9BAB-4A86-A520-F9BBFB5675B4}" srcOrd="0" destOrd="0" presId="urn:microsoft.com/office/officeart/2008/layout/AlternatingHexagons"/>
+    <dgm:cxn modelId="{C7E85D0A-039F-49C3-935B-3BD4C7C7AA95}" srcId="{E7E9E394-9504-4980-88EB-66A662B0F111}" destId="{35AEDC73-2413-4B6E-8131-F3CBF22BAE2B}" srcOrd="0" destOrd="0" parTransId="{D2EC7F39-299E-4750-A46D-DD494844257C}" sibTransId="{AB4E8366-BBA6-41AB-9C54-910AC2E0B896}"/>
+    <dgm:cxn modelId="{C1DF765C-2BFE-4308-A704-CB0ACC82AB0E}" type="presOf" srcId="{7139D36E-4289-4651-A334-9BA0102B73C4}" destId="{89CF2B4D-8EE3-4303-BE59-6B1831E67C44}" srcOrd="0" destOrd="0" presId="urn:microsoft.com/office/officeart/2008/layout/AlternatingHexagons"/>
+    <dgm:cxn modelId="{733FA6C8-7414-4A34-9DB6-5D4E79E4E4C8}" srcId="{DB2069BA-2F67-4530-ABE8-7EB05301D798}" destId="{4615948C-F8C4-4700-86DF-761FFB42B137}" srcOrd="0" destOrd="0" parTransId="{BB87FBB1-71ED-46CE-BAA6-F0272F82EE1A}" sibTransId="{7AFCA748-AD91-4478-A8C5-3BB0A148D69A}"/>
     <dgm:cxn modelId="{E5990947-AB6D-43A3-9ABF-7D9994929583}" type="presOf" srcId="{AE03FA61-78C6-4588-94A3-401745026354}" destId="{07FDE53A-B6B1-455C-8090-344304EEB02F}" srcOrd="0" destOrd="0" presId="urn:microsoft.com/office/officeart/2008/layout/AlternatingHexagons"/>
-    <dgm:cxn modelId="{9025DA99-1180-434F-8FCC-379DC70E5572}" srcId="{A7C8040A-4875-4FD0-910C-882566E3BA1E}" destId="{E7E9E394-9504-4980-88EB-66A662B0F111}" srcOrd="0" destOrd="0" parTransId="{BAF9A357-7B39-4905-BC2A-718E27411EDA}" sibTransId="{EE87F12C-0A69-4BA3-847C-4D2060A9B55F}"/>
-    <dgm:cxn modelId="{FADAD0A2-D3FB-4606-993F-287802893B13}" type="presOf" srcId="{EEB8A017-F8AE-450C-B57F-F7FEF835F0D7}" destId="{49CF29B0-A7B7-4FC7-9215-2CCEF1475892}" srcOrd="0" destOrd="0" presId="urn:microsoft.com/office/officeart/2008/layout/AlternatingHexagons"/>
-    <dgm:cxn modelId="{733FA6C8-7414-4A34-9DB6-5D4E79E4E4C8}" srcId="{DB2069BA-2F67-4530-ABE8-7EB05301D798}" destId="{4615948C-F8C4-4700-86DF-761FFB42B137}" srcOrd="0" destOrd="0" parTransId="{BB87FBB1-71ED-46CE-BAA6-F0272F82EE1A}" sibTransId="{7AFCA748-AD91-4478-A8C5-3BB0A148D69A}"/>
     <dgm:cxn modelId="{70489E5E-8FC1-4D38-981B-CA9D887AD55A}" type="presParOf" srcId="{011387D6-BB34-4CBD-8EDC-2C078AFD2845}" destId="{4324D937-436E-4B5D-A3FD-A55361CF3EC7}" srcOrd="0" destOrd="0" presId="urn:microsoft.com/office/officeart/2008/layout/AlternatingHexagons"/>
     <dgm:cxn modelId="{887EB019-9913-43CB-BA8C-1040A65ECB3C}" type="presParOf" srcId="{4324D937-436E-4B5D-A3FD-A55361CF3EC7}" destId="{3EC5C9B2-C270-46A3-8E5B-330F747B0D88}" srcOrd="0" destOrd="0" presId="urn:microsoft.com/office/officeart/2008/layout/AlternatingHexagons"/>
     <dgm:cxn modelId="{3D64E573-A5A5-4556-8A8F-102C869E7156}" type="presParOf" srcId="{4324D937-436E-4B5D-A3FD-A55361CF3EC7}" destId="{AD6F1B2D-9BAB-4A86-A520-F9BBFB5675B4}" srcOrd="1" destOrd="0" presId="urn:microsoft.com/office/officeart/2008/layout/AlternatingHexagons"/>
@@ -4092,6 +4469,61 @@
       <dsp:cNvGrpSpPr/>
     </dsp:nvGrpSpPr>
     <dsp:grpSpPr/>
+    <dsp:sp modelId="{1249E27C-B074-4DEE-A51C-C1F2485C074D}">
+      <dsp:nvSpPr>
+        <dsp:cNvPr id="0" name=""/>
+        <dsp:cNvSpPr/>
+      </dsp:nvSpPr>
+      <dsp:spPr>
+        <a:xfrm>
+          <a:off x="7257926" y="2499192"/>
+          <a:ext cx="91440" cy="465382"/>
+        </a:xfrm>
+        <a:custGeom>
+          <a:avLst/>
+          <a:gdLst/>
+          <a:ahLst/>
+          <a:cxnLst/>
+          <a:rect l="0" t="0" r="0" b="0"/>
+          <a:pathLst>
+            <a:path>
+              <a:moveTo>
+                <a:pt x="45720" y="0"/>
+              </a:moveTo>
+              <a:lnTo>
+                <a:pt x="45720" y="465382"/>
+              </a:lnTo>
+            </a:path>
+          </a:pathLst>
+        </a:custGeom>
+        <a:noFill/>
+        <a:ln w="25400" cap="flat" cmpd="sng" algn="ctr">
+          <a:solidFill>
+            <a:schemeClr val="accent1">
+              <a:shade val="80000"/>
+              <a:hueOff val="0"/>
+              <a:satOff val="0"/>
+              <a:lumOff val="0"/>
+              <a:alphaOff val="0"/>
+            </a:schemeClr>
+          </a:solidFill>
+          <a:prstDash val="solid"/>
+        </a:ln>
+        <a:effectLst/>
+      </dsp:spPr>
+      <dsp:style>
+        <a:lnRef idx="2">
+          <a:scrgbClr r="0" g="0" b="0"/>
+        </a:lnRef>
+        <a:fillRef idx="0">
+          <a:scrgbClr r="0" g="0" b="0"/>
+        </a:fillRef>
+        <a:effectRef idx="0">
+          <a:scrgbClr r="0" g="0" b="0"/>
+        </a:effectRef>
+        <a:fontRef idx="minor"/>
+      </dsp:style>
+    </dsp:sp>
     <dsp:sp modelId="{A540D9FD-1B12-42A2-AA38-93A542AF12D5}">
       <dsp:nvSpPr>
         <dsp:cNvPr id="0" name=""/>
@@ -4099,8 +4531,8 @@
       </dsp:nvSpPr>
       <dsp:spPr>
         <a:xfrm>
-          <a:off x="4138759" y="1665081"/>
-          <a:ext cx="2887387" cy="602388"/>
+          <a:off x="5072956" y="1017701"/>
+          <a:ext cx="2230689" cy="465382"/>
         </a:xfrm>
         <a:custGeom>
           <a:avLst/>
@@ -4114,13 +4546,13 @@
                 <a:pt x="0" y="0"/>
               </a:moveTo>
               <a:lnTo>
-                <a:pt x="0" y="410510"/>
+                <a:pt x="0" y="317144"/>
               </a:lnTo>
               <a:lnTo>
-                <a:pt x="2887387" y="410510"/>
+                <a:pt x="2230689" y="317144"/>
               </a:lnTo>
               <a:lnTo>
-                <a:pt x="2887387" y="602388"/>
+                <a:pt x="2230689" y="465382"/>
               </a:lnTo>
             </a:path>
           </a:pathLst>
@@ -4160,8 +4592,8 @@
       </dsp:nvSpPr>
       <dsp:spPr>
         <a:xfrm>
-          <a:off x="4064404" y="1665081"/>
-          <a:ext cx="91440" cy="602388"/>
+          <a:off x="5005114" y="1017701"/>
+          <a:ext cx="91440" cy="465382"/>
         </a:xfrm>
         <a:custGeom>
           <a:avLst/>
@@ -4172,16 +4604,16 @@
           <a:pathLst>
             <a:path>
               <a:moveTo>
-                <a:pt x="74355" y="0"/>
+                <a:pt x="67842" y="0"/>
               </a:moveTo>
               <a:lnTo>
-                <a:pt x="74355" y="410510"/>
+                <a:pt x="67842" y="317144"/>
               </a:lnTo>
               <a:lnTo>
-                <a:pt x="45720" y="410510"/>
+                <a:pt x="45720" y="317144"/>
               </a:lnTo>
               <a:lnTo>
-                <a:pt x="45720" y="602388"/>
+                <a:pt x="45720" y="465382"/>
               </a:lnTo>
             </a:path>
           </a:pathLst>
@@ -4214,15 +4646,15 @@
         <a:fontRef idx="minor"/>
       </dsp:style>
     </dsp:sp>
-    <dsp:sp modelId="{60EDBC92-32A1-49F9-94E9-7483DDE7E40B}">
+    <dsp:sp modelId="{536065B2-22FE-409F-8EAF-861CC4107590}">
       <dsp:nvSpPr>
         <dsp:cNvPr id="0" name=""/>
         <dsp:cNvSpPr/>
       </dsp:nvSpPr>
       <dsp:spPr>
         <a:xfrm>
-          <a:off x="1222736" y="1665081"/>
-          <a:ext cx="2916022" cy="602388"/>
+          <a:off x="2820144" y="2499192"/>
+          <a:ext cx="1955764" cy="465382"/>
         </a:xfrm>
         <a:custGeom>
           <a:avLst/>
@@ -4233,16 +4665,193 @@
           <a:pathLst>
             <a:path>
               <a:moveTo>
-                <a:pt x="2916022" y="0"/>
+                <a:pt x="0" y="0"/>
               </a:moveTo>
               <a:lnTo>
-                <a:pt x="2916022" y="410510"/>
+                <a:pt x="0" y="317144"/>
               </a:lnTo>
               <a:lnTo>
-                <a:pt x="0" y="410510"/>
+                <a:pt x="1955764" y="317144"/>
               </a:lnTo>
               <a:lnTo>
-                <a:pt x="0" y="602388"/>
+                <a:pt x="1955764" y="465382"/>
+              </a:lnTo>
+            </a:path>
+          </a:pathLst>
+        </a:custGeom>
+        <a:noFill/>
+        <a:ln w="25400" cap="flat" cmpd="sng" algn="ctr">
+          <a:solidFill>
+            <a:schemeClr val="accent1">
+              <a:shade val="80000"/>
+              <a:hueOff val="0"/>
+              <a:satOff val="0"/>
+              <a:lumOff val="0"/>
+              <a:alphaOff val="0"/>
+            </a:schemeClr>
+          </a:solidFill>
+          <a:prstDash val="solid"/>
+        </a:ln>
+        <a:effectLst/>
+      </dsp:spPr>
+      <dsp:style>
+        <a:lnRef idx="2">
+          <a:scrgbClr r="0" g="0" b="0"/>
+        </a:lnRef>
+        <a:fillRef idx="0">
+          <a:scrgbClr r="0" g="0" b="0"/>
+        </a:fillRef>
+        <a:effectRef idx="0">
+          <a:scrgbClr r="0" g="0" b="0"/>
+        </a:effectRef>
+        <a:fontRef idx="minor"/>
+      </dsp:style>
+    </dsp:sp>
+    <dsp:sp modelId="{F8B48F89-18CB-4559-9735-E107366A319D}">
+      <dsp:nvSpPr>
+        <dsp:cNvPr id="0" name=""/>
+        <dsp:cNvSpPr/>
+      </dsp:nvSpPr>
+      <dsp:spPr>
+        <a:xfrm>
+          <a:off x="2774424" y="2499192"/>
+          <a:ext cx="91440" cy="465382"/>
+        </a:xfrm>
+        <a:custGeom>
+          <a:avLst/>
+          <a:gdLst/>
+          <a:ahLst/>
+          <a:cxnLst/>
+          <a:rect l="0" t="0" r="0" b="0"/>
+          <a:pathLst>
+            <a:path>
+              <a:moveTo>
+                <a:pt x="45720" y="0"/>
+              </a:moveTo>
+              <a:lnTo>
+                <a:pt x="45720" y="465382"/>
+              </a:lnTo>
+            </a:path>
+          </a:pathLst>
+        </a:custGeom>
+        <a:noFill/>
+        <a:ln w="25400" cap="flat" cmpd="sng" algn="ctr">
+          <a:solidFill>
+            <a:schemeClr val="accent1">
+              <a:shade val="80000"/>
+              <a:hueOff val="0"/>
+              <a:satOff val="0"/>
+              <a:lumOff val="0"/>
+              <a:alphaOff val="0"/>
+            </a:schemeClr>
+          </a:solidFill>
+          <a:prstDash val="solid"/>
+        </a:ln>
+        <a:effectLst/>
+      </dsp:spPr>
+      <dsp:style>
+        <a:lnRef idx="2">
+          <a:scrgbClr r="0" g="0" b="0"/>
+        </a:lnRef>
+        <a:fillRef idx="0">
+          <a:scrgbClr r="0" g="0" b="0"/>
+        </a:fillRef>
+        <a:effectRef idx="0">
+          <a:scrgbClr r="0" g="0" b="0"/>
+        </a:effectRef>
+        <a:fontRef idx="minor"/>
+      </dsp:style>
+    </dsp:sp>
+    <dsp:sp modelId="{4144F264-8FB6-4B71-9657-FC3DAC0E387B}">
+      <dsp:nvSpPr>
+        <dsp:cNvPr id="0" name=""/>
+        <dsp:cNvSpPr/>
+      </dsp:nvSpPr>
+      <dsp:spPr>
+        <a:xfrm>
+          <a:off x="864380" y="2499192"/>
+          <a:ext cx="1955764" cy="465382"/>
+        </a:xfrm>
+        <a:custGeom>
+          <a:avLst/>
+          <a:gdLst/>
+          <a:ahLst/>
+          <a:cxnLst/>
+          <a:rect l="0" t="0" r="0" b="0"/>
+          <a:pathLst>
+            <a:path>
+              <a:moveTo>
+                <a:pt x="1955764" y="0"/>
+              </a:moveTo>
+              <a:lnTo>
+                <a:pt x="1955764" y="317144"/>
+              </a:lnTo>
+              <a:lnTo>
+                <a:pt x="0" y="317144"/>
+              </a:lnTo>
+              <a:lnTo>
+                <a:pt x="0" y="465382"/>
+              </a:lnTo>
+            </a:path>
+          </a:pathLst>
+        </a:custGeom>
+        <a:noFill/>
+        <a:ln w="25400" cap="flat" cmpd="sng" algn="ctr">
+          <a:solidFill>
+            <a:schemeClr val="accent1">
+              <a:shade val="80000"/>
+              <a:hueOff val="0"/>
+              <a:satOff val="0"/>
+              <a:lumOff val="0"/>
+              <a:alphaOff val="0"/>
+            </a:schemeClr>
+          </a:solidFill>
+          <a:prstDash val="solid"/>
+        </a:ln>
+        <a:effectLst/>
+      </dsp:spPr>
+      <dsp:style>
+        <a:lnRef idx="2">
+          <a:scrgbClr r="0" g="0" b="0"/>
+        </a:lnRef>
+        <a:fillRef idx="0">
+          <a:scrgbClr r="0" g="0" b="0"/>
+        </a:fillRef>
+        <a:effectRef idx="0">
+          <a:scrgbClr r="0" g="0" b="0"/>
+        </a:effectRef>
+        <a:fontRef idx="minor"/>
+      </dsp:style>
+    </dsp:sp>
+    <dsp:sp modelId="{60EDBC92-32A1-49F9-94E9-7483DDE7E40B}">
+      <dsp:nvSpPr>
+        <dsp:cNvPr id="0" name=""/>
+        <dsp:cNvSpPr/>
+      </dsp:nvSpPr>
+      <dsp:spPr>
+        <a:xfrm>
+          <a:off x="2820144" y="1017701"/>
+          <a:ext cx="2252811" cy="465382"/>
+        </a:xfrm>
+        <a:custGeom>
+          <a:avLst/>
+          <a:gdLst/>
+          <a:ahLst/>
+          <a:cxnLst/>
+          <a:rect l="0" t="0" r="0" b="0"/>
+          <a:pathLst>
+            <a:path>
+              <a:moveTo>
+                <a:pt x="2252811" y="0"/>
+              </a:moveTo>
+              <a:lnTo>
+                <a:pt x="2252811" y="317144"/>
+              </a:lnTo>
+              <a:lnTo>
+                <a:pt x="0" y="317144"/>
+              </a:lnTo>
+              <a:lnTo>
+                <a:pt x="0" y="465382"/>
               </a:lnTo>
             </a:path>
           </a:pathLst>
@@ -4282,8 +4891,8 @@
       </dsp:nvSpPr>
       <dsp:spPr>
         <a:xfrm>
-          <a:off x="2665635" y="349838"/>
-          <a:ext cx="2946248" cy="1315243"/>
+          <a:off x="3934875" y="1593"/>
+          <a:ext cx="2276162" cy="1016108"/>
         </a:xfrm>
         <a:prstGeom prst="roundRect">
           <a:avLst>
@@ -4333,8 +4942,8 @@
       </dsp:nvSpPr>
       <dsp:spPr>
         <a:xfrm>
-          <a:off x="2895773" y="568470"/>
-          <a:ext cx="2946248" cy="1315243"/>
+          <a:off x="4112672" y="170499"/>
+          <a:ext cx="2276162" cy="1016108"/>
         </a:xfrm>
         <a:prstGeom prst="roundRect">
           <a:avLst>
@@ -4417,8 +5026,8 @@
         </a:p>
       </dsp:txBody>
       <dsp:txXfrm>
-        <a:off x="2934295" y="606992"/>
-        <a:ext cx="2869204" cy="1238199"/>
+        <a:off x="4142433" y="200260"/>
+        <a:ext cx="2216640" cy="956586"/>
       </dsp:txXfrm>
     </dsp:sp>
     <dsp:sp modelId="{55A5E781-0B7B-412D-A76A-DE507C15BC6C}">
@@ -4428,8 +5037,8 @@
       </dsp:nvSpPr>
       <dsp:spPr>
         <a:xfrm>
-          <a:off x="6271" y="2267470"/>
-          <a:ext cx="2432930" cy="1315243"/>
+          <a:off x="1880348" y="1483084"/>
+          <a:ext cx="1879592" cy="1016108"/>
         </a:xfrm>
         <a:prstGeom prst="roundRect">
           <a:avLst>
@@ -4479,8 +5088,8 @@
       </dsp:nvSpPr>
       <dsp:spPr>
         <a:xfrm>
-          <a:off x="236409" y="2486102"/>
-          <a:ext cx="2432930" cy="1315243"/>
+          <a:off x="2058145" y="1651991"/>
+          <a:ext cx="1879592" cy="1016108"/>
         </a:xfrm>
         <a:prstGeom prst="roundRect">
           <a:avLst>
@@ -4563,8 +5172,454 @@
         </a:p>
       </dsp:txBody>
       <dsp:txXfrm>
-        <a:off x="274931" y="2524624"/>
-        <a:ext cx="2355886" cy="1238199"/>
+        <a:off x="2087906" y="1681752"/>
+        <a:ext cx="1820070" cy="956586"/>
+      </dsp:txXfrm>
+    </dsp:sp>
+    <dsp:sp modelId="{7C128272-073D-4FB3-9A9A-740C16F04C5A}">
+      <dsp:nvSpPr>
+        <dsp:cNvPr id="0" name=""/>
+        <dsp:cNvSpPr/>
+      </dsp:nvSpPr>
+      <dsp:spPr>
+        <a:xfrm>
+          <a:off x="64295" y="2964575"/>
+          <a:ext cx="1600170" cy="1016108"/>
+        </a:xfrm>
+        <a:prstGeom prst="roundRect">
+          <a:avLst>
+            <a:gd name="adj" fmla="val 10000"/>
+          </a:avLst>
+        </a:prstGeom>
+        <a:solidFill>
+          <a:schemeClr val="accent1">
+            <a:hueOff val="0"/>
+            <a:satOff val="0"/>
+            <a:lumOff val="0"/>
+            <a:alphaOff val="0"/>
+          </a:schemeClr>
+        </a:solidFill>
+        <a:ln w="25400" cap="flat" cmpd="sng" algn="ctr">
+          <a:solidFill>
+            <a:schemeClr val="lt1">
+              <a:hueOff val="0"/>
+              <a:satOff val="0"/>
+              <a:lumOff val="0"/>
+              <a:alphaOff val="0"/>
+            </a:schemeClr>
+          </a:solidFill>
+          <a:prstDash val="solid"/>
+        </a:ln>
+        <a:effectLst/>
+      </dsp:spPr>
+      <dsp:style>
+        <a:lnRef idx="2">
+          <a:scrgbClr r="0" g="0" b="0"/>
+        </a:lnRef>
+        <a:fillRef idx="1">
+          <a:scrgbClr r="0" g="0" b="0"/>
+        </a:fillRef>
+        <a:effectRef idx="0">
+          <a:scrgbClr r="0" g="0" b="0"/>
+        </a:effectRef>
+        <a:fontRef idx="minor">
+          <a:schemeClr val="lt1"/>
+        </a:fontRef>
+      </dsp:style>
+    </dsp:sp>
+    <dsp:sp modelId="{818572EA-FC07-428B-B9B8-080DD1FF6294}">
+      <dsp:nvSpPr>
+        <dsp:cNvPr id="0" name=""/>
+        <dsp:cNvSpPr/>
+      </dsp:nvSpPr>
+      <dsp:spPr>
+        <a:xfrm>
+          <a:off x="242092" y="3133482"/>
+          <a:ext cx="1600170" cy="1016108"/>
+        </a:xfrm>
+        <a:prstGeom prst="roundRect">
+          <a:avLst>
+            <a:gd name="adj" fmla="val 10000"/>
+          </a:avLst>
+        </a:prstGeom>
+        <a:solidFill>
+          <a:schemeClr val="lt1">
+            <a:alpha val="90000"/>
+            <a:hueOff val="0"/>
+            <a:satOff val="0"/>
+            <a:lumOff val="0"/>
+            <a:alphaOff val="0"/>
+          </a:schemeClr>
+        </a:solidFill>
+        <a:ln w="25400" cap="flat" cmpd="sng" algn="ctr">
+          <a:solidFill>
+            <a:schemeClr val="accent1">
+              <a:hueOff val="0"/>
+              <a:satOff val="0"/>
+              <a:lumOff val="0"/>
+              <a:alphaOff val="0"/>
+            </a:schemeClr>
+          </a:solidFill>
+          <a:prstDash val="solid"/>
+        </a:ln>
+        <a:effectLst/>
+      </dsp:spPr>
+      <dsp:style>
+        <a:lnRef idx="2">
+          <a:scrgbClr r="0" g="0" b="0"/>
+        </a:lnRef>
+        <a:fillRef idx="1">
+          <a:scrgbClr r="0" g="0" b="0"/>
+        </a:fillRef>
+        <a:effectRef idx="0">
+          <a:scrgbClr r="0" g="0" b="0"/>
+        </a:effectRef>
+        <a:fontRef idx="minor"/>
+      </dsp:style>
+      <dsp:txBody>
+        <a:bodyPr spcFirstLastPara="0" vert="horz" wrap="square" lIns="68580" tIns="68580" rIns="68580" bIns="68580" numCol="1" spcCol="1270" anchor="ctr" anchorCtr="0">
+          <a:noAutofit/>
+        </a:bodyPr>
+        <a:lstStyle/>
+        <a:p>
+          <a:pPr lvl="0" algn="ctr" defTabSz="800100">
+            <a:lnSpc>
+              <a:spcPct val="90000"/>
+            </a:lnSpc>
+            <a:spcBef>
+              <a:spcPct val="0"/>
+            </a:spcBef>
+            <a:spcAft>
+              <a:spcPct val="35000"/>
+            </a:spcAft>
+          </a:pPr>
+          <a:r>
+            <a:rPr lang="en-GB" sz="1800" b="1" kern="1200" dirty="0" smtClean="0"/>
+            <a:t>Vinay</a:t>
+          </a:r>
+        </a:p>
+        <a:p>
+          <a:pPr lvl="0" algn="ctr" defTabSz="800100">
+            <a:lnSpc>
+              <a:spcPct val="90000"/>
+            </a:lnSpc>
+            <a:spcBef>
+              <a:spcPct val="0"/>
+            </a:spcBef>
+            <a:spcAft>
+              <a:spcPct val="35000"/>
+            </a:spcAft>
+          </a:pPr>
+          <a:r>
+            <a:rPr lang="en-GB" sz="1800" kern="1200" dirty="0" smtClean="0"/>
+            <a:t>(</a:t>
+          </a:r>
+          <a:r>
+            <a:rPr lang="en-GB" sz="1800" kern="1200" dirty="0" smtClean="0"/>
+            <a:t>Helpdesk Support)</a:t>
+          </a:r>
+          <a:endParaRPr lang="en-GB" sz="1800" kern="1200" dirty="0"/>
+        </a:p>
+      </dsp:txBody>
+      <dsp:txXfrm>
+        <a:off x="271853" y="3163243"/>
+        <a:ext cx="1540648" cy="956586"/>
+      </dsp:txXfrm>
+    </dsp:sp>
+    <dsp:sp modelId="{8F05C8A6-EEFB-4514-AF7C-E8E88B972781}">
+      <dsp:nvSpPr>
+        <dsp:cNvPr id="0" name=""/>
+        <dsp:cNvSpPr/>
+      </dsp:nvSpPr>
+      <dsp:spPr>
+        <a:xfrm>
+          <a:off x="2020059" y="2964575"/>
+          <a:ext cx="1600170" cy="1016108"/>
+        </a:xfrm>
+        <a:prstGeom prst="roundRect">
+          <a:avLst>
+            <a:gd name="adj" fmla="val 10000"/>
+          </a:avLst>
+        </a:prstGeom>
+        <a:solidFill>
+          <a:schemeClr val="accent1">
+            <a:hueOff val="0"/>
+            <a:satOff val="0"/>
+            <a:lumOff val="0"/>
+            <a:alphaOff val="0"/>
+          </a:schemeClr>
+        </a:solidFill>
+        <a:ln w="25400" cap="flat" cmpd="sng" algn="ctr">
+          <a:solidFill>
+            <a:schemeClr val="lt1">
+              <a:hueOff val="0"/>
+              <a:satOff val="0"/>
+              <a:lumOff val="0"/>
+              <a:alphaOff val="0"/>
+            </a:schemeClr>
+          </a:solidFill>
+          <a:prstDash val="solid"/>
+        </a:ln>
+        <a:effectLst/>
+      </dsp:spPr>
+      <dsp:style>
+        <a:lnRef idx="2">
+          <a:scrgbClr r="0" g="0" b="0"/>
+        </a:lnRef>
+        <a:fillRef idx="1">
+          <a:scrgbClr r="0" g="0" b="0"/>
+        </a:fillRef>
+        <a:effectRef idx="0">
+          <a:scrgbClr r="0" g="0" b="0"/>
+        </a:effectRef>
+        <a:fontRef idx="minor">
+          <a:schemeClr val="lt1"/>
+        </a:fontRef>
+      </dsp:style>
+    </dsp:sp>
+    <dsp:sp modelId="{D4692811-3C60-47C3-BA41-533DC48F95E9}">
+      <dsp:nvSpPr>
+        <dsp:cNvPr id="0" name=""/>
+        <dsp:cNvSpPr/>
+      </dsp:nvSpPr>
+      <dsp:spPr>
+        <a:xfrm>
+          <a:off x="2197856" y="3133482"/>
+          <a:ext cx="1600170" cy="1016108"/>
+        </a:xfrm>
+        <a:prstGeom prst="roundRect">
+          <a:avLst>
+            <a:gd name="adj" fmla="val 10000"/>
+          </a:avLst>
+        </a:prstGeom>
+        <a:solidFill>
+          <a:schemeClr val="lt1">
+            <a:alpha val="90000"/>
+            <a:hueOff val="0"/>
+            <a:satOff val="0"/>
+            <a:lumOff val="0"/>
+            <a:alphaOff val="0"/>
+          </a:schemeClr>
+        </a:solidFill>
+        <a:ln w="25400" cap="flat" cmpd="sng" algn="ctr">
+          <a:solidFill>
+            <a:schemeClr val="accent1">
+              <a:hueOff val="0"/>
+              <a:satOff val="0"/>
+              <a:lumOff val="0"/>
+              <a:alphaOff val="0"/>
+            </a:schemeClr>
+          </a:solidFill>
+          <a:prstDash val="solid"/>
+        </a:ln>
+        <a:effectLst/>
+      </dsp:spPr>
+      <dsp:style>
+        <a:lnRef idx="2">
+          <a:scrgbClr r="0" g="0" b="0"/>
+        </a:lnRef>
+        <a:fillRef idx="1">
+          <a:scrgbClr r="0" g="0" b="0"/>
+        </a:fillRef>
+        <a:effectRef idx="0">
+          <a:scrgbClr r="0" g="0" b="0"/>
+        </a:effectRef>
+        <a:fontRef idx="minor"/>
+      </dsp:style>
+      <dsp:txBody>
+        <a:bodyPr spcFirstLastPara="0" vert="horz" wrap="square" lIns="68580" tIns="68580" rIns="68580" bIns="68580" numCol="1" spcCol="1270" anchor="ctr" anchorCtr="0">
+          <a:noAutofit/>
+        </a:bodyPr>
+        <a:lstStyle/>
+        <a:p>
+          <a:pPr lvl="0" algn="ctr" defTabSz="800100">
+            <a:lnSpc>
+              <a:spcPct val="90000"/>
+            </a:lnSpc>
+            <a:spcBef>
+              <a:spcPct val="0"/>
+            </a:spcBef>
+            <a:spcAft>
+              <a:spcPct val="35000"/>
+            </a:spcAft>
+          </a:pPr>
+          <a:r>
+            <a:rPr lang="en-GB" sz="1800" b="1" kern="1200" dirty="0" smtClean="0"/>
+            <a:t>Bhupender</a:t>
+          </a:r>
+        </a:p>
+        <a:p>
+          <a:pPr lvl="0" algn="ctr" defTabSz="800100">
+            <a:lnSpc>
+              <a:spcPct val="90000"/>
+            </a:lnSpc>
+            <a:spcBef>
+              <a:spcPct val="0"/>
+            </a:spcBef>
+            <a:spcAft>
+              <a:spcPct val="35000"/>
+            </a:spcAft>
+          </a:pPr>
+          <a:r>
+            <a:rPr lang="en-GB" sz="1800" kern="1200" dirty="0" smtClean="0"/>
+            <a:t>(E-mail Support)</a:t>
+          </a:r>
+          <a:endParaRPr lang="en-GB" sz="1800" kern="1200" dirty="0"/>
+        </a:p>
+      </dsp:txBody>
+      <dsp:txXfrm>
+        <a:off x="2227617" y="3163243"/>
+        <a:ext cx="1540648" cy="956586"/>
+      </dsp:txXfrm>
+    </dsp:sp>
+    <dsp:sp modelId="{0223F492-C95A-4803-AEF4-13AB54592055}">
+      <dsp:nvSpPr>
+        <dsp:cNvPr id="0" name=""/>
+        <dsp:cNvSpPr/>
+      </dsp:nvSpPr>
+      <dsp:spPr>
+        <a:xfrm>
+          <a:off x="3975823" y="2964575"/>
+          <a:ext cx="1600170" cy="1016108"/>
+        </a:xfrm>
+        <a:prstGeom prst="roundRect">
+          <a:avLst>
+            <a:gd name="adj" fmla="val 10000"/>
+          </a:avLst>
+        </a:prstGeom>
+        <a:solidFill>
+          <a:schemeClr val="accent1">
+            <a:hueOff val="0"/>
+            <a:satOff val="0"/>
+            <a:lumOff val="0"/>
+            <a:alphaOff val="0"/>
+          </a:schemeClr>
+        </a:solidFill>
+        <a:ln w="25400" cap="flat" cmpd="sng" algn="ctr">
+          <a:solidFill>
+            <a:schemeClr val="lt1">
+              <a:hueOff val="0"/>
+              <a:satOff val="0"/>
+              <a:lumOff val="0"/>
+              <a:alphaOff val="0"/>
+            </a:schemeClr>
+          </a:solidFill>
+          <a:prstDash val="solid"/>
+        </a:ln>
+        <a:effectLst/>
+      </dsp:spPr>
+      <dsp:style>
+        <a:lnRef idx="2">
+          <a:scrgbClr r="0" g="0" b="0"/>
+        </a:lnRef>
+        <a:fillRef idx="1">
+          <a:scrgbClr r="0" g="0" b="0"/>
+        </a:fillRef>
+        <a:effectRef idx="0">
+          <a:scrgbClr r="0" g="0" b="0"/>
+        </a:effectRef>
+        <a:fontRef idx="minor">
+          <a:schemeClr val="lt1"/>
+        </a:fontRef>
+      </dsp:style>
+    </dsp:sp>
+    <dsp:sp modelId="{B73D9AFD-9D06-4B08-B984-9F6A707D953F}">
+      <dsp:nvSpPr>
+        <dsp:cNvPr id="0" name=""/>
+        <dsp:cNvSpPr/>
+      </dsp:nvSpPr>
+      <dsp:spPr>
+        <a:xfrm>
+          <a:off x="4153620" y="3133482"/>
+          <a:ext cx="1600170" cy="1016108"/>
+        </a:xfrm>
+        <a:prstGeom prst="roundRect">
+          <a:avLst>
+            <a:gd name="adj" fmla="val 10000"/>
+          </a:avLst>
+        </a:prstGeom>
+        <a:solidFill>
+          <a:schemeClr val="lt1">
+            <a:alpha val="90000"/>
+            <a:hueOff val="0"/>
+            <a:satOff val="0"/>
+            <a:lumOff val="0"/>
+            <a:alphaOff val="0"/>
+          </a:schemeClr>
+        </a:solidFill>
+        <a:ln w="25400" cap="flat" cmpd="sng" algn="ctr">
+          <a:solidFill>
+            <a:schemeClr val="accent1">
+              <a:hueOff val="0"/>
+              <a:satOff val="0"/>
+              <a:lumOff val="0"/>
+              <a:alphaOff val="0"/>
+            </a:schemeClr>
+          </a:solidFill>
+          <a:prstDash val="solid"/>
+        </a:ln>
+        <a:effectLst/>
+      </dsp:spPr>
+      <dsp:style>
+        <a:lnRef idx="2">
+          <a:scrgbClr r="0" g="0" b="0"/>
+        </a:lnRef>
+        <a:fillRef idx="1">
+          <a:scrgbClr r="0" g="0" b="0"/>
+        </a:fillRef>
+        <a:effectRef idx="0">
+          <a:scrgbClr r="0" g="0" b="0"/>
+        </a:effectRef>
+        <a:fontRef idx="minor"/>
+      </dsp:style>
+      <dsp:txBody>
+        <a:bodyPr spcFirstLastPara="0" vert="horz" wrap="square" lIns="68580" tIns="68580" rIns="68580" bIns="68580" numCol="1" spcCol="1270" anchor="ctr" anchorCtr="0">
+          <a:noAutofit/>
+        </a:bodyPr>
+        <a:lstStyle/>
+        <a:p>
+          <a:pPr lvl="0" algn="ctr" defTabSz="800100">
+            <a:lnSpc>
+              <a:spcPct val="90000"/>
+            </a:lnSpc>
+            <a:spcBef>
+              <a:spcPct val="0"/>
+            </a:spcBef>
+            <a:spcAft>
+              <a:spcPct val="35000"/>
+            </a:spcAft>
+          </a:pPr>
+          <a:r>
+            <a:rPr lang="en-GB" sz="1800" b="1" kern="1200" dirty="0" smtClean="0"/>
+            <a:t>Praveen</a:t>
+          </a:r>
+        </a:p>
+        <a:p>
+          <a:pPr lvl="0" algn="ctr" defTabSz="800100">
+            <a:lnSpc>
+              <a:spcPct val="90000"/>
+            </a:lnSpc>
+            <a:spcBef>
+              <a:spcPct val="0"/>
+            </a:spcBef>
+            <a:spcAft>
+              <a:spcPct val="35000"/>
+            </a:spcAft>
+          </a:pPr>
+          <a:r>
+            <a:rPr lang="en-GB" sz="1800" kern="1200" dirty="0" smtClean="0"/>
+            <a:t>(IT Security</a:t>
+          </a:r>
+          <a:r>
+            <a:rPr lang="en-GB" sz="1800" kern="1200" dirty="0" smtClean="0"/>
+            <a:t>)</a:t>
+          </a:r>
+          <a:endParaRPr lang="en-GB" sz="1800" kern="1200" dirty="0"/>
+        </a:p>
+      </dsp:txBody>
+      <dsp:txXfrm>
+        <a:off x="4183381" y="3163243"/>
+        <a:ext cx="1540648" cy="956586"/>
       </dsp:txXfrm>
     </dsp:sp>
     <dsp:sp modelId="{2517B15E-F8A3-4B0D-84C6-9ADF1836C397}">
@@ -4574,8 +5629,8 @@
       </dsp:nvSpPr>
       <dsp:spPr>
         <a:xfrm>
-          <a:off x="2899479" y="2267470"/>
-          <a:ext cx="2421289" cy="1315243"/>
+          <a:off x="4115534" y="1483084"/>
+          <a:ext cx="1870599" cy="1016108"/>
         </a:xfrm>
         <a:prstGeom prst="roundRect">
           <a:avLst>
@@ -4625,8 +5680,8 @@
       </dsp:nvSpPr>
       <dsp:spPr>
         <a:xfrm>
-          <a:off x="3129617" y="2486102"/>
-          <a:ext cx="2421289" cy="1315243"/>
+          <a:off x="4293331" y="1651991"/>
+          <a:ext cx="1870599" cy="1016108"/>
         </a:xfrm>
         <a:prstGeom prst="roundRect">
           <a:avLst>
@@ -4709,8 +5764,8 @@
         </a:p>
       </dsp:txBody>
       <dsp:txXfrm>
-        <a:off x="3168139" y="2524624"/>
-        <a:ext cx="2344245" cy="1238199"/>
+        <a:off x="4323092" y="1681752"/>
+        <a:ext cx="1811077" cy="956586"/>
       </dsp:txXfrm>
     </dsp:sp>
     <dsp:sp modelId="{277DCC10-3C4C-4DBB-8FF7-241E4E11B661}">
@@ -4720,8 +5775,8 @@
       </dsp:nvSpPr>
       <dsp:spPr>
         <a:xfrm>
-          <a:off x="5781046" y="2267470"/>
-          <a:ext cx="2490200" cy="1315243"/>
+          <a:off x="6341727" y="1483084"/>
+          <a:ext cx="1923837" cy="1016108"/>
         </a:xfrm>
         <a:prstGeom prst="roundRect">
           <a:avLst>
@@ -4771,8 +5826,8 @@
       </dsp:nvSpPr>
       <dsp:spPr>
         <a:xfrm>
-          <a:off x="6011185" y="2486102"/>
-          <a:ext cx="2490200" cy="1315243"/>
+          <a:off x="6519524" y="1651991"/>
+          <a:ext cx="1923837" cy="1016108"/>
         </a:xfrm>
         <a:prstGeom prst="roundRect">
           <a:avLst>
@@ -4855,8 +5910,154 @@
         </a:p>
       </dsp:txBody>
       <dsp:txXfrm>
-        <a:off x="6049707" y="2524624"/>
-        <a:ext cx="2413156" cy="1238199"/>
+        <a:off x="6549285" y="1681752"/>
+        <a:ext cx="1864315" cy="956586"/>
+      </dsp:txXfrm>
+    </dsp:sp>
+    <dsp:sp modelId="{95CD6972-2B11-4909-9984-F2181DCEF4AB}">
+      <dsp:nvSpPr>
+        <dsp:cNvPr id="0" name=""/>
+        <dsp:cNvSpPr/>
+      </dsp:nvSpPr>
+      <dsp:spPr>
+        <a:xfrm>
+          <a:off x="6503560" y="2964575"/>
+          <a:ext cx="1600170" cy="1016108"/>
+        </a:xfrm>
+        <a:prstGeom prst="roundRect">
+          <a:avLst>
+            <a:gd name="adj" fmla="val 10000"/>
+          </a:avLst>
+        </a:prstGeom>
+        <a:solidFill>
+          <a:schemeClr val="accent1">
+            <a:hueOff val="0"/>
+            <a:satOff val="0"/>
+            <a:lumOff val="0"/>
+            <a:alphaOff val="0"/>
+          </a:schemeClr>
+        </a:solidFill>
+        <a:ln w="25400" cap="flat" cmpd="sng" algn="ctr">
+          <a:solidFill>
+            <a:schemeClr val="lt1">
+              <a:hueOff val="0"/>
+              <a:satOff val="0"/>
+              <a:lumOff val="0"/>
+              <a:alphaOff val="0"/>
+            </a:schemeClr>
+          </a:solidFill>
+          <a:prstDash val="solid"/>
+        </a:ln>
+        <a:effectLst/>
+      </dsp:spPr>
+      <dsp:style>
+        <a:lnRef idx="2">
+          <a:scrgbClr r="0" g="0" b="0"/>
+        </a:lnRef>
+        <a:fillRef idx="1">
+          <a:scrgbClr r="0" g="0" b="0"/>
+        </a:fillRef>
+        <a:effectRef idx="0">
+          <a:scrgbClr r="0" g="0" b="0"/>
+        </a:effectRef>
+        <a:fontRef idx="minor">
+          <a:schemeClr val="lt1"/>
+        </a:fontRef>
+      </dsp:style>
+    </dsp:sp>
+    <dsp:sp modelId="{2C3D440A-D67F-442B-86C6-4864E8A61D40}">
+      <dsp:nvSpPr>
+        <dsp:cNvPr id="0" name=""/>
+        <dsp:cNvSpPr/>
+      </dsp:nvSpPr>
+      <dsp:spPr>
+        <a:xfrm>
+          <a:off x="6681357" y="3133482"/>
+          <a:ext cx="1600170" cy="1016108"/>
+        </a:xfrm>
+        <a:prstGeom prst="roundRect">
+          <a:avLst>
+            <a:gd name="adj" fmla="val 10000"/>
+          </a:avLst>
+        </a:prstGeom>
+        <a:solidFill>
+          <a:schemeClr val="lt1">
+            <a:alpha val="90000"/>
+            <a:hueOff val="0"/>
+            <a:satOff val="0"/>
+            <a:lumOff val="0"/>
+            <a:alphaOff val="0"/>
+          </a:schemeClr>
+        </a:solidFill>
+        <a:ln w="25400" cap="flat" cmpd="sng" algn="ctr">
+          <a:solidFill>
+            <a:schemeClr val="accent1">
+              <a:hueOff val="0"/>
+              <a:satOff val="0"/>
+              <a:lumOff val="0"/>
+              <a:alphaOff val="0"/>
+            </a:schemeClr>
+          </a:solidFill>
+          <a:prstDash val="solid"/>
+        </a:ln>
+        <a:effectLst/>
+      </dsp:spPr>
+      <dsp:style>
+        <a:lnRef idx="2">
+          <a:scrgbClr r="0" g="0" b="0"/>
+        </a:lnRef>
+        <a:fillRef idx="1">
+          <a:scrgbClr r="0" g="0" b="0"/>
+        </a:fillRef>
+        <a:effectRef idx="0">
+          <a:scrgbClr r="0" g="0" b="0"/>
+        </a:effectRef>
+        <a:fontRef idx="minor"/>
+      </dsp:style>
+      <dsp:txBody>
+        <a:bodyPr spcFirstLastPara="0" vert="horz" wrap="square" lIns="68580" tIns="68580" rIns="68580" bIns="68580" numCol="1" spcCol="1270" anchor="ctr" anchorCtr="0">
+          <a:noAutofit/>
+        </a:bodyPr>
+        <a:lstStyle/>
+        <a:p>
+          <a:pPr lvl="0" algn="ctr" defTabSz="800100">
+            <a:lnSpc>
+              <a:spcPct val="90000"/>
+            </a:lnSpc>
+            <a:spcBef>
+              <a:spcPct val="0"/>
+            </a:spcBef>
+            <a:spcAft>
+              <a:spcPct val="35000"/>
+            </a:spcAft>
+          </a:pPr>
+          <a:r>
+            <a:rPr lang="en-GB" sz="1800" kern="1200" dirty="0" smtClean="0"/>
+            <a:t>Pankaj Gupta</a:t>
+          </a:r>
+        </a:p>
+        <a:p>
+          <a:pPr lvl="0" algn="ctr" defTabSz="800100">
+            <a:lnSpc>
+              <a:spcPct val="90000"/>
+            </a:lnSpc>
+            <a:spcBef>
+              <a:spcPct val="0"/>
+            </a:spcBef>
+            <a:spcAft>
+              <a:spcPct val="35000"/>
+            </a:spcAft>
+          </a:pPr>
+          <a:r>
+            <a:rPr lang="en-GB" sz="1800" kern="1200" dirty="0" smtClean="0"/>
+            <a:t>(ERP Support)</a:t>
+          </a:r>
+          <a:endParaRPr lang="en-GB" sz="1800" kern="1200" dirty="0"/>
+        </a:p>
+      </dsp:txBody>
+      <dsp:txXfrm>
+        <a:off x="6711118" y="3163243"/>
+        <a:ext cx="1540648" cy="956586"/>
       </dsp:txXfrm>
     </dsp:sp>
   </dsp:spTree>
@@ -5723,916 +6924,6 @@
       <dsp:cNvGrpSpPr/>
     </dsp:nvGrpSpPr>
     <dsp:grpSpPr/>
-    <dsp:sp modelId="{55E3AA5B-67E0-41D5-8919-F5E3B1E9BBEF}">
-      <dsp:nvSpPr>
-        <dsp:cNvPr id="0" name=""/>
-        <dsp:cNvSpPr/>
-      </dsp:nvSpPr>
-      <dsp:spPr>
-        <a:xfrm>
-          <a:off x="217856" y="170"/>
-          <a:ext cx="1989266" cy="1193560"/>
-        </a:xfrm>
-        <a:prstGeom prst="rect">
-          <a:avLst/>
-        </a:prstGeom>
-        <a:gradFill rotWithShape="0">
-          <a:gsLst>
-            <a:gs pos="0">
-              <a:schemeClr val="accent2">
-                <a:hueOff val="0"/>
-                <a:satOff val="0"/>
-                <a:lumOff val="0"/>
-                <a:alphaOff val="0"/>
-                <a:tint val="50000"/>
-                <a:satMod val="300000"/>
-              </a:schemeClr>
-            </a:gs>
-            <a:gs pos="35000">
-              <a:schemeClr val="accent2">
-                <a:hueOff val="0"/>
-                <a:satOff val="0"/>
-                <a:lumOff val="0"/>
-                <a:alphaOff val="0"/>
-                <a:tint val="37000"/>
-                <a:satMod val="300000"/>
-              </a:schemeClr>
-            </a:gs>
-            <a:gs pos="100000">
-              <a:schemeClr val="accent2">
-                <a:hueOff val="0"/>
-                <a:satOff val="0"/>
-                <a:lumOff val="0"/>
-                <a:alphaOff val="0"/>
-                <a:tint val="15000"/>
-                <a:satMod val="350000"/>
-              </a:schemeClr>
-            </a:gs>
-          </a:gsLst>
-          <a:lin ang="16200000" scaled="1"/>
-        </a:gradFill>
-        <a:ln>
-          <a:noFill/>
-        </a:ln>
-        <a:effectLst>
-          <a:outerShdw blurRad="40000" dist="20000" dir="5400000" rotWithShape="0">
-            <a:srgbClr val="000000">
-              <a:alpha val="38000"/>
-            </a:srgbClr>
-          </a:outerShdw>
-        </a:effectLst>
-        <a:scene3d>
-          <a:camera prst="orthographicFront"/>
-          <a:lightRig rig="flat" dir="t"/>
-        </a:scene3d>
-        <a:sp3d prstMaterial="dkEdge">
-          <a:bevelT w="8200" h="38100"/>
-        </a:sp3d>
-      </dsp:spPr>
-      <dsp:style>
-        <a:lnRef idx="0">
-          <a:scrgbClr r="0" g="0" b="0"/>
-        </a:lnRef>
-        <a:fillRef idx="2">
-          <a:scrgbClr r="0" g="0" b="0"/>
-        </a:fillRef>
-        <a:effectRef idx="1">
-          <a:scrgbClr r="0" g="0" b="0"/>
-        </a:effectRef>
-        <a:fontRef idx="minor">
-          <a:schemeClr val="dk1"/>
-        </a:fontRef>
-      </dsp:style>
-      <dsp:txBody>
-        <a:bodyPr spcFirstLastPara="0" vert="horz" wrap="square" lIns="68580" tIns="68580" rIns="68580" bIns="68580" numCol="1" spcCol="1270" anchor="ctr" anchorCtr="0">
-          <a:noAutofit/>
-        </a:bodyPr>
-        <a:lstStyle/>
-        <a:p>
-          <a:pPr lvl="0" algn="ctr" defTabSz="800100" rtl="0">
-            <a:lnSpc>
-              <a:spcPct val="90000"/>
-            </a:lnSpc>
-            <a:spcBef>
-              <a:spcPct val="0"/>
-            </a:spcBef>
-            <a:spcAft>
-              <a:spcPct val="35000"/>
-            </a:spcAft>
-          </a:pPr>
-          <a:r>
-            <a:rPr lang="en-US" sz="1800" kern="1200" dirty="0" smtClean="0">
-              <a:ln>
-                <a:solidFill>
-                  <a:sysClr val="windowText" lastClr="000000"/>
-                </a:solidFill>
-              </a:ln>
-              <a:solidFill>
-                <a:srgbClr val="000000"/>
-              </a:solidFill>
-              <a:hlinkClick xmlns:r="http://schemas.openxmlformats.org/officeDocument/2006/relationships" r:id="rId1"/>
-            </a:rPr>
-            <a:t>IT Information Security Procedure</a:t>
-          </a:r>
-          <a:endParaRPr lang="en-GB" sz="1800" kern="1200" dirty="0">
-            <a:ln>
-              <a:solidFill>
-                <a:sysClr val="windowText" lastClr="000000"/>
-              </a:solidFill>
-            </a:ln>
-            <a:solidFill>
-              <a:srgbClr val="000000"/>
-            </a:solidFill>
-          </a:endParaRPr>
-        </a:p>
-      </dsp:txBody>
-      <dsp:txXfrm>
-        <a:off x="217856" y="170"/>
-        <a:ext cx="1989266" cy="1193560"/>
-      </dsp:txXfrm>
-    </dsp:sp>
-    <dsp:sp modelId="{AD9CA6AE-FAE1-4807-A602-91E19A4EDDA1}">
-      <dsp:nvSpPr>
-        <dsp:cNvPr id="0" name=""/>
-        <dsp:cNvSpPr/>
-      </dsp:nvSpPr>
-      <dsp:spPr>
-        <a:xfrm>
-          <a:off x="2406049" y="170"/>
-          <a:ext cx="1989266" cy="1193560"/>
-        </a:xfrm>
-        <a:prstGeom prst="rect">
-          <a:avLst/>
-        </a:prstGeom>
-        <a:gradFill rotWithShape="0">
-          <a:gsLst>
-            <a:gs pos="0">
-              <a:schemeClr val="accent2">
-                <a:hueOff val="0"/>
-                <a:satOff val="-979"/>
-                <a:lumOff val="5882"/>
-                <a:alphaOff val="0"/>
-                <a:tint val="50000"/>
-                <a:satMod val="300000"/>
-              </a:schemeClr>
-            </a:gs>
-            <a:gs pos="35000">
-              <a:schemeClr val="accent2">
-                <a:hueOff val="0"/>
-                <a:satOff val="-979"/>
-                <a:lumOff val="5882"/>
-                <a:alphaOff val="0"/>
-                <a:tint val="37000"/>
-                <a:satMod val="300000"/>
-              </a:schemeClr>
-            </a:gs>
-            <a:gs pos="100000">
-              <a:schemeClr val="accent2">
-                <a:hueOff val="0"/>
-                <a:satOff val="-979"/>
-                <a:lumOff val="5882"/>
-                <a:alphaOff val="0"/>
-                <a:tint val="15000"/>
-                <a:satMod val="350000"/>
-              </a:schemeClr>
-            </a:gs>
-          </a:gsLst>
-          <a:lin ang="16200000" scaled="1"/>
-        </a:gradFill>
-        <a:ln>
-          <a:noFill/>
-        </a:ln>
-        <a:effectLst>
-          <a:outerShdw blurRad="40000" dist="20000" dir="5400000" rotWithShape="0">
-            <a:srgbClr val="000000">
-              <a:alpha val="38000"/>
-            </a:srgbClr>
-          </a:outerShdw>
-        </a:effectLst>
-        <a:scene3d>
-          <a:camera prst="orthographicFront"/>
-          <a:lightRig rig="flat" dir="t"/>
-        </a:scene3d>
-        <a:sp3d prstMaterial="dkEdge">
-          <a:bevelT w="8200" h="38100"/>
-        </a:sp3d>
-      </dsp:spPr>
-      <dsp:style>
-        <a:lnRef idx="0">
-          <a:scrgbClr r="0" g="0" b="0"/>
-        </a:lnRef>
-        <a:fillRef idx="2">
-          <a:scrgbClr r="0" g="0" b="0"/>
-        </a:fillRef>
-        <a:effectRef idx="1">
-          <a:scrgbClr r="0" g="0" b="0"/>
-        </a:effectRef>
-        <a:fontRef idx="minor">
-          <a:schemeClr val="dk1"/>
-        </a:fontRef>
-      </dsp:style>
-      <dsp:txBody>
-        <a:bodyPr spcFirstLastPara="0" vert="horz" wrap="square" lIns="68580" tIns="68580" rIns="68580" bIns="68580" numCol="1" spcCol="1270" anchor="ctr" anchorCtr="0">
-          <a:noAutofit/>
-        </a:bodyPr>
-        <a:lstStyle/>
-        <a:p>
-          <a:pPr lvl="0" algn="ctr" defTabSz="800100" rtl="0">
-            <a:lnSpc>
-              <a:spcPct val="90000"/>
-            </a:lnSpc>
-            <a:spcBef>
-              <a:spcPct val="0"/>
-            </a:spcBef>
-            <a:spcAft>
-              <a:spcPct val="35000"/>
-            </a:spcAft>
-          </a:pPr>
-          <a:r>
-            <a:rPr lang="en-US" sz="1800" kern="1200" dirty="0" smtClean="0">
-              <a:ln>
-                <a:solidFill>
-                  <a:sysClr val="windowText" lastClr="000000"/>
-                </a:solidFill>
-              </a:ln>
-              <a:solidFill>
-                <a:srgbClr val="000000"/>
-              </a:solidFill>
-              <a:hlinkClick xmlns:r="http://schemas.openxmlformats.org/officeDocument/2006/relationships" r:id="rId2"/>
-            </a:rPr>
-            <a:t>IT Guidelines for Data Backup</a:t>
-          </a:r>
-          <a:endParaRPr lang="en-GB" sz="1800" kern="1200" dirty="0">
-            <a:ln>
-              <a:solidFill>
-                <a:sysClr val="windowText" lastClr="000000"/>
-              </a:solidFill>
-            </a:ln>
-            <a:solidFill>
-              <a:srgbClr val="000000"/>
-            </a:solidFill>
-          </a:endParaRPr>
-        </a:p>
-      </dsp:txBody>
-      <dsp:txXfrm>
-        <a:off x="2406049" y="170"/>
-        <a:ext cx="1989266" cy="1193560"/>
-      </dsp:txXfrm>
-    </dsp:sp>
-    <dsp:sp modelId="{9EADCE79-6FF0-4D13-A034-ADAD8CDE2470}">
-      <dsp:nvSpPr>
-        <dsp:cNvPr id="0" name=""/>
-        <dsp:cNvSpPr/>
-      </dsp:nvSpPr>
-      <dsp:spPr>
-        <a:xfrm>
-          <a:off x="4594243" y="170"/>
-          <a:ext cx="1989266" cy="1193560"/>
-        </a:xfrm>
-        <a:prstGeom prst="rect">
-          <a:avLst/>
-        </a:prstGeom>
-        <a:gradFill rotWithShape="0">
-          <a:gsLst>
-            <a:gs pos="0">
-              <a:schemeClr val="accent2">
-                <a:hueOff val="0"/>
-                <a:satOff val="-1957"/>
-                <a:lumOff val="11764"/>
-                <a:alphaOff val="0"/>
-                <a:tint val="50000"/>
-                <a:satMod val="300000"/>
-              </a:schemeClr>
-            </a:gs>
-            <a:gs pos="35000">
-              <a:schemeClr val="accent2">
-                <a:hueOff val="0"/>
-                <a:satOff val="-1957"/>
-                <a:lumOff val="11764"/>
-                <a:alphaOff val="0"/>
-                <a:tint val="37000"/>
-                <a:satMod val="300000"/>
-              </a:schemeClr>
-            </a:gs>
-            <a:gs pos="100000">
-              <a:schemeClr val="accent2">
-                <a:hueOff val="0"/>
-                <a:satOff val="-1957"/>
-                <a:lumOff val="11764"/>
-                <a:alphaOff val="0"/>
-                <a:tint val="15000"/>
-                <a:satMod val="350000"/>
-              </a:schemeClr>
-            </a:gs>
-          </a:gsLst>
-          <a:lin ang="16200000" scaled="1"/>
-        </a:gradFill>
-        <a:ln>
-          <a:noFill/>
-        </a:ln>
-        <a:effectLst>
-          <a:outerShdw blurRad="40000" dist="20000" dir="5400000" rotWithShape="0">
-            <a:srgbClr val="000000">
-              <a:alpha val="38000"/>
-            </a:srgbClr>
-          </a:outerShdw>
-        </a:effectLst>
-        <a:scene3d>
-          <a:camera prst="orthographicFront"/>
-          <a:lightRig rig="flat" dir="t"/>
-        </a:scene3d>
-        <a:sp3d prstMaterial="dkEdge">
-          <a:bevelT w="8200" h="38100"/>
-        </a:sp3d>
-      </dsp:spPr>
-      <dsp:style>
-        <a:lnRef idx="0">
-          <a:scrgbClr r="0" g="0" b="0"/>
-        </a:lnRef>
-        <a:fillRef idx="2">
-          <a:scrgbClr r="0" g="0" b="0"/>
-        </a:fillRef>
-        <a:effectRef idx="1">
-          <a:scrgbClr r="0" g="0" b="0"/>
-        </a:effectRef>
-        <a:fontRef idx="minor">
-          <a:schemeClr val="dk1"/>
-        </a:fontRef>
-      </dsp:style>
-      <dsp:txBody>
-        <a:bodyPr spcFirstLastPara="0" vert="horz" wrap="square" lIns="68580" tIns="68580" rIns="68580" bIns="68580" numCol="1" spcCol="1270" anchor="ctr" anchorCtr="0">
-          <a:noAutofit/>
-        </a:bodyPr>
-        <a:lstStyle/>
-        <a:p>
-          <a:pPr lvl="0" algn="ctr" defTabSz="800100" rtl="0">
-            <a:lnSpc>
-              <a:spcPct val="90000"/>
-            </a:lnSpc>
-            <a:spcBef>
-              <a:spcPct val="0"/>
-            </a:spcBef>
-            <a:spcAft>
-              <a:spcPct val="35000"/>
-            </a:spcAft>
-          </a:pPr>
-          <a:r>
-            <a:rPr lang="en-US" sz="1800" kern="1200" dirty="0" smtClean="0">
-              <a:ln>
-                <a:solidFill>
-                  <a:sysClr val="windowText" lastClr="000000"/>
-                </a:solidFill>
-              </a:ln>
-              <a:solidFill>
-                <a:srgbClr val="000000"/>
-              </a:solidFill>
-              <a:hlinkClick xmlns:r="http://schemas.openxmlformats.org/officeDocument/2006/relationships" r:id="rId3"/>
-            </a:rPr>
-            <a:t>IT Guidelines for Travelling Users</a:t>
-          </a:r>
-          <a:endParaRPr lang="en-GB" sz="1800" kern="1200" dirty="0">
-            <a:ln>
-              <a:solidFill>
-                <a:sysClr val="windowText" lastClr="000000"/>
-              </a:solidFill>
-            </a:ln>
-            <a:solidFill>
-              <a:srgbClr val="000000"/>
-            </a:solidFill>
-          </a:endParaRPr>
-        </a:p>
-      </dsp:txBody>
-      <dsp:txXfrm>
-        <a:off x="4594243" y="170"/>
-        <a:ext cx="1989266" cy="1193560"/>
-      </dsp:txXfrm>
-    </dsp:sp>
-    <dsp:sp modelId="{A020BC64-8059-47F5-9C72-D091E5ED68D9}">
-      <dsp:nvSpPr>
-        <dsp:cNvPr id="0" name=""/>
-        <dsp:cNvSpPr/>
-      </dsp:nvSpPr>
-      <dsp:spPr>
-        <a:xfrm>
-          <a:off x="217856" y="1392657"/>
-          <a:ext cx="1989266" cy="1193560"/>
-        </a:xfrm>
-        <a:prstGeom prst="rect">
-          <a:avLst/>
-        </a:prstGeom>
-        <a:gradFill rotWithShape="0">
-          <a:gsLst>
-            <a:gs pos="0">
-              <a:schemeClr val="accent2">
-                <a:hueOff val="0"/>
-                <a:satOff val="-2936"/>
-                <a:lumOff val="17647"/>
-                <a:alphaOff val="0"/>
-                <a:tint val="50000"/>
-                <a:satMod val="300000"/>
-              </a:schemeClr>
-            </a:gs>
-            <a:gs pos="35000">
-              <a:schemeClr val="accent2">
-                <a:hueOff val="0"/>
-                <a:satOff val="-2936"/>
-                <a:lumOff val="17647"/>
-                <a:alphaOff val="0"/>
-                <a:tint val="37000"/>
-                <a:satMod val="300000"/>
-              </a:schemeClr>
-            </a:gs>
-            <a:gs pos="100000">
-              <a:schemeClr val="accent2">
-                <a:hueOff val="0"/>
-                <a:satOff val="-2936"/>
-                <a:lumOff val="17647"/>
-                <a:alphaOff val="0"/>
-                <a:tint val="15000"/>
-                <a:satMod val="350000"/>
-              </a:schemeClr>
-            </a:gs>
-          </a:gsLst>
-          <a:lin ang="16200000" scaled="1"/>
-        </a:gradFill>
-        <a:ln>
-          <a:noFill/>
-        </a:ln>
-        <a:effectLst>
-          <a:outerShdw blurRad="40000" dist="20000" dir="5400000" rotWithShape="0">
-            <a:srgbClr val="000000">
-              <a:alpha val="38000"/>
-            </a:srgbClr>
-          </a:outerShdw>
-        </a:effectLst>
-        <a:scene3d>
-          <a:camera prst="orthographicFront"/>
-          <a:lightRig rig="flat" dir="t"/>
-        </a:scene3d>
-        <a:sp3d prstMaterial="dkEdge">
-          <a:bevelT w="8200" h="38100"/>
-        </a:sp3d>
-      </dsp:spPr>
-      <dsp:style>
-        <a:lnRef idx="0">
-          <a:scrgbClr r="0" g="0" b="0"/>
-        </a:lnRef>
-        <a:fillRef idx="2">
-          <a:scrgbClr r="0" g="0" b="0"/>
-        </a:fillRef>
-        <a:effectRef idx="1">
-          <a:scrgbClr r="0" g="0" b="0"/>
-        </a:effectRef>
-        <a:fontRef idx="minor">
-          <a:schemeClr val="dk1"/>
-        </a:fontRef>
-      </dsp:style>
-      <dsp:txBody>
-        <a:bodyPr spcFirstLastPara="0" vert="horz" wrap="square" lIns="68580" tIns="68580" rIns="68580" bIns="68580" numCol="1" spcCol="1270" anchor="ctr" anchorCtr="0">
-          <a:noAutofit/>
-        </a:bodyPr>
-        <a:lstStyle/>
-        <a:p>
-          <a:pPr lvl="0" algn="ctr" defTabSz="800100" rtl="0">
-            <a:lnSpc>
-              <a:spcPct val="90000"/>
-            </a:lnSpc>
-            <a:spcBef>
-              <a:spcPct val="0"/>
-            </a:spcBef>
-            <a:spcAft>
-              <a:spcPct val="35000"/>
-            </a:spcAft>
-          </a:pPr>
-          <a:r>
-            <a:rPr lang="en-US" sz="1800" kern="1200" dirty="0" smtClean="0">
-              <a:ln>
-                <a:solidFill>
-                  <a:sysClr val="windowText" lastClr="000000"/>
-                </a:solidFill>
-              </a:ln>
-              <a:solidFill>
-                <a:srgbClr val="000000"/>
-              </a:solidFill>
-              <a:hlinkClick xmlns:r="http://schemas.openxmlformats.org/officeDocument/2006/relationships" r:id="rId4"/>
-            </a:rPr>
-            <a:t>Surveillance of Internet Access</a:t>
-          </a:r>
-          <a:endParaRPr lang="en-GB" sz="1800" kern="1200" dirty="0">
-            <a:ln>
-              <a:solidFill>
-                <a:sysClr val="windowText" lastClr="000000"/>
-              </a:solidFill>
-            </a:ln>
-            <a:solidFill>
-              <a:srgbClr val="000000"/>
-            </a:solidFill>
-          </a:endParaRPr>
-        </a:p>
-      </dsp:txBody>
-      <dsp:txXfrm>
-        <a:off x="217856" y="1392657"/>
-        <a:ext cx="1989266" cy="1193560"/>
-      </dsp:txXfrm>
-    </dsp:sp>
-    <dsp:sp modelId="{0946DFFE-5E39-4D1B-8C53-8BC16F5D9C9D}">
-      <dsp:nvSpPr>
-        <dsp:cNvPr id="0" name=""/>
-        <dsp:cNvSpPr/>
-      </dsp:nvSpPr>
-      <dsp:spPr>
-        <a:xfrm>
-          <a:off x="2406049" y="1392657"/>
-          <a:ext cx="1989266" cy="1193560"/>
-        </a:xfrm>
-        <a:prstGeom prst="rect">
-          <a:avLst/>
-        </a:prstGeom>
-        <a:gradFill rotWithShape="0">
-          <a:gsLst>
-            <a:gs pos="0">
-              <a:schemeClr val="accent2">
-                <a:hueOff val="0"/>
-                <a:satOff val="-3915"/>
-                <a:lumOff val="23529"/>
-                <a:alphaOff val="0"/>
-                <a:tint val="50000"/>
-                <a:satMod val="300000"/>
-              </a:schemeClr>
-            </a:gs>
-            <a:gs pos="35000">
-              <a:schemeClr val="accent2">
-                <a:hueOff val="0"/>
-                <a:satOff val="-3915"/>
-                <a:lumOff val="23529"/>
-                <a:alphaOff val="0"/>
-                <a:tint val="37000"/>
-                <a:satMod val="300000"/>
-              </a:schemeClr>
-            </a:gs>
-            <a:gs pos="100000">
-              <a:schemeClr val="accent2">
-                <a:hueOff val="0"/>
-                <a:satOff val="-3915"/>
-                <a:lumOff val="23529"/>
-                <a:alphaOff val="0"/>
-                <a:tint val="15000"/>
-                <a:satMod val="350000"/>
-              </a:schemeClr>
-            </a:gs>
-          </a:gsLst>
-          <a:lin ang="16200000" scaled="1"/>
-        </a:gradFill>
-        <a:ln>
-          <a:noFill/>
-        </a:ln>
-        <a:effectLst>
-          <a:outerShdw blurRad="40000" dist="20000" dir="5400000" rotWithShape="0">
-            <a:srgbClr val="000000">
-              <a:alpha val="38000"/>
-            </a:srgbClr>
-          </a:outerShdw>
-        </a:effectLst>
-        <a:scene3d>
-          <a:camera prst="orthographicFront"/>
-          <a:lightRig rig="flat" dir="t"/>
-        </a:scene3d>
-        <a:sp3d prstMaterial="dkEdge">
-          <a:bevelT w="8200" h="38100"/>
-        </a:sp3d>
-      </dsp:spPr>
-      <dsp:style>
-        <a:lnRef idx="0">
-          <a:scrgbClr r="0" g="0" b="0"/>
-        </a:lnRef>
-        <a:fillRef idx="2">
-          <a:scrgbClr r="0" g="0" b="0"/>
-        </a:fillRef>
-        <a:effectRef idx="1">
-          <a:scrgbClr r="0" g="0" b="0"/>
-        </a:effectRef>
-        <a:fontRef idx="minor">
-          <a:schemeClr val="dk1"/>
-        </a:fontRef>
-      </dsp:style>
-      <dsp:txBody>
-        <a:bodyPr spcFirstLastPara="0" vert="horz" wrap="square" lIns="68580" tIns="68580" rIns="68580" bIns="68580" numCol="1" spcCol="1270" anchor="ctr" anchorCtr="0">
-          <a:noAutofit/>
-        </a:bodyPr>
-        <a:lstStyle/>
-        <a:p>
-          <a:pPr lvl="0" algn="ctr" defTabSz="800100" rtl="0">
-            <a:lnSpc>
-              <a:spcPct val="90000"/>
-            </a:lnSpc>
-            <a:spcBef>
-              <a:spcPct val="0"/>
-            </a:spcBef>
-            <a:spcAft>
-              <a:spcPct val="35000"/>
-            </a:spcAft>
-          </a:pPr>
-          <a:r>
-            <a:rPr lang="en-US" sz="1800" kern="1200" dirty="0" smtClean="0">
-              <a:ln>
-                <a:solidFill>
-                  <a:sysClr val="windowText" lastClr="000000"/>
-                </a:solidFill>
-              </a:ln>
-              <a:solidFill>
-                <a:srgbClr val="000000"/>
-              </a:solidFill>
-              <a:hlinkClick xmlns:r="http://schemas.openxmlformats.org/officeDocument/2006/relationships" r:id="rId5"/>
-            </a:rPr>
-            <a:t>Handling of SPAM/Phishing Mails</a:t>
-          </a:r>
-          <a:endParaRPr lang="en-GB" sz="1800" kern="1200" dirty="0">
-            <a:ln>
-              <a:solidFill>
-                <a:sysClr val="windowText" lastClr="000000"/>
-              </a:solidFill>
-            </a:ln>
-            <a:solidFill>
-              <a:srgbClr val="000000"/>
-            </a:solidFill>
-          </a:endParaRPr>
-        </a:p>
-      </dsp:txBody>
-      <dsp:txXfrm>
-        <a:off x="2406049" y="1392657"/>
-        <a:ext cx="1989266" cy="1193560"/>
-      </dsp:txXfrm>
-    </dsp:sp>
-    <dsp:sp modelId="{AD8CBA65-313B-4D88-A049-513AF931C188}">
-      <dsp:nvSpPr>
-        <dsp:cNvPr id="0" name=""/>
-        <dsp:cNvSpPr/>
-      </dsp:nvSpPr>
-      <dsp:spPr>
-        <a:xfrm>
-          <a:off x="4594243" y="1392657"/>
-          <a:ext cx="1989266" cy="1193560"/>
-        </a:xfrm>
-        <a:prstGeom prst="rect">
-          <a:avLst/>
-        </a:prstGeom>
-        <a:gradFill rotWithShape="0">
-          <a:gsLst>
-            <a:gs pos="0">
-              <a:schemeClr val="accent2">
-                <a:hueOff val="0"/>
-                <a:satOff val="-4893"/>
-                <a:lumOff val="29411"/>
-                <a:alphaOff val="0"/>
-                <a:tint val="50000"/>
-                <a:satMod val="300000"/>
-              </a:schemeClr>
-            </a:gs>
-            <a:gs pos="35000">
-              <a:schemeClr val="accent2">
-                <a:hueOff val="0"/>
-                <a:satOff val="-4893"/>
-                <a:lumOff val="29411"/>
-                <a:alphaOff val="0"/>
-                <a:tint val="37000"/>
-                <a:satMod val="300000"/>
-              </a:schemeClr>
-            </a:gs>
-            <a:gs pos="100000">
-              <a:schemeClr val="accent2">
-                <a:hueOff val="0"/>
-                <a:satOff val="-4893"/>
-                <a:lumOff val="29411"/>
-                <a:alphaOff val="0"/>
-                <a:tint val="15000"/>
-                <a:satMod val="350000"/>
-              </a:schemeClr>
-            </a:gs>
-          </a:gsLst>
-          <a:lin ang="16200000" scaled="1"/>
-        </a:gradFill>
-        <a:ln>
-          <a:noFill/>
-        </a:ln>
-        <a:effectLst>
-          <a:outerShdw blurRad="40000" dist="20000" dir="5400000" rotWithShape="0">
-            <a:srgbClr val="000000">
-              <a:alpha val="38000"/>
-            </a:srgbClr>
-          </a:outerShdw>
-        </a:effectLst>
-        <a:scene3d>
-          <a:camera prst="orthographicFront"/>
-          <a:lightRig rig="flat" dir="t"/>
-        </a:scene3d>
-        <a:sp3d prstMaterial="dkEdge">
-          <a:bevelT w="8200" h="38100"/>
-        </a:sp3d>
-      </dsp:spPr>
-      <dsp:style>
-        <a:lnRef idx="0">
-          <a:scrgbClr r="0" g="0" b="0"/>
-        </a:lnRef>
-        <a:fillRef idx="2">
-          <a:scrgbClr r="0" g="0" b="0"/>
-        </a:fillRef>
-        <a:effectRef idx="1">
-          <a:scrgbClr r="0" g="0" b="0"/>
-        </a:effectRef>
-        <a:fontRef idx="minor">
-          <a:schemeClr val="dk1"/>
-        </a:fontRef>
-      </dsp:style>
-      <dsp:txBody>
-        <a:bodyPr spcFirstLastPara="0" vert="horz" wrap="square" lIns="68580" tIns="68580" rIns="68580" bIns="68580" numCol="1" spcCol="1270" anchor="ctr" anchorCtr="0">
-          <a:noAutofit/>
-        </a:bodyPr>
-        <a:lstStyle/>
-        <a:p>
-          <a:pPr lvl="0" algn="ctr" defTabSz="800100" rtl="0">
-            <a:lnSpc>
-              <a:spcPct val="90000"/>
-            </a:lnSpc>
-            <a:spcBef>
-              <a:spcPct val="0"/>
-            </a:spcBef>
-            <a:spcAft>
-              <a:spcPct val="35000"/>
-            </a:spcAft>
-          </a:pPr>
-          <a:r>
-            <a:rPr lang="en-US" sz="1800" kern="1200" dirty="0" smtClean="0">
-              <a:ln>
-                <a:solidFill>
-                  <a:sysClr val="windowText" lastClr="000000"/>
-                </a:solidFill>
-              </a:ln>
-              <a:solidFill>
-                <a:srgbClr val="000000"/>
-              </a:solidFill>
-              <a:hlinkClick xmlns:r="http://schemas.openxmlformats.org/officeDocument/2006/relationships" r:id="rId6"/>
-            </a:rPr>
-            <a:t>Instruction for using Correct E-Mail Address and Signature</a:t>
-          </a:r>
-          <a:endParaRPr lang="en-GB" sz="1800" kern="1200" dirty="0">
-            <a:ln>
-              <a:solidFill>
-                <a:sysClr val="windowText" lastClr="000000"/>
-              </a:solidFill>
-            </a:ln>
-            <a:solidFill>
-              <a:srgbClr val="000000"/>
-            </a:solidFill>
-          </a:endParaRPr>
-        </a:p>
-      </dsp:txBody>
-      <dsp:txXfrm>
-        <a:off x="4594243" y="1392657"/>
-        <a:ext cx="1989266" cy="1193560"/>
-      </dsp:txXfrm>
-    </dsp:sp>
-    <dsp:sp modelId="{C9658783-3736-4F3B-9093-5BBF2D3C1BE1}">
-      <dsp:nvSpPr>
-        <dsp:cNvPr id="0" name=""/>
-        <dsp:cNvSpPr/>
-      </dsp:nvSpPr>
-      <dsp:spPr>
-        <a:xfrm>
-          <a:off x="2406049" y="2785144"/>
-          <a:ext cx="1989266" cy="1193560"/>
-        </a:xfrm>
-        <a:prstGeom prst="rect">
-          <a:avLst/>
-        </a:prstGeom>
-        <a:gradFill rotWithShape="0">
-          <a:gsLst>
-            <a:gs pos="0">
-              <a:schemeClr val="accent2">
-                <a:hueOff val="0"/>
-                <a:satOff val="-5872"/>
-                <a:lumOff val="35293"/>
-                <a:alphaOff val="0"/>
-                <a:tint val="50000"/>
-                <a:satMod val="300000"/>
-              </a:schemeClr>
-            </a:gs>
-            <a:gs pos="35000">
-              <a:schemeClr val="accent2">
-                <a:hueOff val="0"/>
-                <a:satOff val="-5872"/>
-                <a:lumOff val="35293"/>
-                <a:alphaOff val="0"/>
-                <a:tint val="37000"/>
-                <a:satMod val="300000"/>
-              </a:schemeClr>
-            </a:gs>
-            <a:gs pos="100000">
-              <a:schemeClr val="accent2">
-                <a:hueOff val="0"/>
-                <a:satOff val="-5872"/>
-                <a:lumOff val="35293"/>
-                <a:alphaOff val="0"/>
-                <a:tint val="15000"/>
-                <a:satMod val="350000"/>
-              </a:schemeClr>
-            </a:gs>
-          </a:gsLst>
-          <a:lin ang="16200000" scaled="1"/>
-        </a:gradFill>
-        <a:ln>
-          <a:noFill/>
-        </a:ln>
-        <a:effectLst>
-          <a:outerShdw blurRad="40000" dist="20000" dir="5400000" rotWithShape="0">
-            <a:srgbClr val="000000">
-              <a:alpha val="38000"/>
-            </a:srgbClr>
-          </a:outerShdw>
-        </a:effectLst>
-        <a:scene3d>
-          <a:camera prst="orthographicFront"/>
-          <a:lightRig rig="flat" dir="t"/>
-        </a:scene3d>
-        <a:sp3d prstMaterial="dkEdge">
-          <a:bevelT w="8200" h="38100"/>
-        </a:sp3d>
-      </dsp:spPr>
-      <dsp:style>
-        <a:lnRef idx="0">
-          <a:scrgbClr r="0" g="0" b="0"/>
-        </a:lnRef>
-        <a:fillRef idx="2">
-          <a:scrgbClr r="0" g="0" b="0"/>
-        </a:fillRef>
-        <a:effectRef idx="1">
-          <a:scrgbClr r="0" g="0" b="0"/>
-        </a:effectRef>
-        <a:fontRef idx="minor">
-          <a:schemeClr val="dk1"/>
-        </a:fontRef>
-      </dsp:style>
-      <dsp:txBody>
-        <a:bodyPr spcFirstLastPara="0" vert="horz" wrap="square" lIns="68580" tIns="68580" rIns="68580" bIns="68580" numCol="1" spcCol="1270" anchor="ctr" anchorCtr="0">
-          <a:noAutofit/>
-        </a:bodyPr>
-        <a:lstStyle/>
-        <a:p>
-          <a:pPr lvl="0" algn="ctr" defTabSz="800100" rtl="0">
-            <a:lnSpc>
-              <a:spcPct val="90000"/>
-            </a:lnSpc>
-            <a:spcBef>
-              <a:spcPct val="0"/>
-            </a:spcBef>
-            <a:spcAft>
-              <a:spcPct val="35000"/>
-            </a:spcAft>
-          </a:pPr>
-          <a:r>
-            <a:rPr lang="en-US" sz="1800" kern="1200" dirty="0" err="1" smtClean="0">
-              <a:ln>
-                <a:solidFill>
-                  <a:sysClr val="windowText" lastClr="000000"/>
-                </a:solidFill>
-              </a:ln>
-              <a:solidFill>
-                <a:srgbClr val="000000"/>
-              </a:solidFill>
-              <a:hlinkClick xmlns:r="http://schemas.openxmlformats.org/officeDocument/2006/relationships" r:id="rId7"/>
-            </a:rPr>
-            <a:t>Fowarding</a:t>
-          </a:r>
-          <a:r>
-            <a:rPr lang="en-US" sz="1800" kern="1200" dirty="0" smtClean="0">
-              <a:ln>
-                <a:solidFill>
-                  <a:sysClr val="windowText" lastClr="000000"/>
-                </a:solidFill>
-              </a:ln>
-              <a:solidFill>
-                <a:srgbClr val="000000"/>
-              </a:solidFill>
-              <a:hlinkClick xmlns:r="http://schemas.openxmlformats.org/officeDocument/2006/relationships" r:id="rId7"/>
-            </a:rPr>
-            <a:t> of mails to personal e-mails IDs</a:t>
-          </a:r>
-          <a:endParaRPr lang="en-GB" sz="1800" kern="1200" dirty="0">
-            <a:ln>
-              <a:solidFill>
-                <a:sysClr val="windowText" lastClr="000000"/>
-              </a:solidFill>
-            </a:ln>
-            <a:solidFill>
-              <a:srgbClr val="000000"/>
-            </a:solidFill>
-          </a:endParaRPr>
-        </a:p>
-      </dsp:txBody>
-      <dsp:txXfrm>
-        <a:off x="2406049" y="2785144"/>
-        <a:ext cx="1989266" cy="1193560"/>
-      </dsp:txXfrm>
-    </dsp:sp>
   </dsp:spTree>
 </dsp:drawing>
 </file>
@@ -12563,7 +12854,7 @@
           <a:p>
             <a:fld id="{EDA8F00A-5471-46D0-8328-9493E588D2A8}" type="datetimeFigureOut">
               <a:rPr lang="en-IN" smtClean="0"/>
-              <a:t>12-01-2019</a:t>
+              <a:t>11-02-2019</a:t>
             </a:fld>
             <a:endParaRPr lang="en-IN"/>
           </a:p>
@@ -16125,7 +16416,7 @@
           <p:nvPr>
             <p:extLst>
               <p:ext uri="{D42A27DB-BD31-4B8C-83A1-F6EECF244321}">
-                <p14:modId xmlns:p14="http://schemas.microsoft.com/office/powerpoint/2010/main" val="2484408407"/>
+                <p14:modId xmlns:p14="http://schemas.microsoft.com/office/powerpoint/2010/main" val="2998802425"/>
               </p:ext>
             </p:extLst>
           </p:nvPr>
@@ -18859,7 +19150,9 @@
           <a:prstGeom prst="rect">
             <a:avLst/>
           </a:prstGeom>
-          <a:noFill/>
+          <a:solidFill>
+            <a:srgbClr val="FFCCFF"/>
+          </a:solidFill>
           <a:ln w="9525" cap="flat" cmpd="sng" algn="ctr">
             <a:solidFill>
               <a:srgbClr val="3288C4"/>
@@ -18877,144 +19170,11 @@
               <a:avLst/>
             </a:prstTxWarp>
           </a:bodyPr>
-          <a:lstStyle>
-            <a:defPPr>
-              <a:defRPr lang="en-US"/>
-            </a:defPPr>
-            <a:lvl1pPr algn="l" rtl="0" fontAlgn="base">
-              <a:spcBef>
-                <a:spcPct val="0"/>
-              </a:spcBef>
-              <a:spcAft>
-                <a:spcPct val="0"/>
-              </a:spcAft>
-              <a:defRPr sz="1400" kern="1200">
-                <a:solidFill>
-                  <a:srgbClr val="000000"/>
-                </a:solidFill>
-                <a:latin typeface="Tahoma" pitchFamily="34" charset="0"/>
-                <a:ea typeface="+mn-ea"/>
-                <a:cs typeface="Arial" pitchFamily="34" charset="0"/>
-              </a:defRPr>
-            </a:lvl1pPr>
-            <a:lvl2pPr marL="457200" algn="l" rtl="0" fontAlgn="base">
-              <a:spcBef>
-                <a:spcPct val="0"/>
-              </a:spcBef>
-              <a:spcAft>
-                <a:spcPct val="0"/>
-              </a:spcAft>
-              <a:defRPr sz="1400" kern="1200">
-                <a:solidFill>
-                  <a:srgbClr val="000000"/>
-                </a:solidFill>
-                <a:latin typeface="Tahoma" pitchFamily="34" charset="0"/>
-                <a:ea typeface="+mn-ea"/>
-                <a:cs typeface="Arial" pitchFamily="34" charset="0"/>
-              </a:defRPr>
-            </a:lvl2pPr>
-            <a:lvl3pPr marL="914400" algn="l" rtl="0" fontAlgn="base">
-              <a:spcBef>
-                <a:spcPct val="0"/>
-              </a:spcBef>
-              <a:spcAft>
-                <a:spcPct val="0"/>
-              </a:spcAft>
-              <a:defRPr sz="1400" kern="1200">
-                <a:solidFill>
-                  <a:srgbClr val="000000"/>
-                </a:solidFill>
-                <a:latin typeface="Tahoma" pitchFamily="34" charset="0"/>
-                <a:ea typeface="+mn-ea"/>
-                <a:cs typeface="Arial" pitchFamily="34" charset="0"/>
-              </a:defRPr>
-            </a:lvl3pPr>
-            <a:lvl4pPr marL="1371600" algn="l" rtl="0" fontAlgn="base">
-              <a:spcBef>
-                <a:spcPct val="0"/>
-              </a:spcBef>
-              <a:spcAft>
-                <a:spcPct val="0"/>
-              </a:spcAft>
-              <a:defRPr sz="1400" kern="1200">
-                <a:solidFill>
-                  <a:srgbClr val="000000"/>
-                </a:solidFill>
-                <a:latin typeface="Tahoma" pitchFamily="34" charset="0"/>
-                <a:ea typeface="+mn-ea"/>
-                <a:cs typeface="Arial" pitchFamily="34" charset="0"/>
-              </a:defRPr>
-            </a:lvl4pPr>
-            <a:lvl5pPr marL="1828800" algn="l" rtl="0" fontAlgn="base">
-              <a:spcBef>
-                <a:spcPct val="0"/>
-              </a:spcBef>
-              <a:spcAft>
-                <a:spcPct val="0"/>
-              </a:spcAft>
-              <a:defRPr sz="1400" kern="1200">
-                <a:solidFill>
-                  <a:srgbClr val="000000"/>
-                </a:solidFill>
-                <a:latin typeface="Tahoma" pitchFamily="34" charset="0"/>
-                <a:ea typeface="+mn-ea"/>
-                <a:cs typeface="Arial" pitchFamily="34" charset="0"/>
-              </a:defRPr>
-            </a:lvl5pPr>
-            <a:lvl6pPr marL="2286000" algn="l" defTabSz="914400" rtl="0" eaLnBrk="1" latinLnBrk="0" hangingPunct="1">
-              <a:defRPr sz="1400" kern="1200">
-                <a:solidFill>
-                  <a:srgbClr val="000000"/>
-                </a:solidFill>
-                <a:latin typeface="Tahoma" pitchFamily="34" charset="0"/>
-                <a:ea typeface="+mn-ea"/>
-                <a:cs typeface="Arial" pitchFamily="34" charset="0"/>
-              </a:defRPr>
-            </a:lvl6pPr>
-            <a:lvl7pPr marL="2743200" algn="l" defTabSz="914400" rtl="0" eaLnBrk="1" latinLnBrk="0" hangingPunct="1">
-              <a:defRPr sz="1400" kern="1200">
-                <a:solidFill>
-                  <a:srgbClr val="000000"/>
-                </a:solidFill>
-                <a:latin typeface="Tahoma" pitchFamily="34" charset="0"/>
-                <a:ea typeface="+mn-ea"/>
-                <a:cs typeface="Arial" pitchFamily="34" charset="0"/>
-              </a:defRPr>
-            </a:lvl7pPr>
-            <a:lvl8pPr marL="3200400" algn="l" defTabSz="914400" rtl="0" eaLnBrk="1" latinLnBrk="0" hangingPunct="1">
-              <a:defRPr sz="1400" kern="1200">
-                <a:solidFill>
-                  <a:srgbClr val="000000"/>
-                </a:solidFill>
-                <a:latin typeface="Tahoma" pitchFamily="34" charset="0"/>
-                <a:ea typeface="+mn-ea"/>
-                <a:cs typeface="Arial" pitchFamily="34" charset="0"/>
-              </a:defRPr>
-            </a:lvl8pPr>
-            <a:lvl9pPr marL="3657600" algn="l" defTabSz="914400" rtl="0" eaLnBrk="1" latinLnBrk="0" hangingPunct="1">
-              <a:defRPr sz="1400" kern="1200">
-                <a:solidFill>
-                  <a:srgbClr val="000000"/>
-                </a:solidFill>
-                <a:latin typeface="Tahoma" pitchFamily="34" charset="0"/>
-                <a:ea typeface="+mn-ea"/>
-                <a:cs typeface="Arial" pitchFamily="34" charset="0"/>
-              </a:defRPr>
-            </a:lvl9pPr>
-          </a:lstStyle>
+          <a:lstStyle/>
           <a:p>
-            <a:pPr marL="0" marR="0" indent="0" algn="ctr" defTabSz="914400" eaLnBrk="0" latinLnBrk="0" hangingPunct="0">
-              <a:lnSpc>
-                <a:spcPct val="100000"/>
-              </a:lnSpc>
-              <a:buClrTx/>
-              <a:buSzTx/>
-              <a:buFontTx/>
-              <a:buNone/>
-              <a:tabLst/>
-            </a:pPr>
+            <a:pPr algn="ctr" eaLnBrk="0" hangingPunct="0"/>
             <a:r>
-              <a:rPr lang="en-GB" dirty="0" smtClean="0">
+              <a:rPr lang="en-GB" dirty="0">
                 <a:solidFill>
                   <a:srgbClr val="1B2950"/>
                 </a:solidFill>
@@ -19754,7 +19914,9 @@
           <a:prstGeom prst="rect">
             <a:avLst/>
           </a:prstGeom>
-          <a:noFill/>
+          <a:solidFill>
+            <a:srgbClr val="FFCCFF"/>
+          </a:solidFill>
           <a:ln w="9525" cap="flat" cmpd="sng" algn="ctr">
             <a:solidFill>
               <a:srgbClr val="3288C4"/>
@@ -19772,157 +19934,14 @@
               <a:avLst/>
             </a:prstTxWarp>
           </a:bodyPr>
-          <a:lstStyle>
-            <a:defPPr>
-              <a:defRPr lang="en-US"/>
-            </a:defPPr>
-            <a:lvl1pPr algn="l" rtl="0" fontAlgn="base">
-              <a:spcBef>
-                <a:spcPct val="0"/>
-              </a:spcBef>
-              <a:spcAft>
-                <a:spcPct val="0"/>
-              </a:spcAft>
-              <a:defRPr sz="1400" kern="1200">
-                <a:solidFill>
-                  <a:srgbClr val="000000"/>
-                </a:solidFill>
-                <a:latin typeface="Tahoma" pitchFamily="34" charset="0"/>
-                <a:ea typeface="+mn-ea"/>
-                <a:cs typeface="Arial" pitchFamily="34" charset="0"/>
-              </a:defRPr>
-            </a:lvl1pPr>
-            <a:lvl2pPr marL="457200" algn="l" rtl="0" fontAlgn="base">
-              <a:spcBef>
-                <a:spcPct val="0"/>
-              </a:spcBef>
-              <a:spcAft>
-                <a:spcPct val="0"/>
-              </a:spcAft>
-              <a:defRPr sz="1400" kern="1200">
-                <a:solidFill>
-                  <a:srgbClr val="000000"/>
-                </a:solidFill>
-                <a:latin typeface="Tahoma" pitchFamily="34" charset="0"/>
-                <a:ea typeface="+mn-ea"/>
-                <a:cs typeface="Arial" pitchFamily="34" charset="0"/>
-              </a:defRPr>
-            </a:lvl2pPr>
-            <a:lvl3pPr marL="914400" algn="l" rtl="0" fontAlgn="base">
-              <a:spcBef>
-                <a:spcPct val="0"/>
-              </a:spcBef>
-              <a:spcAft>
-                <a:spcPct val="0"/>
-              </a:spcAft>
-              <a:defRPr sz="1400" kern="1200">
-                <a:solidFill>
-                  <a:srgbClr val="000000"/>
-                </a:solidFill>
-                <a:latin typeface="Tahoma" pitchFamily="34" charset="0"/>
-                <a:ea typeface="+mn-ea"/>
-                <a:cs typeface="Arial" pitchFamily="34" charset="0"/>
-              </a:defRPr>
-            </a:lvl3pPr>
-            <a:lvl4pPr marL="1371600" algn="l" rtl="0" fontAlgn="base">
-              <a:spcBef>
-                <a:spcPct val="0"/>
-              </a:spcBef>
-              <a:spcAft>
-                <a:spcPct val="0"/>
-              </a:spcAft>
-              <a:defRPr sz="1400" kern="1200">
-                <a:solidFill>
-                  <a:srgbClr val="000000"/>
-                </a:solidFill>
-                <a:latin typeface="Tahoma" pitchFamily="34" charset="0"/>
-                <a:ea typeface="+mn-ea"/>
-                <a:cs typeface="Arial" pitchFamily="34" charset="0"/>
-              </a:defRPr>
-            </a:lvl4pPr>
-            <a:lvl5pPr marL="1828800" algn="l" rtl="0" fontAlgn="base">
-              <a:spcBef>
-                <a:spcPct val="0"/>
-              </a:spcBef>
-              <a:spcAft>
-                <a:spcPct val="0"/>
-              </a:spcAft>
-              <a:defRPr sz="1400" kern="1200">
-                <a:solidFill>
-                  <a:srgbClr val="000000"/>
-                </a:solidFill>
-                <a:latin typeface="Tahoma" pitchFamily="34" charset="0"/>
-                <a:ea typeface="+mn-ea"/>
-                <a:cs typeface="Arial" pitchFamily="34" charset="0"/>
-              </a:defRPr>
-            </a:lvl5pPr>
-            <a:lvl6pPr marL="2286000" algn="l" defTabSz="914400" rtl="0" eaLnBrk="1" latinLnBrk="0" hangingPunct="1">
-              <a:defRPr sz="1400" kern="1200">
-                <a:solidFill>
-                  <a:srgbClr val="000000"/>
-                </a:solidFill>
-                <a:latin typeface="Tahoma" pitchFamily="34" charset="0"/>
-                <a:ea typeface="+mn-ea"/>
-                <a:cs typeface="Arial" pitchFamily="34" charset="0"/>
-              </a:defRPr>
-            </a:lvl6pPr>
-            <a:lvl7pPr marL="2743200" algn="l" defTabSz="914400" rtl="0" eaLnBrk="1" latinLnBrk="0" hangingPunct="1">
-              <a:defRPr sz="1400" kern="1200">
-                <a:solidFill>
-                  <a:srgbClr val="000000"/>
-                </a:solidFill>
-                <a:latin typeface="Tahoma" pitchFamily="34" charset="0"/>
-                <a:ea typeface="+mn-ea"/>
-                <a:cs typeface="Arial" pitchFamily="34" charset="0"/>
-              </a:defRPr>
-            </a:lvl7pPr>
-            <a:lvl8pPr marL="3200400" algn="l" defTabSz="914400" rtl="0" eaLnBrk="1" latinLnBrk="0" hangingPunct="1">
-              <a:defRPr sz="1400" kern="1200">
-                <a:solidFill>
-                  <a:srgbClr val="000000"/>
-                </a:solidFill>
-                <a:latin typeface="Tahoma" pitchFamily="34" charset="0"/>
-                <a:ea typeface="+mn-ea"/>
-                <a:cs typeface="Arial" pitchFamily="34" charset="0"/>
-              </a:defRPr>
-            </a:lvl8pPr>
-            <a:lvl9pPr marL="3657600" algn="l" defTabSz="914400" rtl="0" eaLnBrk="1" latinLnBrk="0" hangingPunct="1">
-              <a:defRPr sz="1400" kern="1200">
-                <a:solidFill>
-                  <a:srgbClr val="000000"/>
-                </a:solidFill>
-                <a:latin typeface="Tahoma" pitchFamily="34" charset="0"/>
-                <a:ea typeface="+mn-ea"/>
-                <a:cs typeface="Arial" pitchFamily="34" charset="0"/>
-              </a:defRPr>
-            </a:lvl9pPr>
-          </a:lstStyle>
+          <a:lstStyle/>
           <a:p>
-            <a:pPr marL="0" marR="0" indent="0" algn="ctr" defTabSz="914400" rtl="0" eaLnBrk="0" fontAlgn="base" latinLnBrk="0" hangingPunct="0">
-              <a:lnSpc>
-                <a:spcPct val="100000"/>
-              </a:lnSpc>
-              <a:spcBef>
-                <a:spcPct val="0"/>
-              </a:spcBef>
-              <a:spcAft>
-                <a:spcPct val="0"/>
-              </a:spcAft>
-              <a:buClrTx/>
-              <a:buSzTx/>
-              <a:buFontTx/>
-              <a:buNone/>
-              <a:tabLst/>
-            </a:pPr>
+            <a:pPr algn="ctr" eaLnBrk="0" hangingPunct="0"/>
             <a:r>
-              <a:rPr kumimoji="0" lang="en-GB" b="0" i="0" u="none" strike="noStrike" cap="none" normalizeH="0" baseline="0" dirty="0" smtClean="0">
-                <a:ln>
-                  <a:noFill/>
-                </a:ln>
+              <a:rPr lang="en-GB" dirty="0">
                 <a:solidFill>
                   <a:srgbClr val="1B2950"/>
                 </a:solidFill>
-                <a:effectLst/>
                 <a:latin typeface="+mn-lt"/>
                 <a:ea typeface="Tahoma" pitchFamily="34" charset="0"/>
                 <a:cs typeface="Tahoma" pitchFamily="34" charset="0"/>
@@ -20122,7 +20141,12 @@
           <a:prstGeom prst="rect">
             <a:avLst/>
           </a:prstGeom>
-          <a:noFill/>
+          <a:solidFill>
+            <a:schemeClr val="accent1">
+              <a:lumMod val="20000"/>
+              <a:lumOff val="80000"/>
+            </a:schemeClr>
+          </a:solidFill>
           <a:ln w="9525" cap="flat" cmpd="sng" algn="ctr">
             <a:solidFill>
               <a:srgbClr val="3288C4"/>
@@ -20140,141 +20164,16 @@
               <a:avLst/>
             </a:prstTxWarp>
           </a:bodyPr>
-          <a:lstStyle>
-            <a:defPPr>
-              <a:defRPr lang="en-US"/>
-            </a:defPPr>
-            <a:lvl1pPr algn="l" rtl="0" fontAlgn="base">
-              <a:spcBef>
-                <a:spcPct val="0"/>
-              </a:spcBef>
-              <a:spcAft>
-                <a:spcPct val="0"/>
-              </a:spcAft>
-              <a:defRPr sz="1400" kern="1200">
-                <a:solidFill>
-                  <a:srgbClr val="000000"/>
-                </a:solidFill>
-                <a:latin typeface="Tahoma" pitchFamily="34" charset="0"/>
-                <a:ea typeface="+mn-ea"/>
-                <a:cs typeface="Arial" pitchFamily="34" charset="0"/>
-              </a:defRPr>
-            </a:lvl1pPr>
-            <a:lvl2pPr marL="457200" algn="l" rtl="0" fontAlgn="base">
-              <a:spcBef>
-                <a:spcPct val="0"/>
-              </a:spcBef>
-              <a:spcAft>
-                <a:spcPct val="0"/>
-              </a:spcAft>
-              <a:defRPr sz="1400" kern="1200">
-                <a:solidFill>
-                  <a:srgbClr val="000000"/>
-                </a:solidFill>
-                <a:latin typeface="Tahoma" pitchFamily="34" charset="0"/>
-                <a:ea typeface="+mn-ea"/>
-                <a:cs typeface="Arial" pitchFamily="34" charset="0"/>
-              </a:defRPr>
-            </a:lvl2pPr>
-            <a:lvl3pPr marL="914400" algn="l" rtl="0" fontAlgn="base">
-              <a:spcBef>
-                <a:spcPct val="0"/>
-              </a:spcBef>
-              <a:spcAft>
-                <a:spcPct val="0"/>
-              </a:spcAft>
-              <a:defRPr sz="1400" kern="1200">
-                <a:solidFill>
-                  <a:srgbClr val="000000"/>
-                </a:solidFill>
-                <a:latin typeface="Tahoma" pitchFamily="34" charset="0"/>
-                <a:ea typeface="+mn-ea"/>
-                <a:cs typeface="Arial" pitchFamily="34" charset="0"/>
-              </a:defRPr>
-            </a:lvl3pPr>
-            <a:lvl4pPr marL="1371600" algn="l" rtl="0" fontAlgn="base">
-              <a:spcBef>
-                <a:spcPct val="0"/>
-              </a:spcBef>
-              <a:spcAft>
-                <a:spcPct val="0"/>
-              </a:spcAft>
-              <a:defRPr sz="1400" kern="1200">
-                <a:solidFill>
-                  <a:srgbClr val="000000"/>
-                </a:solidFill>
-                <a:latin typeface="Tahoma" pitchFamily="34" charset="0"/>
-                <a:ea typeface="+mn-ea"/>
-                <a:cs typeface="Arial" pitchFamily="34" charset="0"/>
-              </a:defRPr>
-            </a:lvl4pPr>
-            <a:lvl5pPr marL="1828800" algn="l" rtl="0" fontAlgn="base">
-              <a:spcBef>
-                <a:spcPct val="0"/>
-              </a:spcBef>
-              <a:spcAft>
-                <a:spcPct val="0"/>
-              </a:spcAft>
-              <a:defRPr sz="1400" kern="1200">
-                <a:solidFill>
-                  <a:srgbClr val="000000"/>
-                </a:solidFill>
-                <a:latin typeface="Tahoma" pitchFamily="34" charset="0"/>
-                <a:ea typeface="+mn-ea"/>
-                <a:cs typeface="Arial" pitchFamily="34" charset="0"/>
-              </a:defRPr>
-            </a:lvl5pPr>
-            <a:lvl6pPr marL="2286000" algn="l" defTabSz="914400" rtl="0" eaLnBrk="1" latinLnBrk="0" hangingPunct="1">
-              <a:defRPr sz="1400" kern="1200">
-                <a:solidFill>
-                  <a:srgbClr val="000000"/>
-                </a:solidFill>
-                <a:latin typeface="Tahoma" pitchFamily="34" charset="0"/>
-                <a:ea typeface="+mn-ea"/>
-                <a:cs typeface="Arial" pitchFamily="34" charset="0"/>
-              </a:defRPr>
-            </a:lvl6pPr>
-            <a:lvl7pPr marL="2743200" algn="l" defTabSz="914400" rtl="0" eaLnBrk="1" latinLnBrk="0" hangingPunct="1">
-              <a:defRPr sz="1400" kern="1200">
-                <a:solidFill>
-                  <a:srgbClr val="000000"/>
-                </a:solidFill>
-                <a:latin typeface="Tahoma" pitchFamily="34" charset="0"/>
-                <a:ea typeface="+mn-ea"/>
-                <a:cs typeface="Arial" pitchFamily="34" charset="0"/>
-              </a:defRPr>
-            </a:lvl7pPr>
-            <a:lvl8pPr marL="3200400" algn="l" defTabSz="914400" rtl="0" eaLnBrk="1" latinLnBrk="0" hangingPunct="1">
-              <a:defRPr sz="1400" kern="1200">
-                <a:solidFill>
-                  <a:srgbClr val="000000"/>
-                </a:solidFill>
-                <a:latin typeface="Tahoma" pitchFamily="34" charset="0"/>
-                <a:ea typeface="+mn-ea"/>
-                <a:cs typeface="Arial" pitchFamily="34" charset="0"/>
-              </a:defRPr>
-            </a:lvl8pPr>
-            <a:lvl9pPr marL="3657600" algn="l" defTabSz="914400" rtl="0" eaLnBrk="1" latinLnBrk="0" hangingPunct="1">
-              <a:defRPr sz="1400" kern="1200">
-                <a:solidFill>
-                  <a:srgbClr val="000000"/>
-                </a:solidFill>
-                <a:latin typeface="Tahoma" pitchFamily="34" charset="0"/>
-                <a:ea typeface="+mn-ea"/>
-                <a:cs typeface="Arial" pitchFamily="34" charset="0"/>
-              </a:defRPr>
-            </a:lvl9pPr>
-          </a:lstStyle>
+          <a:lstStyle/>
           <a:p>
             <a:pPr algn="ctr" eaLnBrk="0" hangingPunct="0"/>
             <a:r>
-              <a:rPr lang="en-GB" dirty="0" smtClean="0">
+              <a:rPr lang="en-GB" dirty="0">
                 <a:solidFill>
                   <a:srgbClr val="1B2950"/>
                 </a:solidFill>
                 <a:latin typeface="+mn-lt"/>
-                <a:ea typeface="Tahoma" pitchFamily="34" charset="0"/>
-                <a:cs typeface="Tahoma" pitchFamily="34" charset="0"/>
+                <a:cs typeface="Arial" pitchFamily="34" charset="0"/>
               </a:rPr>
               <a:t>Planning</a:t>
             </a:r>
@@ -20295,7 +20194,9 @@
           <a:prstGeom prst="rect">
             <a:avLst/>
           </a:prstGeom>
-          <a:noFill/>
+          <a:solidFill>
+            <a:srgbClr val="FFCCFF"/>
+          </a:solidFill>
           <a:ln w="9525" cap="flat" cmpd="sng" algn="ctr">
             <a:solidFill>
               <a:srgbClr val="3288C4"/>
@@ -22824,7 +22725,9 @@
             <a:prstGeom prst="rect">
               <a:avLst/>
             </a:prstGeom>
-            <a:noFill/>
+            <a:solidFill>
+              <a:srgbClr val="FFCCFF"/>
+            </a:solidFill>
             <a:ln w="9525" cap="flat" cmpd="sng" algn="ctr">
               <a:solidFill>
                 <a:srgbClr val="3288C4"/>

</xml_diff>